<commit_message>
fixed a link omission
</commit_message>
<xml_diff>
--- a/Resources/CppModels.pptx
+++ b/Resources/CppModels.pptx
@@ -1,9 +1,12 @@
 
 <file path=ppt/presentation.xml><?xml version="1.0" encoding="utf-8"?>
-<p:presentation xmlns:a="http://schemas.openxmlformats.org/drawingml/2006/main" xmlns:r="http://schemas.openxmlformats.org/officeDocument/2006/relationships" xmlns:p="http://schemas.openxmlformats.org/presentationml/2006/main" saveSubsetFonts="1">
+<p:presentation xmlns:a="http://schemas.openxmlformats.org/drawingml/2006/main" xmlns:r="http://schemas.openxmlformats.org/officeDocument/2006/relationships" xmlns:p="http://schemas.openxmlformats.org/presentationml/2006/main" showSpecialPlsOnTitleSld="0" saveSubsetFonts="1">
   <p:sldMasterIdLst>
     <p:sldMasterId id="2147483648" r:id="rId1"/>
   </p:sldMasterIdLst>
+  <p:notesMasterIdLst>
+    <p:notesMasterId r:id="rId24"/>
+  </p:notesMasterIdLst>
   <p:sldIdLst>
     <p:sldId id="256" r:id="rId2"/>
     <p:sldId id="257" r:id="rId3"/>
@@ -29,7 +32,7 @@
     <p:sldId id="280" r:id="rId23"/>
   </p:sldIdLst>
   <p:sldSz cx="12192000" cy="6858000"/>
-  <p:notesSz cx="6858000" cy="9144000"/>
+  <p:notesSz cx="7010400" cy="9296400"/>
   <p:defaultTextStyle>
     <a:defPPr>
       <a:defRPr lang="en-US"/>
@@ -133,6 +136,355 @@
 </p:presentation>
 </file>
 
+<file path=ppt/notesMasters/notesMaster1.xml><?xml version="1.0" encoding="utf-8"?>
+<p:notesMaster xmlns:a="http://schemas.openxmlformats.org/drawingml/2006/main" xmlns:r="http://schemas.openxmlformats.org/officeDocument/2006/relationships" xmlns:p="http://schemas.openxmlformats.org/presentationml/2006/main">
+  <p:cSld>
+    <p:bg>
+      <p:bgRef idx="1001">
+        <a:schemeClr val="bg1"/>
+      </p:bgRef>
+    </p:bg>
+    <p:spTree>
+      <p:nvGrpSpPr>
+        <p:cNvPr id="1" name=""/>
+        <p:cNvGrpSpPr/>
+        <p:nvPr/>
+      </p:nvGrpSpPr>
+      <p:grpSpPr>
+        <a:xfrm>
+          <a:off x="0" y="0"/>
+          <a:ext cx="0" cy="0"/>
+          <a:chOff x="0" y="0"/>
+          <a:chExt cx="0" cy="0"/>
+        </a:xfrm>
+      </p:grpSpPr>
+      <p:sp>
+        <p:nvSpPr>
+          <p:cNvPr id="2" name="Header Placeholder 1"/>
+          <p:cNvSpPr>
+            <a:spLocks noGrp="1"/>
+          </p:cNvSpPr>
+          <p:nvPr>
+            <p:ph type="hdr" sz="quarter"/>
+          </p:nvPr>
+        </p:nvSpPr>
+        <p:spPr>
+          <a:xfrm>
+            <a:off x="0" y="0"/>
+            <a:ext cx="3038475" cy="466725"/>
+          </a:xfrm>
+          <a:prstGeom prst="rect">
+            <a:avLst/>
+          </a:prstGeom>
+        </p:spPr>
+        <p:txBody>
+          <a:bodyPr vert="horz" lIns="91440" tIns="45720" rIns="91440" bIns="45720" rtlCol="0"/>
+          <a:lstStyle>
+            <a:lvl1pPr algn="l">
+              <a:defRPr sz="1200"/>
+            </a:lvl1pPr>
+          </a:lstStyle>
+          <a:p>
+            <a:endParaRPr lang="en-US"/>
+          </a:p>
+        </p:txBody>
+      </p:sp>
+      <p:sp>
+        <p:nvSpPr>
+          <p:cNvPr id="3" name="Date Placeholder 2"/>
+          <p:cNvSpPr>
+            <a:spLocks noGrp="1"/>
+          </p:cNvSpPr>
+          <p:nvPr>
+            <p:ph type="dt" idx="1"/>
+          </p:nvPr>
+        </p:nvSpPr>
+        <p:spPr>
+          <a:xfrm>
+            <a:off x="3970338" y="0"/>
+            <a:ext cx="3038475" cy="466725"/>
+          </a:xfrm>
+          <a:prstGeom prst="rect">
+            <a:avLst/>
+          </a:prstGeom>
+        </p:spPr>
+        <p:txBody>
+          <a:bodyPr vert="horz" lIns="91440" tIns="45720" rIns="91440" bIns="45720" rtlCol="0"/>
+          <a:lstStyle>
+            <a:lvl1pPr algn="r">
+              <a:defRPr sz="1200"/>
+            </a:lvl1pPr>
+          </a:lstStyle>
+          <a:p>
+            <a:fld id="{8B9DEAE6-0538-4445-AC69-E9546F37B6FF}" type="datetimeFigureOut">
+              <a:rPr lang="en-US" smtClean="0"/>
+              <a:t>2/3/2020</a:t>
+            </a:fld>
+            <a:endParaRPr lang="en-US"/>
+          </a:p>
+        </p:txBody>
+      </p:sp>
+      <p:sp>
+        <p:nvSpPr>
+          <p:cNvPr id="4" name="Slide Image Placeholder 3"/>
+          <p:cNvSpPr>
+            <a:spLocks noGrp="1" noRot="1" noChangeAspect="1"/>
+          </p:cNvSpPr>
+          <p:nvPr>
+            <p:ph type="sldImg" idx="2"/>
+          </p:nvPr>
+        </p:nvSpPr>
+        <p:spPr>
+          <a:xfrm>
+            <a:off x="717550" y="1162050"/>
+            <a:ext cx="5575300" cy="3136900"/>
+          </a:xfrm>
+          <a:prstGeom prst="rect">
+            <a:avLst/>
+          </a:prstGeom>
+          <a:noFill/>
+          <a:ln w="12700">
+            <a:solidFill>
+              <a:prstClr val="black"/>
+            </a:solidFill>
+          </a:ln>
+        </p:spPr>
+        <p:txBody>
+          <a:bodyPr vert="horz" lIns="91440" tIns="45720" rIns="91440" bIns="45720" rtlCol="0" anchor="ctr"/>
+          <a:lstStyle/>
+          <a:p>
+            <a:endParaRPr lang="en-US"/>
+          </a:p>
+        </p:txBody>
+      </p:sp>
+      <p:sp>
+        <p:nvSpPr>
+          <p:cNvPr id="5" name="Notes Placeholder 4"/>
+          <p:cNvSpPr>
+            <a:spLocks noGrp="1"/>
+          </p:cNvSpPr>
+          <p:nvPr>
+            <p:ph type="body" sz="quarter" idx="3"/>
+          </p:nvPr>
+        </p:nvSpPr>
+        <p:spPr>
+          <a:xfrm>
+            <a:off x="701675" y="4473575"/>
+            <a:ext cx="5607050" cy="3660775"/>
+          </a:xfrm>
+          <a:prstGeom prst="rect">
+            <a:avLst/>
+          </a:prstGeom>
+        </p:spPr>
+        <p:txBody>
+          <a:bodyPr vert="horz" lIns="91440" tIns="45720" rIns="91440" bIns="45720" rtlCol="0"/>
+          <a:lstStyle/>
+          <a:p>
+            <a:pPr lvl="0"/>
+            <a:r>
+              <a:rPr lang="en-US"/>
+              <a:t>Click to edit Master text styles</a:t>
+            </a:r>
+          </a:p>
+          <a:p>
+            <a:pPr lvl="1"/>
+            <a:r>
+              <a:rPr lang="en-US"/>
+              <a:t>Second level</a:t>
+            </a:r>
+          </a:p>
+          <a:p>
+            <a:pPr lvl="2"/>
+            <a:r>
+              <a:rPr lang="en-US"/>
+              <a:t>Third level</a:t>
+            </a:r>
+          </a:p>
+          <a:p>
+            <a:pPr lvl="3"/>
+            <a:r>
+              <a:rPr lang="en-US"/>
+              <a:t>Fourth level</a:t>
+            </a:r>
+          </a:p>
+          <a:p>
+            <a:pPr lvl="4"/>
+            <a:r>
+              <a:rPr lang="en-US"/>
+              <a:t>Fifth level</a:t>
+            </a:r>
+          </a:p>
+        </p:txBody>
+      </p:sp>
+      <p:sp>
+        <p:nvSpPr>
+          <p:cNvPr id="6" name="Footer Placeholder 5"/>
+          <p:cNvSpPr>
+            <a:spLocks noGrp="1"/>
+          </p:cNvSpPr>
+          <p:nvPr>
+            <p:ph type="ftr" sz="quarter" idx="4"/>
+          </p:nvPr>
+        </p:nvSpPr>
+        <p:spPr>
+          <a:xfrm>
+            <a:off x="0" y="8829675"/>
+            <a:ext cx="3038475" cy="466725"/>
+          </a:xfrm>
+          <a:prstGeom prst="rect">
+            <a:avLst/>
+          </a:prstGeom>
+        </p:spPr>
+        <p:txBody>
+          <a:bodyPr vert="horz" lIns="91440" tIns="45720" rIns="91440" bIns="45720" rtlCol="0" anchor="b"/>
+          <a:lstStyle>
+            <a:lvl1pPr algn="l">
+              <a:defRPr sz="1200"/>
+            </a:lvl1pPr>
+          </a:lstStyle>
+          <a:p>
+            <a:endParaRPr lang="en-US"/>
+          </a:p>
+        </p:txBody>
+      </p:sp>
+      <p:sp>
+        <p:nvSpPr>
+          <p:cNvPr id="7" name="Slide Number Placeholder 6"/>
+          <p:cNvSpPr>
+            <a:spLocks noGrp="1"/>
+          </p:cNvSpPr>
+          <p:nvPr>
+            <p:ph type="sldNum" sz="quarter" idx="5"/>
+          </p:nvPr>
+        </p:nvSpPr>
+        <p:spPr>
+          <a:xfrm>
+            <a:off x="3970338" y="8829675"/>
+            <a:ext cx="3038475" cy="466725"/>
+          </a:xfrm>
+          <a:prstGeom prst="rect">
+            <a:avLst/>
+          </a:prstGeom>
+        </p:spPr>
+        <p:txBody>
+          <a:bodyPr vert="horz" lIns="91440" tIns="45720" rIns="91440" bIns="45720" rtlCol="0" anchor="b"/>
+          <a:lstStyle>
+            <a:lvl1pPr algn="r">
+              <a:defRPr sz="1200"/>
+            </a:lvl1pPr>
+          </a:lstStyle>
+          <a:p>
+            <a:fld id="{453A7E65-4A82-4B4C-B03C-96C4DC1D0B3C}" type="slidenum">
+              <a:rPr lang="en-US" smtClean="0"/>
+              <a:t>‹#›</a:t>
+            </a:fld>
+            <a:endParaRPr lang="en-US"/>
+          </a:p>
+        </p:txBody>
+      </p:sp>
+    </p:spTree>
+    <p:extLst>
+      <p:ext uri="{BB962C8B-B14F-4D97-AF65-F5344CB8AC3E}">
+        <p14:creationId xmlns:p14="http://schemas.microsoft.com/office/powerpoint/2010/main" val="1682882806"/>
+      </p:ext>
+    </p:extLst>
+  </p:cSld>
+  <p:clrMap bg1="lt1" tx1="dk1" bg2="lt2" tx2="dk2" accent1="accent1" accent2="accent2" accent3="accent3" accent4="accent4" accent5="accent5" accent6="accent6" hlink="hlink" folHlink="folHlink"/>
+  <p:notesStyle>
+    <a:lvl1pPr marL="0" algn="l" defTabSz="914400" rtl="0" eaLnBrk="1" latinLnBrk="0" hangingPunct="1">
+      <a:defRPr sz="1200" kern="1200">
+        <a:solidFill>
+          <a:schemeClr val="tx1"/>
+        </a:solidFill>
+        <a:latin typeface="+mn-lt"/>
+        <a:ea typeface="+mn-ea"/>
+        <a:cs typeface="+mn-cs"/>
+      </a:defRPr>
+    </a:lvl1pPr>
+    <a:lvl2pPr marL="457200" algn="l" defTabSz="914400" rtl="0" eaLnBrk="1" latinLnBrk="0" hangingPunct="1">
+      <a:defRPr sz="1200" kern="1200">
+        <a:solidFill>
+          <a:schemeClr val="tx1"/>
+        </a:solidFill>
+        <a:latin typeface="+mn-lt"/>
+        <a:ea typeface="+mn-ea"/>
+        <a:cs typeface="+mn-cs"/>
+      </a:defRPr>
+    </a:lvl2pPr>
+    <a:lvl3pPr marL="914400" algn="l" defTabSz="914400" rtl="0" eaLnBrk="1" latinLnBrk="0" hangingPunct="1">
+      <a:defRPr sz="1200" kern="1200">
+        <a:solidFill>
+          <a:schemeClr val="tx1"/>
+        </a:solidFill>
+        <a:latin typeface="+mn-lt"/>
+        <a:ea typeface="+mn-ea"/>
+        <a:cs typeface="+mn-cs"/>
+      </a:defRPr>
+    </a:lvl3pPr>
+    <a:lvl4pPr marL="1371600" algn="l" defTabSz="914400" rtl="0" eaLnBrk="1" latinLnBrk="0" hangingPunct="1">
+      <a:defRPr sz="1200" kern="1200">
+        <a:solidFill>
+          <a:schemeClr val="tx1"/>
+        </a:solidFill>
+        <a:latin typeface="+mn-lt"/>
+        <a:ea typeface="+mn-ea"/>
+        <a:cs typeface="+mn-cs"/>
+      </a:defRPr>
+    </a:lvl4pPr>
+    <a:lvl5pPr marL="1828800" algn="l" defTabSz="914400" rtl="0" eaLnBrk="1" latinLnBrk="0" hangingPunct="1">
+      <a:defRPr sz="1200" kern="1200">
+        <a:solidFill>
+          <a:schemeClr val="tx1"/>
+        </a:solidFill>
+        <a:latin typeface="+mn-lt"/>
+        <a:ea typeface="+mn-ea"/>
+        <a:cs typeface="+mn-cs"/>
+      </a:defRPr>
+    </a:lvl5pPr>
+    <a:lvl6pPr marL="2286000" algn="l" defTabSz="914400" rtl="0" eaLnBrk="1" latinLnBrk="0" hangingPunct="1">
+      <a:defRPr sz="1200" kern="1200">
+        <a:solidFill>
+          <a:schemeClr val="tx1"/>
+        </a:solidFill>
+        <a:latin typeface="+mn-lt"/>
+        <a:ea typeface="+mn-ea"/>
+        <a:cs typeface="+mn-cs"/>
+      </a:defRPr>
+    </a:lvl6pPr>
+    <a:lvl7pPr marL="2743200" algn="l" defTabSz="914400" rtl="0" eaLnBrk="1" latinLnBrk="0" hangingPunct="1">
+      <a:defRPr sz="1200" kern="1200">
+        <a:solidFill>
+          <a:schemeClr val="tx1"/>
+        </a:solidFill>
+        <a:latin typeface="+mn-lt"/>
+        <a:ea typeface="+mn-ea"/>
+        <a:cs typeface="+mn-cs"/>
+      </a:defRPr>
+    </a:lvl7pPr>
+    <a:lvl8pPr marL="3200400" algn="l" defTabSz="914400" rtl="0" eaLnBrk="1" latinLnBrk="0" hangingPunct="1">
+      <a:defRPr sz="1200" kern="1200">
+        <a:solidFill>
+          <a:schemeClr val="tx1"/>
+        </a:solidFill>
+        <a:latin typeface="+mn-lt"/>
+        <a:ea typeface="+mn-ea"/>
+        <a:cs typeface="+mn-cs"/>
+      </a:defRPr>
+    </a:lvl8pPr>
+    <a:lvl9pPr marL="3657600" algn="l" defTabSz="914400" rtl="0" eaLnBrk="1" latinLnBrk="0" hangingPunct="1">
+      <a:defRPr sz="1200" kern="1200">
+        <a:solidFill>
+          <a:schemeClr val="tx1"/>
+        </a:solidFill>
+        <a:latin typeface="+mn-lt"/>
+        <a:ea typeface="+mn-ea"/>
+        <a:cs typeface="+mn-cs"/>
+      </a:defRPr>
+    </a:lvl9pPr>
+  </p:notesStyle>
+</p:notesMaster>
+</file>
+
 <file path=ppt/slideLayouts/slideLayout1.xml><?xml version="1.0" encoding="utf-8"?>
 <p:sldLayout xmlns:a="http://schemas.openxmlformats.org/drawingml/2006/main" xmlns:r="http://schemas.openxmlformats.org/officeDocument/2006/relationships" xmlns:p="http://schemas.openxmlformats.org/presentationml/2006/main" type="title" preserve="1">
   <p:cSld name="Title Slide">
@@ -278,7 +630,7 @@
           <a:bodyPr/>
           <a:lstStyle/>
           <a:p>
-            <a:fld id="{93290832-B8B6-42E8-AAD1-7658147B7924}" type="datetimeFigureOut">
+            <a:fld id="{F59BA8CD-9D66-40F3-B663-5AE3FCC8E640}" type="datetime1">
               <a:rPr lang="en-US" smtClean="0"/>
               <a:t>2/3/2020</a:t>
             </a:fld>
@@ -476,7 +828,7 @@
           <a:bodyPr/>
           <a:lstStyle/>
           <a:p>
-            <a:fld id="{93290832-B8B6-42E8-AAD1-7658147B7924}" type="datetimeFigureOut">
+            <a:fld id="{AE815081-8781-4CE2-BA8A-F30EB62592DB}" type="datetime1">
               <a:rPr lang="en-US" smtClean="0"/>
               <a:t>2/3/2020</a:t>
             </a:fld>
@@ -684,7 +1036,7 @@
           <a:bodyPr/>
           <a:lstStyle/>
           <a:p>
-            <a:fld id="{93290832-B8B6-42E8-AAD1-7658147B7924}" type="datetimeFigureOut">
+            <a:fld id="{1436B19E-3845-4454-9B00-81A37311B2DB}" type="datetime1">
               <a:rPr lang="en-US" smtClean="0"/>
               <a:t>2/3/2020</a:t>
             </a:fld>
@@ -882,7 +1234,7 @@
           <a:bodyPr/>
           <a:lstStyle/>
           <a:p>
-            <a:fld id="{93290832-B8B6-42E8-AAD1-7658147B7924}" type="datetimeFigureOut">
+            <a:fld id="{51BD0182-F02D-41FA-88F8-DAAE45FECD96}" type="datetime1">
               <a:rPr lang="en-US" smtClean="0"/>
               <a:t>2/3/2020</a:t>
             </a:fld>
@@ -1157,7 +1509,7 @@
           <a:bodyPr/>
           <a:lstStyle/>
           <a:p>
-            <a:fld id="{93290832-B8B6-42E8-AAD1-7658147B7924}" type="datetimeFigureOut">
+            <a:fld id="{97DD5E3A-970B-45DB-AC65-C654B1C83769}" type="datetime1">
               <a:rPr lang="en-US" smtClean="0"/>
               <a:t>2/3/2020</a:t>
             </a:fld>
@@ -1422,7 +1774,7 @@
           <a:bodyPr/>
           <a:lstStyle/>
           <a:p>
-            <a:fld id="{93290832-B8B6-42E8-AAD1-7658147B7924}" type="datetimeFigureOut">
+            <a:fld id="{A0C75F36-CE33-4D01-AEC1-8AE85EBDD5C0}" type="datetime1">
               <a:rPr lang="en-US" smtClean="0"/>
               <a:t>2/3/2020</a:t>
             </a:fld>
@@ -1834,7 +2186,7 @@
           <a:bodyPr/>
           <a:lstStyle/>
           <a:p>
-            <a:fld id="{93290832-B8B6-42E8-AAD1-7658147B7924}" type="datetimeFigureOut">
+            <a:fld id="{2F12ED4E-FBDA-4929-861C-48D0B255396D}" type="datetime1">
               <a:rPr lang="en-US" smtClean="0"/>
               <a:t>2/3/2020</a:t>
             </a:fld>
@@ -1975,7 +2327,7 @@
           <a:bodyPr/>
           <a:lstStyle/>
           <a:p>
-            <a:fld id="{93290832-B8B6-42E8-AAD1-7658147B7924}" type="datetimeFigureOut">
+            <a:fld id="{71274C8E-8698-45E5-8BD5-3125D835571A}" type="datetime1">
               <a:rPr lang="en-US" smtClean="0"/>
               <a:t>2/3/2020</a:t>
             </a:fld>
@@ -2088,7 +2440,7 @@
           <a:bodyPr/>
           <a:lstStyle/>
           <a:p>
-            <a:fld id="{93290832-B8B6-42E8-AAD1-7658147B7924}" type="datetimeFigureOut">
+            <a:fld id="{EAAEADE5-9122-4DD1-9AF9-D9EE601260DA}" type="datetime1">
               <a:rPr lang="en-US" smtClean="0"/>
               <a:t>2/3/2020</a:t>
             </a:fld>
@@ -2399,7 +2751,7 @@
           <a:bodyPr/>
           <a:lstStyle/>
           <a:p>
-            <a:fld id="{93290832-B8B6-42E8-AAD1-7658147B7924}" type="datetimeFigureOut">
+            <a:fld id="{AF0EE2CB-ACA5-4190-BF2E-27B23A7D63ED}" type="datetime1">
               <a:rPr lang="en-US" smtClean="0"/>
               <a:t>2/3/2020</a:t>
             </a:fld>
@@ -2687,7 +3039,7 @@
           <a:bodyPr/>
           <a:lstStyle/>
           <a:p>
-            <a:fld id="{93290832-B8B6-42E8-AAD1-7658147B7924}" type="datetimeFigureOut">
+            <a:fld id="{8071D197-35A9-4BC6-A7E3-13AE8964F43E}" type="datetime1">
               <a:rPr lang="en-US" smtClean="0"/>
               <a:t>2/3/2020</a:t>
             </a:fld>
@@ -2928,7 +3280,7 @@
             </a:lvl1pPr>
           </a:lstStyle>
           <a:p>
-            <a:fld id="{93290832-B8B6-42E8-AAD1-7658147B7924}" type="datetimeFigureOut">
+            <a:fld id="{A6174D4B-69CC-457D-9299-B97313C54882}" type="datetime1">
               <a:rPr lang="en-US" smtClean="0"/>
               <a:t>2/3/2020</a:t>
             </a:fld>
@@ -3047,6 +3399,7 @@
     <p:sldLayoutId id="2147483658" r:id="rId10"/>
     <p:sldLayoutId id="2147483659" r:id="rId11"/>
   </p:sldLayoutIdLst>
+  <p:hf hdr="0" ftr="0" dt="0"/>
   <p:txStyles>
     <p:titleStyle>
       <a:lvl1pPr algn="l" defTabSz="914400" rtl="0" eaLnBrk="1" latinLnBrk="0" hangingPunct="1">
@@ -3617,6 +3970,35 @@
           </a:xfrm>
         </p:spPr>
       </p:pic>
+      <p:sp>
+        <p:nvSpPr>
+          <p:cNvPr id="3" name="Slide Number Placeholder 2">
+            <a:extLst>
+              <a:ext uri="{FF2B5EF4-FFF2-40B4-BE49-F238E27FC236}">
+                <a16:creationId xmlns:a16="http://schemas.microsoft.com/office/drawing/2014/main" id="{FAF681EF-8EC8-4290-A82D-F30E65913CC3}"/>
+              </a:ext>
+            </a:extLst>
+          </p:cNvPr>
+          <p:cNvSpPr>
+            <a:spLocks noGrp="1"/>
+          </p:cNvSpPr>
+          <p:nvPr>
+            <p:ph type="sldNum" sz="quarter" idx="12"/>
+          </p:nvPr>
+        </p:nvSpPr>
+        <p:spPr/>
+        <p:txBody>
+          <a:bodyPr/>
+          <a:lstStyle/>
+          <a:p>
+            <a:fld id="{519FA752-D1CF-498F-B0BD-05E47309CED3}" type="slidenum">
+              <a:rPr lang="en-US" smtClean="0"/>
+              <a:t>10</a:t>
+            </a:fld>
+            <a:endParaRPr lang="en-US"/>
+          </a:p>
+        </p:txBody>
+      </p:sp>
     </p:spTree>
     <p:extLst>
       <p:ext uri="{BB962C8B-B14F-4D97-AF65-F5344CB8AC3E}">
@@ -3770,6 +4152,35 @@
           </a:prstGeom>
         </p:spPr>
       </p:pic>
+      <p:sp>
+        <p:nvSpPr>
+          <p:cNvPr id="5" name="Slide Number Placeholder 4">
+            <a:extLst>
+              <a:ext uri="{FF2B5EF4-FFF2-40B4-BE49-F238E27FC236}">
+                <a16:creationId xmlns:a16="http://schemas.microsoft.com/office/drawing/2014/main" id="{875AB5E6-D8C6-4D56-B820-5B5F967A6F21}"/>
+              </a:ext>
+            </a:extLst>
+          </p:cNvPr>
+          <p:cNvSpPr>
+            <a:spLocks noGrp="1"/>
+          </p:cNvSpPr>
+          <p:nvPr>
+            <p:ph type="sldNum" sz="quarter" idx="12"/>
+          </p:nvPr>
+        </p:nvSpPr>
+        <p:spPr/>
+        <p:txBody>
+          <a:bodyPr/>
+          <a:lstStyle/>
+          <a:p>
+            <a:fld id="{519FA752-D1CF-498F-B0BD-05E47309CED3}" type="slidenum">
+              <a:rPr lang="en-US" smtClean="0"/>
+              <a:t>11</a:t>
+            </a:fld>
+            <a:endParaRPr lang="en-US"/>
+          </a:p>
+        </p:txBody>
+      </p:sp>
     </p:spTree>
     <p:extLst>
       <p:ext uri="{BB962C8B-B14F-4D97-AF65-F5344CB8AC3E}">
@@ -4010,6 +4421,35 @@
           </a:prstGeom>
         </p:spPr>
       </p:pic>
+      <p:sp>
+        <p:nvSpPr>
+          <p:cNvPr id="5" name="Slide Number Placeholder 4">
+            <a:extLst>
+              <a:ext uri="{FF2B5EF4-FFF2-40B4-BE49-F238E27FC236}">
+                <a16:creationId xmlns:a16="http://schemas.microsoft.com/office/drawing/2014/main" id="{DE6FE833-F984-4947-9CF1-6E81F42838AA}"/>
+              </a:ext>
+            </a:extLst>
+          </p:cNvPr>
+          <p:cNvSpPr>
+            <a:spLocks noGrp="1"/>
+          </p:cNvSpPr>
+          <p:nvPr>
+            <p:ph type="sldNum" sz="quarter" idx="12"/>
+          </p:nvPr>
+        </p:nvSpPr>
+        <p:spPr/>
+        <p:txBody>
+          <a:bodyPr/>
+          <a:lstStyle/>
+          <a:p>
+            <a:fld id="{519FA752-D1CF-498F-B0BD-05E47309CED3}" type="slidenum">
+              <a:rPr lang="en-US" smtClean="0"/>
+              <a:t>12</a:t>
+            </a:fld>
+            <a:endParaRPr lang="en-US"/>
+          </a:p>
+        </p:txBody>
+      </p:sp>
     </p:spTree>
     <p:extLst>
       <p:ext uri="{BB962C8B-B14F-4D97-AF65-F5344CB8AC3E}">
@@ -4165,6 +4605,35 @@
           </a:xfrm>
         </p:spPr>
       </p:pic>
+      <p:sp>
+        <p:nvSpPr>
+          <p:cNvPr id="3" name="Slide Number Placeholder 2">
+            <a:extLst>
+              <a:ext uri="{FF2B5EF4-FFF2-40B4-BE49-F238E27FC236}">
+                <a16:creationId xmlns:a16="http://schemas.microsoft.com/office/drawing/2014/main" id="{16B71492-7C4C-4B5C-BDE4-C7812C6764A0}"/>
+              </a:ext>
+            </a:extLst>
+          </p:cNvPr>
+          <p:cNvSpPr>
+            <a:spLocks noGrp="1"/>
+          </p:cNvSpPr>
+          <p:nvPr>
+            <p:ph type="sldNum" sz="quarter" idx="12"/>
+          </p:nvPr>
+        </p:nvSpPr>
+        <p:spPr/>
+        <p:txBody>
+          <a:bodyPr/>
+          <a:lstStyle/>
+          <a:p>
+            <a:fld id="{519FA752-D1CF-498F-B0BD-05E47309CED3}" type="slidenum">
+              <a:rPr lang="en-US" smtClean="0"/>
+              <a:t>13</a:t>
+            </a:fld>
+            <a:endParaRPr lang="en-US"/>
+          </a:p>
+        </p:txBody>
+      </p:sp>
     </p:spTree>
     <p:extLst>
       <p:ext uri="{BB962C8B-B14F-4D97-AF65-F5344CB8AC3E}">
@@ -4323,6 +4792,35 @@
           </a:prstGeom>
         </p:spPr>
       </p:pic>
+      <p:sp>
+        <p:nvSpPr>
+          <p:cNvPr id="5" name="Slide Number Placeholder 4">
+            <a:extLst>
+              <a:ext uri="{FF2B5EF4-FFF2-40B4-BE49-F238E27FC236}">
+                <a16:creationId xmlns:a16="http://schemas.microsoft.com/office/drawing/2014/main" id="{C5880B67-07CD-4164-83F8-A6185A63E1A9}"/>
+              </a:ext>
+            </a:extLst>
+          </p:cNvPr>
+          <p:cNvSpPr>
+            <a:spLocks noGrp="1"/>
+          </p:cNvSpPr>
+          <p:nvPr>
+            <p:ph type="sldNum" sz="quarter" idx="12"/>
+          </p:nvPr>
+        </p:nvSpPr>
+        <p:spPr/>
+        <p:txBody>
+          <a:bodyPr/>
+          <a:lstStyle/>
+          <a:p>
+            <a:fld id="{519FA752-D1CF-498F-B0BD-05E47309CED3}" type="slidenum">
+              <a:rPr lang="en-US" smtClean="0"/>
+              <a:t>14</a:t>
+            </a:fld>
+            <a:endParaRPr lang="en-US"/>
+          </a:p>
+        </p:txBody>
+      </p:sp>
     </p:spTree>
     <p:extLst>
       <p:ext uri="{BB962C8B-B14F-4D97-AF65-F5344CB8AC3E}">
@@ -4484,6 +4982,35 @@
           </a:xfrm>
         </p:spPr>
       </p:pic>
+      <p:sp>
+        <p:nvSpPr>
+          <p:cNvPr id="2" name="Slide Number Placeholder 1">
+            <a:extLst>
+              <a:ext uri="{FF2B5EF4-FFF2-40B4-BE49-F238E27FC236}">
+                <a16:creationId xmlns:a16="http://schemas.microsoft.com/office/drawing/2014/main" id="{4DC244DF-FA34-4B6E-935D-81B14EDC8157}"/>
+              </a:ext>
+            </a:extLst>
+          </p:cNvPr>
+          <p:cNvSpPr>
+            <a:spLocks noGrp="1"/>
+          </p:cNvSpPr>
+          <p:nvPr>
+            <p:ph type="sldNum" sz="quarter" idx="12"/>
+          </p:nvPr>
+        </p:nvSpPr>
+        <p:spPr/>
+        <p:txBody>
+          <a:bodyPr/>
+          <a:lstStyle/>
+          <a:p>
+            <a:fld id="{519FA752-D1CF-498F-B0BD-05E47309CED3}" type="slidenum">
+              <a:rPr lang="en-US" smtClean="0"/>
+              <a:t>15</a:t>
+            </a:fld>
+            <a:endParaRPr lang="en-US"/>
+          </a:p>
+        </p:txBody>
+      </p:sp>
     </p:spTree>
     <p:extLst>
       <p:ext uri="{BB962C8B-B14F-4D97-AF65-F5344CB8AC3E}">
@@ -5150,6 +5677,35 @@
           </a:prstGeom>
         </p:spPr>
       </p:pic>
+      <p:sp>
+        <p:nvSpPr>
+          <p:cNvPr id="3" name="Slide Number Placeholder 2">
+            <a:extLst>
+              <a:ext uri="{FF2B5EF4-FFF2-40B4-BE49-F238E27FC236}">
+                <a16:creationId xmlns:a16="http://schemas.microsoft.com/office/drawing/2014/main" id="{C95A6C40-06FA-483E-908A-01907D31A84A}"/>
+              </a:ext>
+            </a:extLst>
+          </p:cNvPr>
+          <p:cNvSpPr>
+            <a:spLocks noGrp="1"/>
+          </p:cNvSpPr>
+          <p:nvPr>
+            <p:ph type="sldNum" sz="quarter" idx="12"/>
+          </p:nvPr>
+        </p:nvSpPr>
+        <p:spPr/>
+        <p:txBody>
+          <a:bodyPr/>
+          <a:lstStyle/>
+          <a:p>
+            <a:fld id="{519FA752-D1CF-498F-B0BD-05E47309CED3}" type="slidenum">
+              <a:rPr lang="en-US" smtClean="0"/>
+              <a:t>16</a:t>
+            </a:fld>
+            <a:endParaRPr lang="en-US"/>
+          </a:p>
+        </p:txBody>
+      </p:sp>
     </p:spTree>
     <p:extLst>
       <p:ext uri="{BB962C8B-B14F-4D97-AF65-F5344CB8AC3E}">
@@ -5320,6 +5876,35 @@
           </a:xfrm>
         </p:spPr>
       </p:pic>
+      <p:sp>
+        <p:nvSpPr>
+          <p:cNvPr id="4" name="Slide Number Placeholder 3">
+            <a:extLst>
+              <a:ext uri="{FF2B5EF4-FFF2-40B4-BE49-F238E27FC236}">
+                <a16:creationId xmlns:a16="http://schemas.microsoft.com/office/drawing/2014/main" id="{95A0783E-829A-4AF2-891F-E4AA27A45396}"/>
+              </a:ext>
+            </a:extLst>
+          </p:cNvPr>
+          <p:cNvSpPr>
+            <a:spLocks noGrp="1"/>
+          </p:cNvSpPr>
+          <p:nvPr>
+            <p:ph type="sldNum" sz="quarter" idx="12"/>
+          </p:nvPr>
+        </p:nvSpPr>
+        <p:spPr/>
+        <p:txBody>
+          <a:bodyPr/>
+          <a:lstStyle/>
+          <a:p>
+            <a:fld id="{519FA752-D1CF-498F-B0BD-05E47309CED3}" type="slidenum">
+              <a:rPr lang="en-US" smtClean="0"/>
+              <a:t>17</a:t>
+            </a:fld>
+            <a:endParaRPr lang="en-US"/>
+          </a:p>
+        </p:txBody>
+      </p:sp>
     </p:spTree>
     <p:extLst>
       <p:ext uri="{BB962C8B-B14F-4D97-AF65-F5344CB8AC3E}">
@@ -5556,6 +6141,35 @@
               <a:buChar char="•"/>
             </a:pPr>
             <a:endParaRPr lang="en-US" dirty="0"/>
+          </a:p>
+        </p:txBody>
+      </p:sp>
+      <p:sp>
+        <p:nvSpPr>
+          <p:cNvPr id="4" name="Slide Number Placeholder 3">
+            <a:extLst>
+              <a:ext uri="{FF2B5EF4-FFF2-40B4-BE49-F238E27FC236}">
+                <a16:creationId xmlns:a16="http://schemas.microsoft.com/office/drawing/2014/main" id="{74A411B7-05FA-4D3A-BA01-914112D17FC8}"/>
+              </a:ext>
+            </a:extLst>
+          </p:cNvPr>
+          <p:cNvSpPr>
+            <a:spLocks noGrp="1"/>
+          </p:cNvSpPr>
+          <p:nvPr>
+            <p:ph type="sldNum" sz="quarter" idx="12"/>
+          </p:nvPr>
+        </p:nvSpPr>
+        <p:spPr/>
+        <p:txBody>
+          <a:bodyPr/>
+          <a:lstStyle/>
+          <a:p>
+            <a:fld id="{519FA752-D1CF-498F-B0BD-05E47309CED3}" type="slidenum">
+              <a:rPr lang="en-US" smtClean="0"/>
+              <a:t>18</a:t>
+            </a:fld>
+            <a:endParaRPr lang="en-US"/>
           </a:p>
         </p:txBody>
       </p:sp>
@@ -6403,6 +7017,35 @@
           </a:prstGeom>
         </p:spPr>
       </p:pic>
+      <p:sp>
+        <p:nvSpPr>
+          <p:cNvPr id="2" name="Slide Number Placeholder 1">
+            <a:extLst>
+              <a:ext uri="{FF2B5EF4-FFF2-40B4-BE49-F238E27FC236}">
+                <a16:creationId xmlns:a16="http://schemas.microsoft.com/office/drawing/2014/main" id="{99B86E2C-F299-4D84-9B19-5A5414B5758A}"/>
+              </a:ext>
+            </a:extLst>
+          </p:cNvPr>
+          <p:cNvSpPr>
+            <a:spLocks noGrp="1"/>
+          </p:cNvSpPr>
+          <p:nvPr>
+            <p:ph type="sldNum" sz="quarter" idx="12"/>
+          </p:nvPr>
+        </p:nvSpPr>
+        <p:spPr/>
+        <p:txBody>
+          <a:bodyPr/>
+          <a:lstStyle/>
+          <a:p>
+            <a:fld id="{519FA752-D1CF-498F-B0BD-05E47309CED3}" type="slidenum">
+              <a:rPr lang="en-US" smtClean="0"/>
+              <a:t>19</a:t>
+            </a:fld>
+            <a:endParaRPr lang="en-US"/>
+          </a:p>
+        </p:txBody>
+      </p:sp>
     </p:spTree>
     <p:extLst>
       <p:ext uri="{BB962C8B-B14F-4D97-AF65-F5344CB8AC3E}">
@@ -6546,6 +7189,35 @@
           </a:p>
         </p:txBody>
       </p:sp>
+      <p:sp>
+        <p:nvSpPr>
+          <p:cNvPr id="4" name="Slide Number Placeholder 3">
+            <a:extLst>
+              <a:ext uri="{FF2B5EF4-FFF2-40B4-BE49-F238E27FC236}">
+                <a16:creationId xmlns:a16="http://schemas.microsoft.com/office/drawing/2014/main" id="{AE5D9997-749D-445C-8B8A-50325F941DD9}"/>
+              </a:ext>
+            </a:extLst>
+          </p:cNvPr>
+          <p:cNvSpPr>
+            <a:spLocks noGrp="1"/>
+          </p:cNvSpPr>
+          <p:nvPr>
+            <p:ph type="sldNum" sz="quarter" idx="12"/>
+          </p:nvPr>
+        </p:nvSpPr>
+        <p:spPr/>
+        <p:txBody>
+          <a:bodyPr/>
+          <a:lstStyle/>
+          <a:p>
+            <a:fld id="{519FA752-D1CF-498F-B0BD-05E47309CED3}" type="slidenum">
+              <a:rPr lang="en-US" smtClean="0"/>
+              <a:t>2</a:t>
+            </a:fld>
+            <a:endParaRPr lang="en-US"/>
+          </a:p>
+        </p:txBody>
+      </p:sp>
     </p:spTree>
     <p:extLst>
       <p:ext uri="{BB962C8B-B14F-4D97-AF65-F5344CB8AC3E}">
@@ -6594,7 +7266,7 @@
         </p:nvSpPr>
         <p:spPr>
           <a:xfrm>
-            <a:off x="838200" y="365126"/>
+            <a:off x="838200" y="345807"/>
             <a:ext cx="10515600" cy="793974"/>
           </a:xfrm>
           <a:solidFill>
@@ -6607,8 +7279,15 @@
           <a:p>
             <a:r>
               <a:rPr lang="en-US" dirty="0"/>
-              <a:t>7. Templates</a:t>
-            </a:r>
+              <a:t>7. Templates 	</a:t>
+            </a:r>
+            <a:r>
+              <a:rPr lang="en-US" sz="1800" dirty="0">
+                <a:hlinkClick r:id="rId2"/>
+              </a:rPr>
+              <a:t>https://jimfawcett.github.io/CppStory_Models.html#templ</a:t>
+            </a:r>
+            <a:endParaRPr lang="en-US" dirty="0"/>
           </a:p>
         </p:txBody>
       </p:sp>
@@ -6629,7 +7308,7 @@
           </p:nvPr>
         </p:nvPicPr>
         <p:blipFill>
-          <a:blip r:embed="rId2">
+          <a:blip r:embed="rId3">
             <a:extLst>
               <a:ext uri="{28A0092B-C50C-407E-A947-70E740481C1C}">
                 <a14:useLocalDpi xmlns:a14="http://schemas.microsoft.com/office/drawing/2010/main" val="0"/>
@@ -6691,6 +7370,35 @@
               <a:rPr lang="en-US" sz="2000" dirty="0"/>
               <a:t>The class template, shown top right, generates a point class for each T specified in application code.  Here, the using code has instantiated it with two types, int and double, resulting in Point&lt;int&gt; and Point&lt;double&gt;, two distinct classes.</a:t>
             </a:r>
+          </a:p>
+        </p:txBody>
+      </p:sp>
+      <p:sp>
+        <p:nvSpPr>
+          <p:cNvPr id="3" name="Slide Number Placeholder 2">
+            <a:extLst>
+              <a:ext uri="{FF2B5EF4-FFF2-40B4-BE49-F238E27FC236}">
+                <a16:creationId xmlns:a16="http://schemas.microsoft.com/office/drawing/2014/main" id="{C1F3935A-62A6-4738-87D8-033A84A84D02}"/>
+              </a:ext>
+            </a:extLst>
+          </p:cNvPr>
+          <p:cNvSpPr>
+            <a:spLocks noGrp="1"/>
+          </p:cNvSpPr>
+          <p:nvPr>
+            <p:ph type="sldNum" sz="quarter" idx="12"/>
+          </p:nvPr>
+        </p:nvSpPr>
+        <p:spPr/>
+        <p:txBody>
+          <a:bodyPr/>
+          <a:lstStyle/>
+          <a:p>
+            <a:fld id="{519FA752-D1CF-498F-B0BD-05E47309CED3}" type="slidenum">
+              <a:rPr lang="en-US" smtClean="0"/>
+              <a:t>20</a:t>
+            </a:fld>
+            <a:endParaRPr lang="en-US"/>
           </a:p>
         </p:txBody>
       </p:sp>
@@ -6858,6 +7566,35 @@
           </a:prstGeom>
         </p:spPr>
       </p:pic>
+      <p:sp>
+        <p:nvSpPr>
+          <p:cNvPr id="4" name="Slide Number Placeholder 3">
+            <a:extLst>
+              <a:ext uri="{FF2B5EF4-FFF2-40B4-BE49-F238E27FC236}">
+                <a16:creationId xmlns:a16="http://schemas.microsoft.com/office/drawing/2014/main" id="{C1CAA9E7-9EB6-4398-9D47-854F0AA46E50}"/>
+              </a:ext>
+            </a:extLst>
+          </p:cNvPr>
+          <p:cNvSpPr>
+            <a:spLocks noGrp="1"/>
+          </p:cNvSpPr>
+          <p:nvPr>
+            <p:ph type="sldNum" sz="quarter" idx="12"/>
+          </p:nvPr>
+        </p:nvSpPr>
+        <p:spPr/>
+        <p:txBody>
+          <a:bodyPr/>
+          <a:lstStyle/>
+          <a:p>
+            <a:fld id="{519FA752-D1CF-498F-B0BD-05E47309CED3}" type="slidenum">
+              <a:rPr lang="en-US" smtClean="0"/>
+              <a:t>21</a:t>
+            </a:fld>
+            <a:endParaRPr lang="en-US"/>
+          </a:p>
+        </p:txBody>
+      </p:sp>
     </p:spTree>
     <p:extLst>
       <p:ext uri="{BB962C8B-B14F-4D97-AF65-F5344CB8AC3E}">
@@ -7141,6 +7878,35 @@
           </a:p>
         </p:txBody>
       </p:sp>
+      <p:sp>
+        <p:nvSpPr>
+          <p:cNvPr id="4" name="Slide Number Placeholder 3">
+            <a:extLst>
+              <a:ext uri="{FF2B5EF4-FFF2-40B4-BE49-F238E27FC236}">
+                <a16:creationId xmlns:a16="http://schemas.microsoft.com/office/drawing/2014/main" id="{567B57B9-8602-4D27-B31D-EF8BC80A417B}"/>
+              </a:ext>
+            </a:extLst>
+          </p:cNvPr>
+          <p:cNvSpPr>
+            <a:spLocks noGrp="1"/>
+          </p:cNvSpPr>
+          <p:nvPr>
+            <p:ph type="sldNum" sz="quarter" idx="12"/>
+          </p:nvPr>
+        </p:nvSpPr>
+        <p:spPr/>
+        <p:txBody>
+          <a:bodyPr/>
+          <a:lstStyle/>
+          <a:p>
+            <a:fld id="{519FA752-D1CF-498F-B0BD-05E47309CED3}" type="slidenum">
+              <a:rPr lang="en-US" smtClean="0"/>
+              <a:t>22</a:t>
+            </a:fld>
+            <a:endParaRPr lang="en-US"/>
+          </a:p>
+        </p:txBody>
+      </p:sp>
     </p:spTree>
     <p:extLst>
       <p:ext uri="{BB962C8B-B14F-4D97-AF65-F5344CB8AC3E}">
@@ -7307,6 +8073,35 @@
           </a:p>
         </p:txBody>
       </p:sp>
+      <p:sp>
+        <p:nvSpPr>
+          <p:cNvPr id="4" name="Slide Number Placeholder 3">
+            <a:extLst>
+              <a:ext uri="{FF2B5EF4-FFF2-40B4-BE49-F238E27FC236}">
+                <a16:creationId xmlns:a16="http://schemas.microsoft.com/office/drawing/2014/main" id="{65DE1FCB-5689-4E10-A416-328ED633A2EE}"/>
+              </a:ext>
+            </a:extLst>
+          </p:cNvPr>
+          <p:cNvSpPr>
+            <a:spLocks noGrp="1"/>
+          </p:cNvSpPr>
+          <p:nvPr>
+            <p:ph type="sldNum" sz="quarter" idx="12"/>
+          </p:nvPr>
+        </p:nvSpPr>
+        <p:spPr/>
+        <p:txBody>
+          <a:bodyPr/>
+          <a:lstStyle/>
+          <a:p>
+            <a:fld id="{519FA752-D1CF-498F-B0BD-05E47309CED3}" type="slidenum">
+              <a:rPr lang="en-US" smtClean="0"/>
+              <a:t>3</a:t>
+            </a:fld>
+            <a:endParaRPr lang="en-US"/>
+          </a:p>
+        </p:txBody>
+      </p:sp>
     </p:spTree>
     <p:extLst>
       <p:ext uri="{BB962C8B-B14F-4D97-AF65-F5344CB8AC3E}">
@@ -7468,6 +8263,35 @@
           </a:p>
         </p:txBody>
       </p:sp>
+      <p:sp>
+        <p:nvSpPr>
+          <p:cNvPr id="4" name="Slide Number Placeholder 3">
+            <a:extLst>
+              <a:ext uri="{FF2B5EF4-FFF2-40B4-BE49-F238E27FC236}">
+                <a16:creationId xmlns:a16="http://schemas.microsoft.com/office/drawing/2014/main" id="{FB86EBC9-38EB-45E0-888F-00C85D25B659}"/>
+              </a:ext>
+            </a:extLst>
+          </p:cNvPr>
+          <p:cNvSpPr>
+            <a:spLocks noGrp="1"/>
+          </p:cNvSpPr>
+          <p:nvPr>
+            <p:ph type="sldNum" sz="quarter" idx="12"/>
+          </p:nvPr>
+        </p:nvSpPr>
+        <p:spPr/>
+        <p:txBody>
+          <a:bodyPr/>
+          <a:lstStyle/>
+          <a:p>
+            <a:fld id="{519FA752-D1CF-498F-B0BD-05E47309CED3}" type="slidenum">
+              <a:rPr lang="en-US" smtClean="0"/>
+              <a:t>4</a:t>
+            </a:fld>
+            <a:endParaRPr lang="en-US"/>
+          </a:p>
+        </p:txBody>
+      </p:sp>
     </p:spTree>
     <p:extLst>
       <p:ext uri="{BB962C8B-B14F-4D97-AF65-F5344CB8AC3E}">
@@ -7726,6 +8550,35 @@
           </a:prstGeom>
         </p:spPr>
       </p:pic>
+      <p:sp>
+        <p:nvSpPr>
+          <p:cNvPr id="3" name="Slide Number Placeholder 2">
+            <a:extLst>
+              <a:ext uri="{FF2B5EF4-FFF2-40B4-BE49-F238E27FC236}">
+                <a16:creationId xmlns:a16="http://schemas.microsoft.com/office/drawing/2014/main" id="{C828145F-4F12-46B1-93B4-B88569FBF4C1}"/>
+              </a:ext>
+            </a:extLst>
+          </p:cNvPr>
+          <p:cNvSpPr>
+            <a:spLocks noGrp="1"/>
+          </p:cNvSpPr>
+          <p:nvPr>
+            <p:ph type="sldNum" sz="quarter" idx="12"/>
+          </p:nvPr>
+        </p:nvSpPr>
+        <p:spPr/>
+        <p:txBody>
+          <a:bodyPr/>
+          <a:lstStyle/>
+          <a:p>
+            <a:fld id="{519FA752-D1CF-498F-B0BD-05E47309CED3}" type="slidenum">
+              <a:rPr lang="en-US" smtClean="0"/>
+              <a:t>5</a:t>
+            </a:fld>
+            <a:endParaRPr lang="en-US"/>
+          </a:p>
+        </p:txBody>
+      </p:sp>
     </p:spTree>
     <p:extLst>
       <p:ext uri="{BB962C8B-B14F-4D97-AF65-F5344CB8AC3E}">
@@ -8031,6 +8884,35 @@
           </a:fontRef>
         </p:style>
       </p:cxnSp>
+      <p:sp>
+        <p:nvSpPr>
+          <p:cNvPr id="3" name="Slide Number Placeholder 2">
+            <a:extLst>
+              <a:ext uri="{FF2B5EF4-FFF2-40B4-BE49-F238E27FC236}">
+                <a16:creationId xmlns:a16="http://schemas.microsoft.com/office/drawing/2014/main" id="{1A154B2B-84CC-4FF9-9CDB-FCD2FFACAB41}"/>
+              </a:ext>
+            </a:extLst>
+          </p:cNvPr>
+          <p:cNvSpPr>
+            <a:spLocks noGrp="1"/>
+          </p:cNvSpPr>
+          <p:nvPr>
+            <p:ph type="sldNum" sz="quarter" idx="12"/>
+          </p:nvPr>
+        </p:nvSpPr>
+        <p:spPr/>
+        <p:txBody>
+          <a:bodyPr/>
+          <a:lstStyle/>
+          <a:p>
+            <a:fld id="{519FA752-D1CF-498F-B0BD-05E47309CED3}" type="slidenum">
+              <a:rPr lang="en-US" smtClean="0"/>
+              <a:t>6</a:t>
+            </a:fld>
+            <a:endParaRPr lang="en-US"/>
+          </a:p>
+        </p:txBody>
+      </p:sp>
     </p:spTree>
     <p:extLst>
       <p:ext uri="{BB962C8B-B14F-4D97-AF65-F5344CB8AC3E}">
@@ -8429,6 +9311,35 @@
           </a:prstGeom>
         </p:spPr>
       </p:pic>
+      <p:sp>
+        <p:nvSpPr>
+          <p:cNvPr id="8" name="Slide Number Placeholder 7">
+            <a:extLst>
+              <a:ext uri="{FF2B5EF4-FFF2-40B4-BE49-F238E27FC236}">
+                <a16:creationId xmlns:a16="http://schemas.microsoft.com/office/drawing/2014/main" id="{D1EF6AD7-D4E5-4496-A558-44C1860A1430}"/>
+              </a:ext>
+            </a:extLst>
+          </p:cNvPr>
+          <p:cNvSpPr>
+            <a:spLocks noGrp="1"/>
+          </p:cNvSpPr>
+          <p:nvPr>
+            <p:ph type="sldNum" sz="quarter" idx="12"/>
+          </p:nvPr>
+        </p:nvSpPr>
+        <p:spPr/>
+        <p:txBody>
+          <a:bodyPr/>
+          <a:lstStyle/>
+          <a:p>
+            <a:fld id="{519FA752-D1CF-498F-B0BD-05E47309CED3}" type="slidenum">
+              <a:rPr lang="en-US" smtClean="0"/>
+              <a:t>7</a:t>
+            </a:fld>
+            <a:endParaRPr lang="en-US"/>
+          </a:p>
+        </p:txBody>
+      </p:sp>
     </p:spTree>
     <p:extLst>
       <p:ext uri="{BB962C8B-B14F-4D97-AF65-F5344CB8AC3E}">
@@ -8634,6 +9545,35 @@
           </a:p>
         </p:txBody>
       </p:sp>
+      <p:sp>
+        <p:nvSpPr>
+          <p:cNvPr id="3" name="Slide Number Placeholder 2">
+            <a:extLst>
+              <a:ext uri="{FF2B5EF4-FFF2-40B4-BE49-F238E27FC236}">
+                <a16:creationId xmlns:a16="http://schemas.microsoft.com/office/drawing/2014/main" id="{791E7C80-6706-4988-B78C-5468EE01D9D2}"/>
+              </a:ext>
+            </a:extLst>
+          </p:cNvPr>
+          <p:cNvSpPr>
+            <a:spLocks noGrp="1"/>
+          </p:cNvSpPr>
+          <p:nvPr>
+            <p:ph type="sldNum" sz="quarter" idx="12"/>
+          </p:nvPr>
+        </p:nvSpPr>
+        <p:spPr/>
+        <p:txBody>
+          <a:bodyPr/>
+          <a:lstStyle/>
+          <a:p>
+            <a:fld id="{519FA752-D1CF-498F-B0BD-05E47309CED3}" type="slidenum">
+              <a:rPr lang="en-US" smtClean="0"/>
+              <a:t>8</a:t>
+            </a:fld>
+            <a:endParaRPr lang="en-US"/>
+          </a:p>
+        </p:txBody>
+      </p:sp>
     </p:spTree>
     <p:extLst>
       <p:ext uri="{BB962C8B-B14F-4D97-AF65-F5344CB8AC3E}">
@@ -8887,6 +9827,35 @@
               <a:buNone/>
             </a:pPr>
             <a:endParaRPr lang="en-US" sz="1800" dirty="0"/>
+          </a:p>
+        </p:txBody>
+      </p:sp>
+      <p:sp>
+        <p:nvSpPr>
+          <p:cNvPr id="6" name="Slide Number Placeholder 5">
+            <a:extLst>
+              <a:ext uri="{FF2B5EF4-FFF2-40B4-BE49-F238E27FC236}">
+                <a16:creationId xmlns:a16="http://schemas.microsoft.com/office/drawing/2014/main" id="{C9289F08-BA92-44A1-BB05-482824E74D3A}"/>
+              </a:ext>
+            </a:extLst>
+          </p:cNvPr>
+          <p:cNvSpPr>
+            <a:spLocks noGrp="1"/>
+          </p:cNvSpPr>
+          <p:nvPr>
+            <p:ph type="sldNum" sz="quarter" idx="12"/>
+          </p:nvPr>
+        </p:nvSpPr>
+        <p:spPr/>
+        <p:txBody>
+          <a:bodyPr/>
+          <a:lstStyle/>
+          <a:p>
+            <a:fld id="{519FA752-D1CF-498F-B0BD-05E47309CED3}" type="slidenum">
+              <a:rPr lang="en-US" smtClean="0"/>
+              <a:t>9</a:t>
+            </a:fld>
+            <a:endParaRPr lang="en-US"/>
           </a:p>
         </p:txBody>
       </p:sp>
@@ -9196,4 +10165,299 @@
     </a:ext>
   </a:extLst>
 </a:theme>
+</file>
+
+<file path=ppt/theme/theme2.xml><?xml version="1.0" encoding="utf-8"?>
+<a:theme xmlns:a="http://schemas.openxmlformats.org/drawingml/2006/main" name="Office Theme">
+  <a:themeElements>
+    <a:clrScheme name="Office">
+      <a:dk1>
+        <a:sysClr val="windowText" lastClr="000000"/>
+      </a:dk1>
+      <a:lt1>
+        <a:sysClr val="window" lastClr="FFFFFF"/>
+      </a:lt1>
+      <a:dk2>
+        <a:srgbClr val="44546A"/>
+      </a:dk2>
+      <a:lt2>
+        <a:srgbClr val="E7E6E6"/>
+      </a:lt2>
+      <a:accent1>
+        <a:srgbClr val="4472C4"/>
+      </a:accent1>
+      <a:accent2>
+        <a:srgbClr val="ED7D31"/>
+      </a:accent2>
+      <a:accent3>
+        <a:srgbClr val="A5A5A5"/>
+      </a:accent3>
+      <a:accent4>
+        <a:srgbClr val="FFC000"/>
+      </a:accent4>
+      <a:accent5>
+        <a:srgbClr val="5B9BD5"/>
+      </a:accent5>
+      <a:accent6>
+        <a:srgbClr val="70AD47"/>
+      </a:accent6>
+      <a:hlink>
+        <a:srgbClr val="0563C1"/>
+      </a:hlink>
+      <a:folHlink>
+        <a:srgbClr val="954F72"/>
+      </a:folHlink>
+    </a:clrScheme>
+    <a:fontScheme name="Office">
+      <a:majorFont>
+        <a:latin typeface="Calibri Light" panose="020F0302020204030204"/>
+        <a:ea typeface=""/>
+        <a:cs typeface=""/>
+        <a:font script="Jpan" typeface="游ゴシック Light"/>
+        <a:font script="Hang" typeface="맑은 고딕"/>
+        <a:font script="Hans" typeface="等线 Light"/>
+        <a:font script="Hant" typeface="新細明體"/>
+        <a:font script="Arab" typeface="Times New Roman"/>
+        <a:font script="Hebr" typeface="Times New Roman"/>
+        <a:font script="Thai" typeface="Angsana New"/>
+        <a:font script="Ethi" typeface="Nyala"/>
+        <a:font script="Beng" typeface="Vrinda"/>
+        <a:font script="Gujr" typeface="Shruti"/>
+        <a:font script="Khmr" typeface="MoolBoran"/>
+        <a:font script="Knda" typeface="Tunga"/>
+        <a:font script="Guru" typeface="Raavi"/>
+        <a:font script="Cans" typeface="Euphemia"/>
+        <a:font script="Cher" typeface="Plantagenet Cherokee"/>
+        <a:font script="Yiii" typeface="Microsoft Yi Baiti"/>
+        <a:font script="Tibt" typeface="Microsoft Himalaya"/>
+        <a:font script="Thaa" typeface="MV Boli"/>
+        <a:font script="Deva" typeface="Mangal"/>
+        <a:font script="Telu" typeface="Gautami"/>
+        <a:font script="Taml" typeface="Latha"/>
+        <a:font script="Syrc" typeface="Estrangelo Edessa"/>
+        <a:font script="Orya" typeface="Kalinga"/>
+        <a:font script="Mlym" typeface="Kartika"/>
+        <a:font script="Laoo" typeface="DokChampa"/>
+        <a:font script="Sinh" typeface="Iskoola Pota"/>
+        <a:font script="Mong" typeface="Mongolian Baiti"/>
+        <a:font script="Viet" typeface="Times New Roman"/>
+        <a:font script="Uigh" typeface="Microsoft Uighur"/>
+        <a:font script="Geor" typeface="Sylfaen"/>
+        <a:font script="Armn" typeface="Arial"/>
+        <a:font script="Bugi" typeface="Leelawadee UI"/>
+        <a:font script="Bopo" typeface="Microsoft JhengHei"/>
+        <a:font script="Java" typeface="Javanese Text"/>
+        <a:font script="Lisu" typeface="Segoe UI"/>
+        <a:font script="Mymr" typeface="Myanmar Text"/>
+        <a:font script="Nkoo" typeface="Ebrima"/>
+        <a:font script="Olck" typeface="Nirmala UI"/>
+        <a:font script="Osma" typeface="Ebrima"/>
+        <a:font script="Phag" typeface="Phagspa"/>
+        <a:font script="Syrn" typeface="Estrangelo Edessa"/>
+        <a:font script="Syrj" typeface="Estrangelo Edessa"/>
+        <a:font script="Syre" typeface="Estrangelo Edessa"/>
+        <a:font script="Sora" typeface="Nirmala UI"/>
+        <a:font script="Tale" typeface="Microsoft Tai Le"/>
+        <a:font script="Talu" typeface="Microsoft New Tai Lue"/>
+        <a:font script="Tfng" typeface="Ebrima"/>
+      </a:majorFont>
+      <a:minorFont>
+        <a:latin typeface="Calibri" panose="020F0502020204030204"/>
+        <a:ea typeface=""/>
+        <a:cs typeface=""/>
+        <a:font script="Jpan" typeface="游ゴシック"/>
+        <a:font script="Hang" typeface="맑은 고딕"/>
+        <a:font script="Hans" typeface="等线"/>
+        <a:font script="Hant" typeface="新細明體"/>
+        <a:font script="Arab" typeface="Arial"/>
+        <a:font script="Hebr" typeface="Arial"/>
+        <a:font script="Thai" typeface="Cordia New"/>
+        <a:font script="Ethi" typeface="Nyala"/>
+        <a:font script="Beng" typeface="Vrinda"/>
+        <a:font script="Gujr" typeface="Shruti"/>
+        <a:font script="Khmr" typeface="DaunPenh"/>
+        <a:font script="Knda" typeface="Tunga"/>
+        <a:font script="Guru" typeface="Raavi"/>
+        <a:font script="Cans" typeface="Euphemia"/>
+        <a:font script="Cher" typeface="Plantagenet Cherokee"/>
+        <a:font script="Yiii" typeface="Microsoft Yi Baiti"/>
+        <a:font script="Tibt" typeface="Microsoft Himalaya"/>
+        <a:font script="Thaa" typeface="MV Boli"/>
+        <a:font script="Deva" typeface="Mangal"/>
+        <a:font script="Telu" typeface="Gautami"/>
+        <a:font script="Taml" typeface="Latha"/>
+        <a:font script="Syrc" typeface="Estrangelo Edessa"/>
+        <a:font script="Orya" typeface="Kalinga"/>
+        <a:font script="Mlym" typeface="Kartika"/>
+        <a:font script="Laoo" typeface="DokChampa"/>
+        <a:font script="Sinh" typeface="Iskoola Pota"/>
+        <a:font script="Mong" typeface="Mongolian Baiti"/>
+        <a:font script="Viet" typeface="Arial"/>
+        <a:font script="Uigh" typeface="Microsoft Uighur"/>
+        <a:font script="Geor" typeface="Sylfaen"/>
+        <a:font script="Armn" typeface="Arial"/>
+        <a:font script="Bugi" typeface="Leelawadee UI"/>
+        <a:font script="Bopo" typeface="Microsoft JhengHei"/>
+        <a:font script="Java" typeface="Javanese Text"/>
+        <a:font script="Lisu" typeface="Segoe UI"/>
+        <a:font script="Mymr" typeface="Myanmar Text"/>
+        <a:font script="Nkoo" typeface="Ebrima"/>
+        <a:font script="Olck" typeface="Nirmala UI"/>
+        <a:font script="Osma" typeface="Ebrima"/>
+        <a:font script="Phag" typeface="Phagspa"/>
+        <a:font script="Syrn" typeface="Estrangelo Edessa"/>
+        <a:font script="Syrj" typeface="Estrangelo Edessa"/>
+        <a:font script="Syre" typeface="Estrangelo Edessa"/>
+        <a:font script="Sora" typeface="Nirmala UI"/>
+        <a:font script="Tale" typeface="Microsoft Tai Le"/>
+        <a:font script="Talu" typeface="Microsoft New Tai Lue"/>
+        <a:font script="Tfng" typeface="Ebrima"/>
+      </a:minorFont>
+    </a:fontScheme>
+    <a:fmtScheme name="Office">
+      <a:fillStyleLst>
+        <a:solidFill>
+          <a:schemeClr val="phClr"/>
+        </a:solidFill>
+        <a:gradFill rotWithShape="1">
+          <a:gsLst>
+            <a:gs pos="0">
+              <a:schemeClr val="phClr">
+                <a:lumMod val="110000"/>
+                <a:satMod val="105000"/>
+                <a:tint val="67000"/>
+              </a:schemeClr>
+            </a:gs>
+            <a:gs pos="50000">
+              <a:schemeClr val="phClr">
+                <a:lumMod val="105000"/>
+                <a:satMod val="103000"/>
+                <a:tint val="73000"/>
+              </a:schemeClr>
+            </a:gs>
+            <a:gs pos="100000">
+              <a:schemeClr val="phClr">
+                <a:lumMod val="105000"/>
+                <a:satMod val="109000"/>
+                <a:tint val="81000"/>
+              </a:schemeClr>
+            </a:gs>
+          </a:gsLst>
+          <a:lin ang="5400000" scaled="0"/>
+        </a:gradFill>
+        <a:gradFill rotWithShape="1">
+          <a:gsLst>
+            <a:gs pos="0">
+              <a:schemeClr val="phClr">
+                <a:satMod val="103000"/>
+                <a:lumMod val="102000"/>
+                <a:tint val="94000"/>
+              </a:schemeClr>
+            </a:gs>
+            <a:gs pos="50000">
+              <a:schemeClr val="phClr">
+                <a:satMod val="110000"/>
+                <a:lumMod val="100000"/>
+                <a:shade val="100000"/>
+              </a:schemeClr>
+            </a:gs>
+            <a:gs pos="100000">
+              <a:schemeClr val="phClr">
+                <a:lumMod val="99000"/>
+                <a:satMod val="120000"/>
+                <a:shade val="78000"/>
+              </a:schemeClr>
+            </a:gs>
+          </a:gsLst>
+          <a:lin ang="5400000" scaled="0"/>
+        </a:gradFill>
+      </a:fillStyleLst>
+      <a:lnStyleLst>
+        <a:ln w="6350" cap="flat" cmpd="sng" algn="ctr">
+          <a:solidFill>
+            <a:schemeClr val="phClr"/>
+          </a:solidFill>
+          <a:prstDash val="solid"/>
+          <a:miter lim="800000"/>
+        </a:ln>
+        <a:ln w="12700" cap="flat" cmpd="sng" algn="ctr">
+          <a:solidFill>
+            <a:schemeClr val="phClr"/>
+          </a:solidFill>
+          <a:prstDash val="solid"/>
+          <a:miter lim="800000"/>
+        </a:ln>
+        <a:ln w="19050" cap="flat" cmpd="sng" algn="ctr">
+          <a:solidFill>
+            <a:schemeClr val="phClr"/>
+          </a:solidFill>
+          <a:prstDash val="solid"/>
+          <a:miter lim="800000"/>
+        </a:ln>
+      </a:lnStyleLst>
+      <a:effectStyleLst>
+        <a:effectStyle>
+          <a:effectLst/>
+        </a:effectStyle>
+        <a:effectStyle>
+          <a:effectLst/>
+        </a:effectStyle>
+        <a:effectStyle>
+          <a:effectLst>
+            <a:outerShdw blurRad="57150" dist="19050" dir="5400000" algn="ctr" rotWithShape="0">
+              <a:srgbClr val="000000">
+                <a:alpha val="63000"/>
+              </a:srgbClr>
+            </a:outerShdw>
+          </a:effectLst>
+        </a:effectStyle>
+      </a:effectStyleLst>
+      <a:bgFillStyleLst>
+        <a:solidFill>
+          <a:schemeClr val="phClr"/>
+        </a:solidFill>
+        <a:solidFill>
+          <a:schemeClr val="phClr">
+            <a:tint val="95000"/>
+            <a:satMod val="170000"/>
+          </a:schemeClr>
+        </a:solidFill>
+        <a:gradFill rotWithShape="1">
+          <a:gsLst>
+            <a:gs pos="0">
+              <a:schemeClr val="phClr">
+                <a:tint val="93000"/>
+                <a:satMod val="150000"/>
+                <a:shade val="98000"/>
+                <a:lumMod val="102000"/>
+              </a:schemeClr>
+            </a:gs>
+            <a:gs pos="50000">
+              <a:schemeClr val="phClr">
+                <a:tint val="98000"/>
+                <a:satMod val="130000"/>
+                <a:shade val="90000"/>
+                <a:lumMod val="103000"/>
+              </a:schemeClr>
+            </a:gs>
+            <a:gs pos="100000">
+              <a:schemeClr val="phClr">
+                <a:shade val="63000"/>
+                <a:satMod val="120000"/>
+              </a:schemeClr>
+            </a:gs>
+          </a:gsLst>
+          <a:lin ang="5400000" scaled="0"/>
+        </a:gradFill>
+      </a:bgFillStyleLst>
+    </a:fmtScheme>
+  </a:themeElements>
+  <a:objectDefaults/>
+  <a:extraClrSchemeLst/>
+  <a:extLst>
+    <a:ext uri="{05A4C25C-085E-4340-85A3-A5531E510DB2}">
+      <thm15:themeFamily xmlns:thm15="http://schemas.microsoft.com/office/thememl/2012/main" name="Office Theme" id="{62F939B6-93AF-4DB8-9C6B-D6C7DFDC589F}" vid="{4A3C46E8-61CC-4603-A589-7422A47A8E4A}"/>
+    </a:ext>
+  </a:extLst>
+</a:theme>
 </file>
</xml_diff>

<commit_message>
tweaked text and added pdf format
</commit_message>
<xml_diff>
--- a/Resources/CppModels.pptx
+++ b/Resources/CppModels.pptx
@@ -3778,11 +3778,14 @@
           </a:p>
           <a:p>
             <a:r>
-              <a:rPr lang="en-US">
+              <a:rPr lang="en-US" dirty="0">
                 <a:hlinkClick r:id="rId3"/>
               </a:rPr>
-              <a:t>https://JimFawcett.github.io/Resources/CppModels.pptx</a:t>
-            </a:r>
+              <a:t>https://JimFawcett.github.io/Resources/CppModels.pdf</a:t>
+            </a:r>
+            <a:endParaRPr lang="en-US" dirty="0"/>
+          </a:p>
+          <a:p>
             <a:endParaRPr lang="en-US" dirty="0"/>
           </a:p>
           <a:p>

</xml_diff>

<commit_message>
added another diagram at end
</commit_message>
<xml_diff>
--- a/Resources/CppModels.pptx
+++ b/Resources/CppModels.pptx
@@ -5,7 +5,7 @@
     <p:sldMasterId id="2147483648" r:id="rId1"/>
   </p:sldMasterIdLst>
   <p:notesMasterIdLst>
-    <p:notesMasterId r:id="rId31"/>
+    <p:notesMasterId r:id="rId32"/>
   </p:notesMasterIdLst>
   <p:sldIdLst>
     <p:sldId id="256" r:id="rId2"/>
@@ -35,8 +35,9 @@
     <p:sldId id="278" r:id="rId26"/>
     <p:sldId id="279" r:id="rId27"/>
     <p:sldId id="281" r:id="rId28"/>
-    <p:sldId id="280" r:id="rId29"/>
+    <p:sldId id="288" r:id="rId29"/>
     <p:sldId id="268" r:id="rId30"/>
+    <p:sldId id="280" r:id="rId31"/>
   </p:sldIdLst>
   <p:sldSz cx="12192000" cy="6858000"/>
   <p:notesSz cx="7010400" cy="9296400"/>
@@ -9355,7 +9356,7 @@
           <p:cNvPr id="2" name="Title 1">
             <a:extLst>
               <a:ext uri="{FF2B5EF4-FFF2-40B4-BE49-F238E27FC236}">
-                <a16:creationId xmlns:a16="http://schemas.microsoft.com/office/drawing/2014/main" id="{44DA707B-1252-4D6A-A691-C5FA8ECEA2F2}"/>
+                <a16:creationId xmlns:a16="http://schemas.microsoft.com/office/drawing/2014/main" id="{6A4FED2B-2E20-48CE-A714-E1F9BFF337F5}"/>
               </a:ext>
             </a:extLst>
           </p:cNvPr>
@@ -9368,12 +9369,9 @@
         </p:nvSpPr>
         <p:spPr>
           <a:xfrm>
-            <a:off x="838200" y="365125"/>
-            <a:ext cx="10515600" cy="826171"/>
+            <a:off x="838200" y="365126"/>
+            <a:ext cx="10515600" cy="716700"/>
           </a:xfrm>
-          <a:solidFill>
-            <a:schemeClr val="bg2"/>
-          </a:solidFill>
         </p:spPr>
         <p:txBody>
           <a:bodyPr/>
@@ -9381,234 +9379,52 @@
           <a:p>
             <a:r>
               <a:rPr lang="en-US" dirty="0"/>
-              <a:t>Epilogue</a:t>
-            </a:r>
-          </a:p>
-        </p:txBody>
-      </p:sp>
-      <p:sp>
-        <p:nvSpPr>
-          <p:cNvPr id="3" name="Content Placeholder 2">
-            <a:extLst>
-              <a:ext uri="{FF2B5EF4-FFF2-40B4-BE49-F238E27FC236}">
-                <a16:creationId xmlns:a16="http://schemas.microsoft.com/office/drawing/2014/main" id="{23118FAE-FDB5-4441-A2E3-3C1ADDC4A091}"/>
-              </a:ext>
-            </a:extLst>
-          </p:cNvPr>
-          <p:cNvSpPr>
-            <a:spLocks noGrp="1"/>
-          </p:cNvSpPr>
+              <a:t>Location of Resources</a:t>
+            </a:r>
+          </a:p>
+        </p:txBody>
+      </p:sp>
+      <p:pic>
+        <p:nvPicPr>
+          <p:cNvPr id="6" name="Content Placeholder 5" descr="A screenshot of a cell phone&#10;&#10;Description automatically generated">
+            <a:extLst>
+              <a:ext uri="{FF2B5EF4-FFF2-40B4-BE49-F238E27FC236}">
+                <a16:creationId xmlns:a16="http://schemas.microsoft.com/office/drawing/2014/main" id="{04625158-4F1C-44A8-A032-B506F200C21D}"/>
+              </a:ext>
+            </a:extLst>
+          </p:cNvPr>
+          <p:cNvPicPr>
+            <a:picLocks noGrp="1" noChangeAspect="1"/>
+          </p:cNvPicPr>
           <p:nvPr>
             <p:ph idx="1"/>
           </p:nvPr>
-        </p:nvSpPr>
+        </p:nvPicPr>
+        <p:blipFill>
+          <a:blip r:embed="rId2">
+            <a:extLst>
+              <a:ext uri="{28A0092B-C50C-407E-A947-70E740481C1C}">
+                <a14:useLocalDpi xmlns:a14="http://schemas.microsoft.com/office/drawing/2010/main" val="0"/>
+              </a:ext>
+            </a:extLst>
+          </a:blip>
+          <a:stretch>
+            <a:fillRect/>
+          </a:stretch>
+        </p:blipFill>
         <p:spPr>
           <a:xfrm>
-            <a:off x="838200" y="1448873"/>
-            <a:ext cx="10515600" cy="4650817"/>
+            <a:off x="1700011" y="1154740"/>
+            <a:ext cx="7861504" cy="5128695"/>
           </a:xfrm>
         </p:spPr>
-        <p:txBody>
-          <a:bodyPr>
-            <a:noAutofit/>
-          </a:bodyPr>
-          <a:lstStyle/>
-          <a:p>
-            <a:r>
-              <a:rPr lang="en-US" sz="2000" dirty="0"/>
-              <a:t>In this presentation we’ve discussed models for:</a:t>
-            </a:r>
-          </a:p>
-          <a:p>
-            <a:pPr marL="914400" lvl="1" indent="-457200">
-              <a:spcBef>
-                <a:spcPts val="0"/>
-              </a:spcBef>
-              <a:buFont typeface="+mj-lt"/>
-              <a:buAutoNum type="arabicPeriod"/>
-            </a:pPr>
-            <a:r>
-              <a:rPr lang="en-US" sz="1800" dirty="0"/>
-              <a:t>Code Structure</a:t>
-            </a:r>
-          </a:p>
-          <a:p>
-            <a:pPr marL="914400" lvl="1" indent="-457200">
-              <a:spcBef>
-                <a:spcPts val="0"/>
-              </a:spcBef>
-              <a:buFont typeface="+mj-lt"/>
-              <a:buAutoNum type="arabicPeriod"/>
-            </a:pPr>
-            <a:r>
-              <a:rPr lang="en-US" sz="1800" dirty="0"/>
-              <a:t>Compilation</a:t>
-            </a:r>
-          </a:p>
-          <a:p>
-            <a:pPr marL="914400" lvl="1" indent="-457200">
-              <a:spcBef>
-                <a:spcPts val="0"/>
-              </a:spcBef>
-              <a:buFont typeface="+mj-lt"/>
-              <a:buAutoNum type="arabicPeriod"/>
-            </a:pPr>
-            <a:r>
-              <a:rPr lang="en-US" sz="1800" dirty="0"/>
-              <a:t>Program Execution</a:t>
-            </a:r>
-          </a:p>
-          <a:p>
-            <a:pPr marL="914400" lvl="1" indent="-457200">
-              <a:spcBef>
-                <a:spcPts val="0"/>
-              </a:spcBef>
-              <a:buFont typeface="+mj-lt"/>
-              <a:buAutoNum type="arabicPeriod"/>
-            </a:pPr>
-            <a:r>
-              <a:rPr lang="en-US" sz="1800" dirty="0"/>
-              <a:t>Program use of Memory</a:t>
-            </a:r>
-          </a:p>
-          <a:p>
-            <a:pPr marL="914400" lvl="1" indent="-457200">
-              <a:spcBef>
-                <a:spcPts val="0"/>
-              </a:spcBef>
-              <a:buFont typeface="+mj-lt"/>
-              <a:buAutoNum type="arabicPeriod"/>
-            </a:pPr>
-            <a:r>
-              <a:rPr lang="en-US" sz="1800" dirty="0"/>
-              <a:t>Classes</a:t>
-            </a:r>
-          </a:p>
-          <a:p>
-            <a:pPr marL="914400" lvl="1" indent="-457200">
-              <a:spcBef>
-                <a:spcPts val="0"/>
-              </a:spcBef>
-              <a:buFont typeface="+mj-lt"/>
-              <a:buAutoNum type="arabicPeriod"/>
-            </a:pPr>
-            <a:r>
-              <a:rPr lang="en-US" sz="1800" dirty="0"/>
-              <a:t>C++ Objects</a:t>
-            </a:r>
-          </a:p>
-          <a:p>
-            <a:pPr marL="914400" lvl="1" indent="-457200">
-              <a:spcBef>
-                <a:spcPts val="0"/>
-              </a:spcBef>
-              <a:buFont typeface="+mj-lt"/>
-              <a:buAutoNum type="arabicPeriod"/>
-            </a:pPr>
-            <a:r>
-              <a:rPr lang="en-US" sz="1800" dirty="0"/>
-              <a:t>Templates</a:t>
-            </a:r>
-          </a:p>
-          <a:p>
-            <a:r>
-              <a:rPr lang="en-US" sz="2000" dirty="0"/>
-              <a:t>We’ve focused on models and ideas, not the details of design and syntax.</a:t>
-            </a:r>
-          </a:p>
-          <a:p>
-            <a:r>
-              <a:rPr lang="en-US" sz="2000" dirty="0"/>
-              <a:t>You can find an extended discussion of C++ in the </a:t>
-            </a:r>
-            <a:r>
-              <a:rPr lang="en-US" sz="2000" dirty="0" err="1"/>
-              <a:t>CppStory</a:t>
-            </a:r>
-            <a:r>
-              <a:rPr lang="en-US" sz="2000" dirty="0"/>
-              <a:t>:</a:t>
-            </a:r>
-            <a:br>
-              <a:rPr lang="en-US" sz="2000" dirty="0"/>
-            </a:br>
-            <a:r>
-              <a:rPr lang="en-US" sz="2000" dirty="0"/>
-              <a:t> 	</a:t>
-            </a:r>
-            <a:r>
-              <a:rPr lang="en-US" sz="2000" dirty="0">
-                <a:hlinkClick r:id="rId2"/>
-              </a:rPr>
-              <a:t>https://JimFawcett.github.io/CppStory_Prologue</a:t>
-            </a:r>
-            <a:endParaRPr lang="en-US" sz="2000" dirty="0"/>
-          </a:p>
-          <a:p>
-            <a:r>
-              <a:rPr lang="en-US" sz="2000" dirty="0"/>
-              <a:t>There is a lot of sample code for the </a:t>
-            </a:r>
-            <a:r>
-              <a:rPr lang="en-US" sz="2000" dirty="0" err="1"/>
-              <a:t>CppStory</a:t>
-            </a:r>
-            <a:r>
-              <a:rPr lang="en-US" sz="2000" dirty="0"/>
-              <a:t>:</a:t>
-            </a:r>
-            <a:br>
-              <a:rPr lang="en-US" sz="2000" dirty="0"/>
-            </a:br>
-            <a:r>
-              <a:rPr lang="en-US" sz="2000" dirty="0"/>
-              <a:t> 	</a:t>
-            </a:r>
-            <a:r>
-              <a:rPr lang="en-US" sz="2000" dirty="0">
-                <a:hlinkClick r:id="rId3"/>
-              </a:rPr>
-              <a:t>https://github.com/JimFawcett/CppStory</a:t>
-            </a:r>
-            <a:endParaRPr lang="en-US" sz="2000" dirty="0"/>
-          </a:p>
-          <a:p>
-            <a:r>
-              <a:rPr lang="en-US" sz="2000" dirty="0"/>
-              <a:t>With documentation:</a:t>
-            </a:r>
-            <a:br>
-              <a:rPr lang="en-US" sz="2000" dirty="0"/>
-            </a:br>
-            <a:r>
-              <a:rPr lang="en-US" sz="2000" dirty="0"/>
-              <a:t> 	</a:t>
-            </a:r>
-            <a:r>
-              <a:rPr lang="en-US" sz="2000" dirty="0">
-                <a:hlinkClick r:id="rId4"/>
-              </a:rPr>
-              <a:t>https://JimFawcett.github.io/CppStoryRepo.html</a:t>
-            </a:r>
-            <a:endParaRPr lang="en-US" sz="2000" dirty="0"/>
-          </a:p>
-          <a:p>
-            <a:pPr marL="0" indent="0">
-              <a:buNone/>
-            </a:pPr>
-            <a:endParaRPr lang="en-US" sz="2000" dirty="0"/>
-          </a:p>
-          <a:p>
-            <a:endParaRPr lang="en-US" sz="2000" dirty="0"/>
-          </a:p>
-        </p:txBody>
-      </p:sp>
+      </p:pic>
       <p:sp>
         <p:nvSpPr>
           <p:cNvPr id="4" name="Slide Number Placeholder 3">
             <a:extLst>
               <a:ext uri="{FF2B5EF4-FFF2-40B4-BE49-F238E27FC236}">
-                <a16:creationId xmlns:a16="http://schemas.microsoft.com/office/drawing/2014/main" id="{567B57B9-8602-4D27-B31D-EF8BC80A417B}"/>
+                <a16:creationId xmlns:a16="http://schemas.microsoft.com/office/drawing/2014/main" id="{870DFE9F-68FE-40ED-A8E3-FD2CA1D02F44}"/>
               </a:ext>
             </a:extLst>
           </p:cNvPr>
@@ -9635,7 +9451,7 @@
     </p:spTree>
     <p:extLst>
       <p:ext uri="{BB962C8B-B14F-4D97-AF65-F5344CB8AC3E}">
-        <p14:creationId xmlns:p14="http://schemas.microsoft.com/office/powerpoint/2010/main" val="1488313754"/>
+        <p14:creationId xmlns:p14="http://schemas.microsoft.com/office/powerpoint/2010/main" val="491707384"/>
       </p:ext>
     </p:extLst>
   </p:cSld>
@@ -10104,6 +9920,318 @@
     <p:extLst>
       <p:ext uri="{BB962C8B-B14F-4D97-AF65-F5344CB8AC3E}">
         <p14:creationId xmlns:p14="http://schemas.microsoft.com/office/powerpoint/2010/main" val="4051206534"/>
+      </p:ext>
+    </p:extLst>
+  </p:cSld>
+  <p:clrMapOvr>
+    <a:masterClrMapping/>
+  </p:clrMapOvr>
+</p:sld>
+</file>
+
+<file path=ppt/slides/slide30.xml><?xml version="1.0" encoding="utf-8"?>
+<p:sld xmlns:a="http://schemas.openxmlformats.org/drawingml/2006/main" xmlns:r="http://schemas.openxmlformats.org/officeDocument/2006/relationships" xmlns:p="http://schemas.openxmlformats.org/presentationml/2006/main">
+  <p:cSld>
+    <p:spTree>
+      <p:nvGrpSpPr>
+        <p:cNvPr id="1" name=""/>
+        <p:cNvGrpSpPr/>
+        <p:nvPr/>
+      </p:nvGrpSpPr>
+      <p:grpSpPr>
+        <a:xfrm>
+          <a:off x="0" y="0"/>
+          <a:ext cx="0" cy="0"/>
+          <a:chOff x="0" y="0"/>
+          <a:chExt cx="0" cy="0"/>
+        </a:xfrm>
+      </p:grpSpPr>
+      <p:sp>
+        <p:nvSpPr>
+          <p:cNvPr id="2" name="Title 1">
+            <a:extLst>
+              <a:ext uri="{FF2B5EF4-FFF2-40B4-BE49-F238E27FC236}">
+                <a16:creationId xmlns:a16="http://schemas.microsoft.com/office/drawing/2014/main" id="{44DA707B-1252-4D6A-A691-C5FA8ECEA2F2}"/>
+              </a:ext>
+            </a:extLst>
+          </p:cNvPr>
+          <p:cNvSpPr>
+            <a:spLocks noGrp="1"/>
+          </p:cNvSpPr>
+          <p:nvPr>
+            <p:ph type="title"/>
+          </p:nvPr>
+        </p:nvSpPr>
+        <p:spPr>
+          <a:xfrm>
+            <a:off x="838200" y="365125"/>
+            <a:ext cx="10515600" cy="826171"/>
+          </a:xfrm>
+          <a:solidFill>
+            <a:schemeClr val="bg2"/>
+          </a:solidFill>
+        </p:spPr>
+        <p:txBody>
+          <a:bodyPr/>
+          <a:lstStyle/>
+          <a:p>
+            <a:r>
+              <a:rPr lang="en-US" dirty="0"/>
+              <a:t>Epilogue</a:t>
+            </a:r>
+          </a:p>
+        </p:txBody>
+      </p:sp>
+      <p:sp>
+        <p:nvSpPr>
+          <p:cNvPr id="3" name="Content Placeholder 2">
+            <a:extLst>
+              <a:ext uri="{FF2B5EF4-FFF2-40B4-BE49-F238E27FC236}">
+                <a16:creationId xmlns:a16="http://schemas.microsoft.com/office/drawing/2014/main" id="{23118FAE-FDB5-4441-A2E3-3C1ADDC4A091}"/>
+              </a:ext>
+            </a:extLst>
+          </p:cNvPr>
+          <p:cNvSpPr>
+            <a:spLocks noGrp="1"/>
+          </p:cNvSpPr>
+          <p:nvPr>
+            <p:ph idx="1"/>
+          </p:nvPr>
+        </p:nvSpPr>
+        <p:spPr>
+          <a:xfrm>
+            <a:off x="838200" y="1448873"/>
+            <a:ext cx="10515600" cy="4650817"/>
+          </a:xfrm>
+        </p:spPr>
+        <p:txBody>
+          <a:bodyPr>
+            <a:noAutofit/>
+          </a:bodyPr>
+          <a:lstStyle/>
+          <a:p>
+            <a:r>
+              <a:rPr lang="en-US" sz="2000" dirty="0"/>
+              <a:t>In this presentation we’ve discussed models for:</a:t>
+            </a:r>
+          </a:p>
+          <a:p>
+            <a:pPr marL="914400" lvl="1" indent="-457200">
+              <a:spcBef>
+                <a:spcPts val="0"/>
+              </a:spcBef>
+              <a:buFont typeface="+mj-lt"/>
+              <a:buAutoNum type="arabicPeriod"/>
+            </a:pPr>
+            <a:r>
+              <a:rPr lang="en-US" sz="1800" dirty="0"/>
+              <a:t>Code Structure</a:t>
+            </a:r>
+          </a:p>
+          <a:p>
+            <a:pPr marL="914400" lvl="1" indent="-457200">
+              <a:spcBef>
+                <a:spcPts val="0"/>
+              </a:spcBef>
+              <a:buFont typeface="+mj-lt"/>
+              <a:buAutoNum type="arabicPeriod"/>
+            </a:pPr>
+            <a:r>
+              <a:rPr lang="en-US" sz="1800" dirty="0"/>
+              <a:t>Compilation</a:t>
+            </a:r>
+          </a:p>
+          <a:p>
+            <a:pPr marL="914400" lvl="1" indent="-457200">
+              <a:spcBef>
+                <a:spcPts val="0"/>
+              </a:spcBef>
+              <a:buFont typeface="+mj-lt"/>
+              <a:buAutoNum type="arabicPeriod"/>
+            </a:pPr>
+            <a:r>
+              <a:rPr lang="en-US" sz="1800" dirty="0"/>
+              <a:t>Program Execution</a:t>
+            </a:r>
+          </a:p>
+          <a:p>
+            <a:pPr marL="914400" lvl="1" indent="-457200">
+              <a:spcBef>
+                <a:spcPts val="0"/>
+              </a:spcBef>
+              <a:buFont typeface="+mj-lt"/>
+              <a:buAutoNum type="arabicPeriod"/>
+            </a:pPr>
+            <a:r>
+              <a:rPr lang="en-US" sz="1800" dirty="0"/>
+              <a:t>Program use of Memory</a:t>
+            </a:r>
+          </a:p>
+          <a:p>
+            <a:pPr marL="914400" lvl="1" indent="-457200">
+              <a:spcBef>
+                <a:spcPts val="0"/>
+              </a:spcBef>
+              <a:buFont typeface="+mj-lt"/>
+              <a:buAutoNum type="arabicPeriod"/>
+            </a:pPr>
+            <a:r>
+              <a:rPr lang="en-US" sz="1800" dirty="0"/>
+              <a:t>Classes</a:t>
+            </a:r>
+          </a:p>
+          <a:p>
+            <a:pPr marL="914400" lvl="1" indent="-457200">
+              <a:spcBef>
+                <a:spcPts val="0"/>
+              </a:spcBef>
+              <a:buFont typeface="+mj-lt"/>
+              <a:buAutoNum type="arabicPeriod"/>
+            </a:pPr>
+            <a:r>
+              <a:rPr lang="en-US" sz="1800" dirty="0"/>
+              <a:t>C++ Objects</a:t>
+            </a:r>
+          </a:p>
+          <a:p>
+            <a:pPr marL="914400" lvl="1" indent="-457200">
+              <a:spcBef>
+                <a:spcPts val="0"/>
+              </a:spcBef>
+              <a:buFont typeface="+mj-lt"/>
+              <a:buAutoNum type="arabicPeriod"/>
+            </a:pPr>
+            <a:r>
+              <a:rPr lang="en-US" sz="1800" dirty="0"/>
+              <a:t>Templates</a:t>
+            </a:r>
+          </a:p>
+          <a:p>
+            <a:r>
+              <a:rPr lang="en-US" sz="2000" dirty="0"/>
+              <a:t>We’ve focused on models and ideas, not the details of design and syntax.</a:t>
+            </a:r>
+          </a:p>
+          <a:p>
+            <a:r>
+              <a:rPr lang="en-US" sz="2000" dirty="0"/>
+              <a:t>You can find an extended discussion of C++ in the </a:t>
+            </a:r>
+            <a:r>
+              <a:rPr lang="en-US" sz="2000" dirty="0" err="1"/>
+              <a:t>CppStory</a:t>
+            </a:r>
+            <a:r>
+              <a:rPr lang="en-US" sz="2000" dirty="0"/>
+              <a:t>:</a:t>
+            </a:r>
+            <a:br>
+              <a:rPr lang="en-US" sz="2000" dirty="0"/>
+            </a:br>
+            <a:r>
+              <a:rPr lang="en-US" sz="2000" dirty="0"/>
+              <a:t> 	</a:t>
+            </a:r>
+            <a:r>
+              <a:rPr lang="en-US" sz="2000" dirty="0">
+                <a:hlinkClick r:id="rId2"/>
+              </a:rPr>
+              <a:t>https://JimFawcett.github.io/CppStory_Prologue</a:t>
+            </a:r>
+            <a:endParaRPr lang="en-US" sz="2000" dirty="0"/>
+          </a:p>
+          <a:p>
+            <a:r>
+              <a:rPr lang="en-US" sz="2000" dirty="0"/>
+              <a:t>There is a lot of sample code for the </a:t>
+            </a:r>
+            <a:r>
+              <a:rPr lang="en-US" sz="2000" dirty="0" err="1"/>
+              <a:t>CppStory</a:t>
+            </a:r>
+            <a:r>
+              <a:rPr lang="en-US" sz="2000" dirty="0"/>
+              <a:t>:</a:t>
+            </a:r>
+            <a:br>
+              <a:rPr lang="en-US" sz="2000" dirty="0"/>
+            </a:br>
+            <a:r>
+              <a:rPr lang="en-US" sz="2000" dirty="0"/>
+              <a:t> 	</a:t>
+            </a:r>
+            <a:r>
+              <a:rPr lang="en-US" sz="2000" dirty="0">
+                <a:hlinkClick r:id="rId3"/>
+              </a:rPr>
+              <a:t>https://github.com/JimFawcett/CppStory</a:t>
+            </a:r>
+            <a:endParaRPr lang="en-US" sz="2000" dirty="0"/>
+          </a:p>
+          <a:p>
+            <a:r>
+              <a:rPr lang="en-US" sz="2000" dirty="0"/>
+              <a:t>With documentation:</a:t>
+            </a:r>
+            <a:br>
+              <a:rPr lang="en-US" sz="2000" dirty="0"/>
+            </a:br>
+            <a:r>
+              <a:rPr lang="en-US" sz="2000" dirty="0"/>
+              <a:t> 	</a:t>
+            </a:r>
+            <a:r>
+              <a:rPr lang="en-US" sz="2000" dirty="0">
+                <a:hlinkClick r:id="rId4"/>
+              </a:rPr>
+              <a:t>https://JimFawcett.github.io/CppStoryRepo.html</a:t>
+            </a:r>
+            <a:endParaRPr lang="en-US" sz="2000" dirty="0"/>
+          </a:p>
+          <a:p>
+            <a:pPr marL="0" indent="0">
+              <a:buNone/>
+            </a:pPr>
+            <a:endParaRPr lang="en-US" sz="2000" dirty="0"/>
+          </a:p>
+          <a:p>
+            <a:endParaRPr lang="en-US" sz="2000" dirty="0"/>
+          </a:p>
+        </p:txBody>
+      </p:sp>
+      <p:sp>
+        <p:nvSpPr>
+          <p:cNvPr id="4" name="Slide Number Placeholder 3">
+            <a:extLst>
+              <a:ext uri="{FF2B5EF4-FFF2-40B4-BE49-F238E27FC236}">
+                <a16:creationId xmlns:a16="http://schemas.microsoft.com/office/drawing/2014/main" id="{567B57B9-8602-4D27-B31D-EF8BC80A417B}"/>
+              </a:ext>
+            </a:extLst>
+          </p:cNvPr>
+          <p:cNvSpPr>
+            <a:spLocks noGrp="1"/>
+          </p:cNvSpPr>
+          <p:nvPr>
+            <p:ph type="sldNum" sz="quarter" idx="12"/>
+          </p:nvPr>
+        </p:nvSpPr>
+        <p:spPr/>
+        <p:txBody>
+          <a:bodyPr/>
+          <a:lstStyle/>
+          <a:p>
+            <a:fld id="{519FA752-D1CF-498F-B0BD-05E47309CED3}" type="slidenum">
+              <a:rPr lang="en-US" smtClean="0"/>
+              <a:t>30</a:t>
+            </a:fld>
+            <a:endParaRPr lang="en-US"/>
+          </a:p>
+        </p:txBody>
+      </p:sp>
+    </p:spTree>
+    <p:extLst>
+      <p:ext uri="{BB962C8B-B14F-4D97-AF65-F5344CB8AC3E}">
+        <p14:creationId xmlns:p14="http://schemas.microsoft.com/office/powerpoint/2010/main" val="1488313754"/>
       </p:ext>
     </p:extLst>
   </p:cSld>

</xml_diff>

<commit_message>
changed wording on section sheets
</commit_message>
<xml_diff>
--- a/Resources/CppModels.pptx
+++ b/Resources/CppModels.pptx
@@ -5236,7 +5236,7 @@
             </a:br>
             <a:r>
               <a:rPr lang="en-US" sz="3600" dirty="0"/>
-              <a:t>Part 2 - Compilation</a:t>
+              <a:t>Model 2 - Compilation</a:t>
             </a:r>
             <a:endParaRPr lang="en-US" dirty="0"/>
           </a:p>
@@ -5850,7 +5850,7 @@
             </a:br>
             <a:r>
               <a:rPr lang="en-US" sz="3600" dirty="0"/>
-              <a:t>Part 3 - Execution</a:t>
+              <a:t>Model 3 - Execution</a:t>
             </a:r>
             <a:endParaRPr lang="en-US" dirty="0"/>
           </a:p>
@@ -6781,7 +6781,7 @@
             </a:br>
             <a:r>
               <a:rPr lang="en-US" sz="3600" dirty="0"/>
-              <a:t>Part 4 - Memory</a:t>
+              <a:t>Model 4 - Memory</a:t>
             </a:r>
             <a:endParaRPr lang="en-US" dirty="0"/>
           </a:p>
@@ -7276,7 +7276,7 @@
             </a:br>
             <a:r>
               <a:rPr lang="en-US" sz="3600" dirty="0"/>
-              <a:t>Part 5 - Classes</a:t>
+              <a:t>Model 5 - Classes</a:t>
             </a:r>
             <a:endParaRPr lang="en-US" dirty="0"/>
           </a:p>
@@ -8297,7 +8297,7 @@
             </a:br>
             <a:r>
               <a:rPr lang="en-US" sz="3600" dirty="0"/>
-              <a:t>Part 6 – Object Model</a:t>
+              <a:t>Model 6 – Object Model</a:t>
             </a:r>
             <a:endParaRPr lang="en-US" dirty="0"/>
           </a:p>
@@ -10185,7 +10185,7 @@
             </a:br>
             <a:r>
               <a:rPr lang="en-US" sz="3600" dirty="0"/>
-              <a:t>Part 7 – Polymorphism</a:t>
+              <a:t>Model 7 – Polymorphism</a:t>
             </a:r>
             <a:endParaRPr lang="en-US" dirty="0"/>
           </a:p>
@@ -11104,7 +11104,7 @@
             </a:br>
             <a:r>
               <a:rPr lang="en-US" sz="3600" dirty="0"/>
-              <a:t>Part 8 – Templates</a:t>
+              <a:t>Model 8 – Templates</a:t>
             </a:r>
             <a:endParaRPr lang="en-US" dirty="0"/>
           </a:p>
@@ -12959,7 +12959,7 @@
             </a:br>
             <a:r>
               <a:rPr lang="en-US" sz="3600" dirty="0"/>
-              <a:t>Part 1 – Code Structure</a:t>
+              <a:t>Model 1 – Code Structure</a:t>
             </a:r>
             <a:endParaRPr lang="en-US" dirty="0"/>
           </a:p>

</xml_diff>

<commit_message>
added template point class example
</commit_message>
<xml_diff>
--- a/Resources/CppModels.pptx
+++ b/Resources/CppModels.pptx
@@ -5,7 +5,7 @@
     <p:sldMasterId id="2147483648" r:id="rId1"/>
   </p:sldMasterIdLst>
   <p:notesMasterIdLst>
-    <p:notesMasterId r:id="rId44"/>
+    <p:notesMasterId r:id="rId45"/>
   </p:notesMasterIdLst>
   <p:sldIdLst>
     <p:sldId id="256" r:id="rId2"/>
@@ -44,12 +44,13 @@
     <p:sldId id="290" r:id="rId35"/>
     <p:sldId id="299" r:id="rId36"/>
     <p:sldId id="278" r:id="rId37"/>
-    <p:sldId id="279" r:id="rId38"/>
-    <p:sldId id="300" r:id="rId39"/>
-    <p:sldId id="281" r:id="rId40"/>
-    <p:sldId id="288" r:id="rId41"/>
-    <p:sldId id="268" r:id="rId42"/>
-    <p:sldId id="280" r:id="rId43"/>
+    <p:sldId id="301" r:id="rId38"/>
+    <p:sldId id="279" r:id="rId39"/>
+    <p:sldId id="300" r:id="rId40"/>
+    <p:sldId id="281" r:id="rId41"/>
+    <p:sldId id="288" r:id="rId42"/>
+    <p:sldId id="268" r:id="rId43"/>
+    <p:sldId id="280" r:id="rId44"/>
   </p:sldIdLst>
   <p:sldSz cx="12192000" cy="6858000"/>
   <p:notesSz cx="7010400" cy="9296400"/>
@@ -238,7 +239,7 @@
           <a:p>
             <a:fld id="{8B9DEAE6-0538-4445-AC69-E9546F37B6FF}" type="datetimeFigureOut">
               <a:rPr lang="en-US" smtClean="0"/>
-              <a:t>2/8/2020</a:t>
+              <a:t>2/9/2020</a:t>
             </a:fld>
             <a:endParaRPr lang="en-US"/>
           </a:p>
@@ -652,7 +653,7 @@
           <a:p>
             <a:fld id="{F59BA8CD-9D66-40F3-B663-5AE3FCC8E640}" type="datetime1">
               <a:rPr lang="en-US" smtClean="0"/>
-              <a:t>2/8/2020</a:t>
+              <a:t>2/9/2020</a:t>
             </a:fld>
             <a:endParaRPr lang="en-US"/>
           </a:p>
@@ -850,7 +851,7 @@
           <a:p>
             <a:fld id="{AE815081-8781-4CE2-BA8A-F30EB62592DB}" type="datetime1">
               <a:rPr lang="en-US" smtClean="0"/>
-              <a:t>2/8/2020</a:t>
+              <a:t>2/9/2020</a:t>
             </a:fld>
             <a:endParaRPr lang="en-US"/>
           </a:p>
@@ -1058,7 +1059,7 @@
           <a:p>
             <a:fld id="{1436B19E-3845-4454-9B00-81A37311B2DB}" type="datetime1">
               <a:rPr lang="en-US" smtClean="0"/>
-              <a:t>2/8/2020</a:t>
+              <a:t>2/9/2020</a:t>
             </a:fld>
             <a:endParaRPr lang="en-US"/>
           </a:p>
@@ -1256,7 +1257,7 @@
           <a:p>
             <a:fld id="{51BD0182-F02D-41FA-88F8-DAAE45FECD96}" type="datetime1">
               <a:rPr lang="en-US" smtClean="0"/>
-              <a:t>2/8/2020</a:t>
+              <a:t>2/9/2020</a:t>
             </a:fld>
             <a:endParaRPr lang="en-US"/>
           </a:p>
@@ -1531,7 +1532,7 @@
           <a:p>
             <a:fld id="{97DD5E3A-970B-45DB-AC65-C654B1C83769}" type="datetime1">
               <a:rPr lang="en-US" smtClean="0"/>
-              <a:t>2/8/2020</a:t>
+              <a:t>2/9/2020</a:t>
             </a:fld>
             <a:endParaRPr lang="en-US"/>
           </a:p>
@@ -1796,7 +1797,7 @@
           <a:p>
             <a:fld id="{A0C75F36-CE33-4D01-AEC1-8AE85EBDD5C0}" type="datetime1">
               <a:rPr lang="en-US" smtClean="0"/>
-              <a:t>2/8/2020</a:t>
+              <a:t>2/9/2020</a:t>
             </a:fld>
             <a:endParaRPr lang="en-US"/>
           </a:p>
@@ -2208,7 +2209,7 @@
           <a:p>
             <a:fld id="{2F12ED4E-FBDA-4929-861C-48D0B255396D}" type="datetime1">
               <a:rPr lang="en-US" smtClean="0"/>
-              <a:t>2/8/2020</a:t>
+              <a:t>2/9/2020</a:t>
             </a:fld>
             <a:endParaRPr lang="en-US"/>
           </a:p>
@@ -2349,7 +2350,7 @@
           <a:p>
             <a:fld id="{71274C8E-8698-45E5-8BD5-3125D835571A}" type="datetime1">
               <a:rPr lang="en-US" smtClean="0"/>
-              <a:t>2/8/2020</a:t>
+              <a:t>2/9/2020</a:t>
             </a:fld>
             <a:endParaRPr lang="en-US"/>
           </a:p>
@@ -2462,7 +2463,7 @@
           <a:p>
             <a:fld id="{EAAEADE5-9122-4DD1-9AF9-D9EE601260DA}" type="datetime1">
               <a:rPr lang="en-US" smtClean="0"/>
-              <a:t>2/8/2020</a:t>
+              <a:t>2/9/2020</a:t>
             </a:fld>
             <a:endParaRPr lang="en-US"/>
           </a:p>
@@ -2773,7 +2774,7 @@
           <a:p>
             <a:fld id="{AF0EE2CB-ACA5-4190-BF2E-27B23A7D63ED}" type="datetime1">
               <a:rPr lang="en-US" smtClean="0"/>
-              <a:t>2/8/2020</a:t>
+              <a:t>2/9/2020</a:t>
             </a:fld>
             <a:endParaRPr lang="en-US"/>
           </a:p>
@@ -3061,7 +3062,7 @@
           <a:p>
             <a:fld id="{8071D197-35A9-4BC6-A7E3-13AE8964F43E}" type="datetime1">
               <a:rPr lang="en-US" smtClean="0"/>
-              <a:t>2/8/2020</a:t>
+              <a:t>2/9/2020</a:t>
             </a:fld>
             <a:endParaRPr lang="en-US"/>
           </a:p>
@@ -3302,7 +3303,7 @@
           <a:p>
             <a:fld id="{A6174D4B-69CC-457D-9299-B97313C54882}" type="datetime1">
               <a:rPr lang="en-US" smtClean="0"/>
-              <a:t>2/8/2020</a:t>
+              <a:t>2/9/2020</a:t>
             </a:fld>
             <a:endParaRPr lang="en-US"/>
           </a:p>
@@ -4174,8 +4175,8 @@
         </p:nvSpPr>
         <p:spPr>
           <a:xfrm>
-            <a:off x="839788" y="1577662"/>
-            <a:ext cx="4530702" cy="4291326"/>
+            <a:off x="839787" y="1223493"/>
+            <a:ext cx="5573891" cy="5132857"/>
           </a:xfrm>
         </p:spPr>
         <p:txBody>
@@ -4189,7 +4190,7 @@
               <a:buChar char="•"/>
             </a:pPr>
             <a:r>
-              <a:rPr lang="en-US" sz="1800" dirty="0"/>
+              <a:rPr lang="en-US" sz="2000" dirty="0"/>
               <a:t>This diagram shows classes that are defined in each of the files from the previous slide.</a:t>
             </a:r>
           </a:p>
@@ -4199,26 +4200,26 @@
               <a:buChar char="•"/>
             </a:pPr>
             <a:r>
-              <a:rPr lang="en-US" sz="1600" dirty="0" err="1"/>
+              <a:rPr lang="en-US" sz="1800" dirty="0" err="1"/>
               <a:t>IComponent_A</a:t>
             </a:r>
             <a:r>
-              <a:rPr lang="en-US" sz="1600" dirty="0"/>
+              <a:rPr lang="en-US" sz="1800" dirty="0"/>
               <a:t> is an interface</a:t>
             </a:r>
             <a:r>
-              <a:rPr lang="en-US" sz="1600" baseline="30000" dirty="0"/>
+              <a:rPr lang="en-US" sz="1800" baseline="30000" dirty="0"/>
               <a:t>1</a:t>
             </a:r>
             <a:r>
-              <a:rPr lang="en-US" sz="1600" dirty="0"/>
+              <a:rPr lang="en-US" sz="1800" dirty="0"/>
               <a:t> for </a:t>
             </a:r>
             <a:r>
-              <a:rPr lang="en-US" sz="1600" dirty="0" err="1"/>
+              <a:rPr lang="en-US" sz="1800" dirty="0" err="1"/>
               <a:t>Component_A</a:t>
             </a:r>
-            <a:endParaRPr lang="en-US" sz="1600" dirty="0"/>
+            <a:endParaRPr lang="en-US" sz="1800" dirty="0"/>
           </a:p>
           <a:p>
             <a:pPr marL="742950" lvl="1" indent="-285750">
@@ -4226,11 +4227,11 @@
               <a:buChar char="•"/>
             </a:pPr>
             <a:r>
-              <a:rPr lang="en-US" sz="1600" dirty="0" err="1"/>
+              <a:rPr lang="en-US" sz="1800" dirty="0" err="1"/>
               <a:t>Component_A</a:t>
             </a:r>
             <a:r>
-              <a:rPr lang="en-US" sz="1600" dirty="0"/>
+              <a:rPr lang="en-US" sz="1800" dirty="0"/>
               <a:t> implements the interface to provide exported services</a:t>
             </a:r>
           </a:p>
@@ -4240,11 +4241,11 @@
               <a:buChar char="•"/>
             </a:pPr>
             <a:r>
-              <a:rPr lang="en-US" sz="1600" dirty="0" err="1"/>
+              <a:rPr lang="en-US" sz="1800" dirty="0" err="1"/>
               <a:t>Component_B</a:t>
             </a:r>
             <a:r>
-              <a:rPr lang="en-US" sz="1600" dirty="0"/>
+              <a:rPr lang="en-US" sz="1800" dirty="0"/>
               <a:t> doesn’t provide an interface, composes class Helper</a:t>
             </a:r>
           </a:p>
@@ -4254,23 +4255,23 @@
               <a:buChar char="•"/>
             </a:pPr>
             <a:r>
-              <a:rPr lang="en-US" sz="1600" dirty="0" err="1"/>
+              <a:rPr lang="en-US" sz="1800" dirty="0" err="1"/>
               <a:t>Component_B</a:t>
             </a:r>
             <a:r>
-              <a:rPr lang="en-US" sz="1600" dirty="0"/>
+              <a:rPr lang="en-US" sz="1800" dirty="0"/>
               <a:t> uses </a:t>
             </a:r>
             <a:r>
-              <a:rPr lang="en-US" sz="1600" dirty="0" err="1"/>
+              <a:rPr lang="en-US" sz="1800" dirty="0" err="1"/>
               <a:t>Component_A</a:t>
             </a:r>
             <a:r>
-              <a:rPr lang="en-US" sz="1600" dirty="0"/>
+              <a:rPr lang="en-US" sz="1800" dirty="0"/>
               <a:t> through its interface and factory</a:t>
             </a:r>
             <a:r>
-              <a:rPr lang="en-US" sz="1600" baseline="30000" dirty="0"/>
+              <a:rPr lang="en-US" sz="1800" baseline="30000" dirty="0"/>
               <a:t>2</a:t>
             </a:r>
           </a:p>
@@ -4280,26 +4281,29 @@
               <a:buChar char="•"/>
             </a:pPr>
             <a:r>
-              <a:rPr lang="en-US" sz="1600" dirty="0"/>
+              <a:rPr lang="en-US" sz="1800" dirty="0"/>
               <a:t>Executive uses </a:t>
             </a:r>
             <a:r>
-              <a:rPr lang="en-US" sz="1600" dirty="0" err="1"/>
+              <a:rPr lang="en-US" sz="1800" dirty="0" err="1"/>
               <a:t>Component_A</a:t>
             </a:r>
             <a:r>
-              <a:rPr lang="en-US" sz="1600" dirty="0"/>
+              <a:rPr lang="en-US" sz="1800" dirty="0"/>
               <a:t> through its interface, composes </a:t>
             </a:r>
             <a:r>
-              <a:rPr lang="en-US" sz="1600" dirty="0" err="1"/>
+              <a:rPr lang="en-US" sz="1800" dirty="0" err="1"/>
               <a:t>Component_B</a:t>
             </a:r>
-            <a:endParaRPr lang="en-US" sz="1600" dirty="0"/>
+            <a:br>
+              <a:rPr lang="en-US" sz="1800" dirty="0"/>
+            </a:br>
+            <a:endParaRPr lang="en-US" sz="300" dirty="0"/>
           </a:p>
           <a:p>
             <a:pPr lvl="1"/>
-            <a:endParaRPr lang="en-US" sz="1600" dirty="0"/>
+            <a:endParaRPr lang="en-US" sz="300" dirty="0"/>
           </a:p>
           <a:p>
             <a:pPr marL="800100" lvl="1" indent="-342900">
@@ -4307,7 +4311,7 @@
               <a:buAutoNum type="arabicPeriod"/>
             </a:pPr>
             <a:r>
-              <a:rPr lang="en-US" sz="1200" dirty="0"/>
+              <a:rPr lang="en-US" dirty="0"/>
               <a:t>C++ does not have an interface construct.  We use structs with pure virtual functions for that purpose.</a:t>
             </a:r>
           </a:p>
@@ -4317,19 +4321,19 @@
               <a:buAutoNum type="arabicPeriod"/>
             </a:pPr>
             <a:r>
-              <a:rPr lang="en-US" sz="1200" dirty="0" err="1"/>
+              <a:rPr lang="en-US" dirty="0" err="1"/>
               <a:t>Component_A’s</a:t>
             </a:r>
             <a:r>
-              <a:rPr lang="en-US" sz="1200" dirty="0"/>
+              <a:rPr lang="en-US" dirty="0"/>
               <a:t> factory is implemented with a function, declared in </a:t>
             </a:r>
             <a:r>
-              <a:rPr lang="en-US" sz="1200" dirty="0" err="1"/>
+              <a:rPr lang="en-US" dirty="0" err="1"/>
               <a:t>IComponent_A.h</a:t>
             </a:r>
             <a:r>
-              <a:rPr lang="en-US" sz="1200" dirty="0"/>
+              <a:rPr lang="en-US" dirty="0"/>
               <a:t>. and implemented in Component_A.cpp</a:t>
             </a:r>
           </a:p>
@@ -4344,13 +4348,15 @@
               </a:ext>
             </a:extLst>
           </p:cNvPr>
-          <p:cNvCxnSpPr/>
+          <p:cNvCxnSpPr>
+            <a:cxnSpLocks/>
+          </p:cNvCxnSpPr>
           <p:nvPr/>
         </p:nvCxnSpPr>
         <p:spPr>
           <a:xfrm>
-            <a:off x="1378039" y="4823138"/>
-            <a:ext cx="3561009" cy="0"/>
+            <a:off x="1378039" y="4456091"/>
+            <a:ext cx="4623516" cy="0"/>
           </a:xfrm>
           <a:prstGeom prst="line">
             <a:avLst/>
@@ -4430,7 +4436,7 @@
         </p:blipFill>
         <p:spPr>
           <a:xfrm>
-            <a:off x="5892800" y="1709737"/>
+            <a:off x="6599237" y="1114023"/>
             <a:ext cx="4752975" cy="3429000"/>
           </a:xfrm>
         </p:spPr>
@@ -11382,7 +11388,7 @@
           <p:cNvPr id="2" name="Title 1">
             <a:extLst>
               <a:ext uri="{FF2B5EF4-FFF2-40B4-BE49-F238E27FC236}">
-                <a16:creationId xmlns:a16="http://schemas.microsoft.com/office/drawing/2014/main" id="{30028667-E31F-4A7E-9286-305266991DEB}"/>
+                <a16:creationId xmlns:a16="http://schemas.microsoft.com/office/drawing/2014/main" id="{655A1900-BB83-4AF3-B5B4-2B0482F3015C}"/>
               </a:ext>
             </a:extLst>
           </p:cNvPr>
@@ -11395,8 +11401,8 @@
         </p:nvSpPr>
         <p:spPr>
           <a:xfrm>
-            <a:off x="838200" y="365126"/>
-            <a:ext cx="10515600" cy="716700"/>
+            <a:off x="838200" y="365125"/>
+            <a:ext cx="10411496" cy="658745"/>
           </a:xfrm>
         </p:spPr>
         <p:txBody>
@@ -11405,7 +11411,7 @@
           <a:p>
             <a:r>
               <a:rPr lang="en-US" dirty="0"/>
-              <a:t>Template overloads and Specialization</a:t>
+              <a:t>Template Class Example</a:t>
             </a:r>
           </a:p>
         </p:txBody>
@@ -11415,7 +11421,7 @@
           <p:cNvPr id="3" name="Content Placeholder 2">
             <a:extLst>
               <a:ext uri="{FF2B5EF4-FFF2-40B4-BE49-F238E27FC236}">
-                <a16:creationId xmlns:a16="http://schemas.microsoft.com/office/drawing/2014/main" id="{98868B1E-11F2-477A-86C6-87767FE8E13B}"/>
+                <a16:creationId xmlns:a16="http://schemas.microsoft.com/office/drawing/2014/main" id="{004EA73D-8E7B-4A0E-B378-FD2136A65F61}"/>
               </a:ext>
             </a:extLst>
           </p:cNvPr>
@@ -11428,95 +11434,457 @@
         </p:nvSpPr>
         <p:spPr>
           <a:xfrm>
-            <a:off x="838200" y="1210614"/>
-            <a:ext cx="7088746" cy="5282260"/>
+            <a:off x="637504" y="1300767"/>
+            <a:ext cx="5382296" cy="4876196"/>
           </a:xfrm>
         </p:spPr>
         <p:txBody>
           <a:bodyPr>
-            <a:normAutofit/>
+            <a:noAutofit/>
           </a:bodyPr>
           <a:lstStyle/>
           <a:p>
-            <a:r>
-              <a:rPr lang="en-US" sz="2000" dirty="0"/>
-              <a:t>Template specification provides a pattern for generating specific code for a function or class.</a:t>
-            </a:r>
-          </a:p>
-          <a:p>
-            <a:r>
-              <a:rPr lang="en-US" sz="2000" dirty="0"/>
-              <a:t>That gets instantiated by something close to substitution, subject to type deduction for classes or overload resolution for functions.</a:t>
-            </a:r>
-          </a:p>
-          <a:p>
-            <a:r>
-              <a:rPr lang="en-US" sz="2000" dirty="0"/>
-              <a:t>That may work well for most of the types an application uses but may fail for one or more specific types.</a:t>
-            </a:r>
-          </a:p>
-          <a:p>
-            <a:r>
-              <a:rPr lang="en-US" sz="2000" dirty="0"/>
-              <a:t>In that case, a function may be defined for specific type(s) that has modified code.  C++ guarantees that the overload will be chosen if the application supplied type matches the overload.</a:t>
-            </a:r>
-          </a:p>
-          <a:p>
-            <a:r>
-              <a:rPr lang="en-US" sz="2000" dirty="0"/>
-              <a:t>Similarly, a class may be defined for specific type(s) that has modified code.  The language guarantees that the specialization will be chosen, instead of the generic class, if the application type matches the specialization, using template type deduction.</a:t>
-            </a:r>
-          </a:p>
-          <a:p>
-            <a:r>
-              <a:rPr lang="en-US" sz="2000" dirty="0"/>
-              <a:t>A designer may provide any number of overloads and specializations as needed by the application.</a:t>
-            </a:r>
-          </a:p>
-        </p:txBody>
-      </p:sp>
-      <p:pic>
-        <p:nvPicPr>
-          <p:cNvPr id="5" name="Picture 4" descr="A close up of a logo&#10;&#10;Description automatically generated">
-            <a:extLst>
-              <a:ext uri="{FF2B5EF4-FFF2-40B4-BE49-F238E27FC236}">
-                <a16:creationId xmlns:a16="http://schemas.microsoft.com/office/drawing/2014/main" id="{40FA6717-FC5A-4DD6-AB58-50A2D1FB812A}"/>
-              </a:ext>
-            </a:extLst>
-          </p:cNvPr>
-          <p:cNvPicPr>
-            <a:picLocks noChangeAspect="1"/>
-          </p:cNvPicPr>
-          <p:nvPr/>
-        </p:nvPicPr>
-        <p:blipFill>
-          <a:blip r:embed="rId2">
-            <a:extLst>
-              <a:ext uri="{28A0092B-C50C-407E-A947-70E740481C1C}">
-                <a14:useLocalDpi xmlns:a14="http://schemas.microsoft.com/office/drawing/2010/main" val="0"/>
-              </a:ext>
-            </a:extLst>
-          </a:blip>
-          <a:stretch>
-            <a:fillRect/>
-          </a:stretch>
-        </p:blipFill>
-        <p:spPr>
-          <a:xfrm>
-            <a:off x="8004215" y="1435994"/>
-            <a:ext cx="3522105" cy="3103809"/>
-          </a:xfrm>
-          <a:prstGeom prst="rect">
-            <a:avLst/>
-          </a:prstGeom>
-        </p:spPr>
-      </p:pic>
-      <p:sp>
-        <p:nvSpPr>
-          <p:cNvPr id="4" name="Slide Number Placeholder 3">
-            <a:extLst>
-              <a:ext uri="{FF2B5EF4-FFF2-40B4-BE49-F238E27FC236}">
-                <a16:creationId xmlns:a16="http://schemas.microsoft.com/office/drawing/2014/main" id="{C1CAA9E7-9EB6-4398-9D47-854F0AA46E50}"/>
+            <a:pPr marL="0" indent="0">
+              <a:spcBef>
+                <a:spcPts val="0"/>
+              </a:spcBef>
+              <a:buNone/>
+            </a:pPr>
+            <a:r>
+              <a:rPr lang="en-US" sz="1400" b="1" dirty="0">
+                <a:latin typeface="Consolas" panose="020B0609020204030204" pitchFamily="49" charset="0"/>
+              </a:rPr>
+              <a:t>template&lt;</a:t>
+            </a:r>
+            <a:r>
+              <a:rPr lang="en-US" sz="1400" b="1" dirty="0" err="1">
+                <a:latin typeface="Consolas" panose="020B0609020204030204" pitchFamily="49" charset="0"/>
+              </a:rPr>
+              <a:t>typename</a:t>
+            </a:r>
+            <a:r>
+              <a:rPr lang="en-US" sz="1400" b="1" dirty="0">
+                <a:latin typeface="Consolas" panose="020B0609020204030204" pitchFamily="49" charset="0"/>
+              </a:rPr>
+              <a:t> T&gt;</a:t>
+            </a:r>
+          </a:p>
+          <a:p>
+            <a:pPr marL="0" indent="0">
+              <a:spcBef>
+                <a:spcPts val="0"/>
+              </a:spcBef>
+              <a:buNone/>
+            </a:pPr>
+            <a:r>
+              <a:rPr lang="en-US" sz="1400" b="1" dirty="0">
+                <a:latin typeface="Consolas" panose="020B0609020204030204" pitchFamily="49" charset="0"/>
+              </a:rPr>
+              <a:t>class Point {</a:t>
+            </a:r>
+          </a:p>
+          <a:p>
+            <a:pPr marL="0" indent="0">
+              <a:spcBef>
+                <a:spcPts val="0"/>
+              </a:spcBef>
+              <a:buNone/>
+            </a:pPr>
+            <a:r>
+              <a:rPr lang="en-US" sz="1400" b="1" dirty="0">
+                <a:latin typeface="Consolas" panose="020B0609020204030204" pitchFamily="49" charset="0"/>
+              </a:rPr>
+              <a:t>public:</a:t>
+            </a:r>
+          </a:p>
+          <a:p>
+            <a:pPr marL="0" indent="0">
+              <a:spcBef>
+                <a:spcPts val="0"/>
+              </a:spcBef>
+              <a:buNone/>
+            </a:pPr>
+            <a:r>
+              <a:rPr lang="en-US" sz="1400" b="1" dirty="0">
+                <a:latin typeface="Consolas" panose="020B0609020204030204" pitchFamily="49" charset="0"/>
+              </a:rPr>
+              <a:t>  using iterator = </a:t>
+            </a:r>
+            <a:r>
+              <a:rPr lang="en-US" sz="1400" b="1" dirty="0" err="1">
+                <a:latin typeface="Consolas" panose="020B0609020204030204" pitchFamily="49" charset="0"/>
+              </a:rPr>
+              <a:t>typename</a:t>
+            </a:r>
+            <a:r>
+              <a:rPr lang="en-US" sz="1400" b="1" dirty="0">
+                <a:latin typeface="Consolas" panose="020B0609020204030204" pitchFamily="49" charset="0"/>
+              </a:rPr>
+              <a:t> std::vector&lt;T&gt;::iterator;</a:t>
+            </a:r>
+          </a:p>
+          <a:p>
+            <a:pPr marL="0" indent="0">
+              <a:spcBef>
+                <a:spcPts val="0"/>
+              </a:spcBef>
+              <a:buNone/>
+            </a:pPr>
+            <a:r>
+              <a:rPr lang="en-US" sz="1400" b="1" dirty="0">
+                <a:latin typeface="Consolas" panose="020B0609020204030204" pitchFamily="49" charset="0"/>
+              </a:rPr>
+              <a:t>  using </a:t>
+            </a:r>
+            <a:r>
+              <a:rPr lang="en-US" sz="1400" b="1" dirty="0" err="1">
+                <a:latin typeface="Consolas" panose="020B0609020204030204" pitchFamily="49" charset="0"/>
+              </a:rPr>
+              <a:t>const_iterator</a:t>
+            </a:r>
+            <a:r>
+              <a:rPr lang="en-US" sz="1400" b="1" dirty="0">
+                <a:latin typeface="Consolas" panose="020B0609020204030204" pitchFamily="49" charset="0"/>
+              </a:rPr>
+              <a:t> = </a:t>
+            </a:r>
+            <a:r>
+              <a:rPr lang="en-US" sz="1400" b="1" dirty="0" err="1">
+                <a:latin typeface="Consolas" panose="020B0609020204030204" pitchFamily="49" charset="0"/>
+              </a:rPr>
+              <a:t>typename</a:t>
+            </a:r>
+            <a:r>
+              <a:rPr lang="en-US" sz="1400" b="1" dirty="0">
+                <a:latin typeface="Consolas" panose="020B0609020204030204" pitchFamily="49" charset="0"/>
+              </a:rPr>
+              <a:t> std::vector&lt;T&gt;::</a:t>
+            </a:r>
+            <a:r>
+              <a:rPr lang="en-US" sz="1400" b="1" dirty="0" err="1">
+                <a:latin typeface="Consolas" panose="020B0609020204030204" pitchFamily="49" charset="0"/>
+              </a:rPr>
+              <a:t>const_iterator</a:t>
+            </a:r>
+            <a:r>
+              <a:rPr lang="en-US" sz="1400" b="1" dirty="0">
+                <a:latin typeface="Consolas" panose="020B0609020204030204" pitchFamily="49" charset="0"/>
+              </a:rPr>
+              <a:t>;</a:t>
+            </a:r>
+          </a:p>
+          <a:p>
+            <a:pPr marL="0" indent="0">
+              <a:spcBef>
+                <a:spcPts val="0"/>
+              </a:spcBef>
+              <a:buNone/>
+            </a:pPr>
+            <a:endParaRPr lang="en-US" sz="1400" b="1" dirty="0">
+              <a:latin typeface="Consolas" panose="020B0609020204030204" pitchFamily="49" charset="0"/>
+            </a:endParaRPr>
+          </a:p>
+          <a:p>
+            <a:pPr marL="0" indent="0">
+              <a:spcBef>
+                <a:spcPts val="0"/>
+              </a:spcBef>
+              <a:buNone/>
+            </a:pPr>
+            <a:r>
+              <a:rPr lang="en-US" sz="1400" b="1" dirty="0">
+                <a:latin typeface="Consolas" panose="020B0609020204030204" pitchFamily="49" charset="0"/>
+              </a:rPr>
+              <a:t>  Point(</a:t>
+            </a:r>
+            <a:r>
+              <a:rPr lang="en-US" sz="1400" b="1" dirty="0" err="1">
+                <a:latin typeface="Consolas" panose="020B0609020204030204" pitchFamily="49" charset="0"/>
+              </a:rPr>
+              <a:t>size_t</a:t>
+            </a:r>
+            <a:r>
+              <a:rPr lang="en-US" sz="1400" b="1" dirty="0">
+                <a:latin typeface="Consolas" panose="020B0609020204030204" pitchFamily="49" charset="0"/>
+              </a:rPr>
+              <a:t> N, const std::string&amp; name = "none");</a:t>
+            </a:r>
+          </a:p>
+          <a:p>
+            <a:pPr marL="0" indent="0">
+              <a:spcBef>
+                <a:spcPts val="0"/>
+              </a:spcBef>
+              <a:buNone/>
+            </a:pPr>
+            <a:r>
+              <a:rPr lang="fr-FR" sz="1400" b="1" dirty="0">
+                <a:latin typeface="Consolas" panose="020B0609020204030204" pitchFamily="49" charset="0"/>
+              </a:rPr>
+              <a:t>  Point(std::</a:t>
+            </a:r>
+            <a:r>
+              <a:rPr lang="fr-FR" sz="1400" b="1" dirty="0" err="1">
+                <a:latin typeface="Consolas" panose="020B0609020204030204" pitchFamily="49" charset="0"/>
+              </a:rPr>
+              <a:t>initializer_list</a:t>
+            </a:r>
+            <a:r>
+              <a:rPr lang="fr-FR" sz="1400" b="1" dirty="0">
+                <a:latin typeface="Consolas" panose="020B0609020204030204" pitchFamily="49" charset="0"/>
+              </a:rPr>
+              <a:t>&lt;double&gt; il);</a:t>
+            </a:r>
+          </a:p>
+          <a:p>
+            <a:pPr marL="0" indent="0">
+              <a:spcBef>
+                <a:spcPts val="0"/>
+              </a:spcBef>
+              <a:buNone/>
+            </a:pPr>
+            <a:r>
+              <a:rPr lang="en-US" sz="1400" b="1" dirty="0">
+                <a:latin typeface="Consolas" panose="020B0609020204030204" pitchFamily="49" charset="0"/>
+              </a:rPr>
+              <a:t>  void name(const std::string&amp; name);</a:t>
+            </a:r>
+          </a:p>
+          <a:p>
+            <a:pPr marL="0" indent="0">
+              <a:spcBef>
+                <a:spcPts val="0"/>
+              </a:spcBef>
+              <a:buNone/>
+            </a:pPr>
+            <a:r>
+              <a:rPr lang="en-US" sz="1400" b="1" dirty="0">
+                <a:latin typeface="Consolas" panose="020B0609020204030204" pitchFamily="49" charset="0"/>
+              </a:rPr>
+              <a:t>  std::string name() const;</a:t>
+            </a:r>
+          </a:p>
+          <a:p>
+            <a:pPr marL="0" indent="0">
+              <a:spcBef>
+                <a:spcPts val="0"/>
+              </a:spcBef>
+              <a:buNone/>
+            </a:pPr>
+            <a:r>
+              <a:rPr lang="de-DE" sz="1400" b="1" dirty="0">
+                <a:latin typeface="Consolas" panose="020B0609020204030204" pitchFamily="49" charset="0"/>
+              </a:rPr>
+              <a:t>  T&amp; operator[](size_t i);</a:t>
+            </a:r>
+          </a:p>
+          <a:p>
+            <a:pPr marL="0" indent="0">
+              <a:spcBef>
+                <a:spcPts val="0"/>
+              </a:spcBef>
+              <a:buNone/>
+            </a:pPr>
+            <a:r>
+              <a:rPr lang="en-US" sz="1400" b="1" dirty="0">
+                <a:latin typeface="Consolas" panose="020B0609020204030204" pitchFamily="49" charset="0"/>
+              </a:rPr>
+              <a:t>  T operator[](</a:t>
+            </a:r>
+            <a:r>
+              <a:rPr lang="en-US" sz="1400" b="1" dirty="0" err="1">
+                <a:latin typeface="Consolas" panose="020B0609020204030204" pitchFamily="49" charset="0"/>
+              </a:rPr>
+              <a:t>size_t</a:t>
+            </a:r>
+            <a:r>
+              <a:rPr lang="en-US" sz="1400" b="1" dirty="0">
+                <a:latin typeface="Consolas" panose="020B0609020204030204" pitchFamily="49" charset="0"/>
+              </a:rPr>
+              <a:t> i) const;</a:t>
+            </a:r>
+          </a:p>
+          <a:p>
+            <a:pPr marL="0" indent="0">
+              <a:spcBef>
+                <a:spcPts val="0"/>
+              </a:spcBef>
+              <a:buNone/>
+            </a:pPr>
+            <a:r>
+              <a:rPr lang="en-US" sz="1400" b="1" dirty="0">
+                <a:latin typeface="Consolas" panose="020B0609020204030204" pitchFamily="49" charset="0"/>
+              </a:rPr>
+              <a:t>  </a:t>
+            </a:r>
+            <a:r>
+              <a:rPr lang="en-US" sz="1400" b="1" dirty="0" err="1">
+                <a:latin typeface="Consolas" panose="020B0609020204030204" pitchFamily="49" charset="0"/>
+              </a:rPr>
+              <a:t>size_t</a:t>
+            </a:r>
+            <a:r>
+              <a:rPr lang="en-US" sz="1400" b="1" dirty="0">
+                <a:latin typeface="Consolas" panose="020B0609020204030204" pitchFamily="49" charset="0"/>
+              </a:rPr>
+              <a:t> size() const;</a:t>
+            </a:r>
+          </a:p>
+          <a:p>
+            <a:pPr marL="0" indent="0">
+              <a:spcBef>
+                <a:spcPts val="0"/>
+              </a:spcBef>
+              <a:buNone/>
+            </a:pPr>
+            <a:r>
+              <a:rPr lang="en-US" sz="1400" b="1" dirty="0">
+                <a:latin typeface="Consolas" panose="020B0609020204030204" pitchFamily="49" charset="0"/>
+              </a:rPr>
+              <a:t>  iterator begin();</a:t>
+            </a:r>
+          </a:p>
+          <a:p>
+            <a:pPr marL="0" indent="0">
+              <a:spcBef>
+                <a:spcPts val="0"/>
+              </a:spcBef>
+              <a:buNone/>
+            </a:pPr>
+            <a:r>
+              <a:rPr lang="en-US" sz="1400" b="1" dirty="0">
+                <a:latin typeface="Consolas" panose="020B0609020204030204" pitchFamily="49" charset="0"/>
+              </a:rPr>
+              <a:t>  iterator end();</a:t>
+            </a:r>
+          </a:p>
+          <a:p>
+            <a:pPr marL="0" indent="0">
+              <a:spcBef>
+                <a:spcPts val="0"/>
+              </a:spcBef>
+              <a:buNone/>
+            </a:pPr>
+            <a:r>
+              <a:rPr lang="en-US" sz="1400" b="1" dirty="0">
+                <a:latin typeface="Consolas" panose="020B0609020204030204" pitchFamily="49" charset="0"/>
+              </a:rPr>
+              <a:t>  </a:t>
+            </a:r>
+            <a:r>
+              <a:rPr lang="en-US" sz="1400" b="1" dirty="0" err="1">
+                <a:latin typeface="Consolas" panose="020B0609020204030204" pitchFamily="49" charset="0"/>
+              </a:rPr>
+              <a:t>const_iterator</a:t>
+            </a:r>
+            <a:r>
+              <a:rPr lang="en-US" sz="1400" b="1" dirty="0">
+                <a:latin typeface="Consolas" panose="020B0609020204030204" pitchFamily="49" charset="0"/>
+              </a:rPr>
+              <a:t> begin() const;</a:t>
+            </a:r>
+          </a:p>
+          <a:p>
+            <a:pPr marL="0" indent="0">
+              <a:spcBef>
+                <a:spcPts val="0"/>
+              </a:spcBef>
+              <a:buNone/>
+            </a:pPr>
+            <a:r>
+              <a:rPr lang="en-US" sz="1400" b="1" dirty="0">
+                <a:latin typeface="Consolas" panose="020B0609020204030204" pitchFamily="49" charset="0"/>
+              </a:rPr>
+              <a:t>  </a:t>
+            </a:r>
+            <a:r>
+              <a:rPr lang="en-US" sz="1400" b="1" dirty="0" err="1">
+                <a:latin typeface="Consolas" panose="020B0609020204030204" pitchFamily="49" charset="0"/>
+              </a:rPr>
+              <a:t>const_iterator</a:t>
+            </a:r>
+            <a:r>
+              <a:rPr lang="en-US" sz="1400" b="1" dirty="0">
+                <a:latin typeface="Consolas" panose="020B0609020204030204" pitchFamily="49" charset="0"/>
+              </a:rPr>
+              <a:t> end() const;</a:t>
+            </a:r>
+          </a:p>
+          <a:p>
+            <a:pPr marL="0" indent="0">
+              <a:spcBef>
+                <a:spcPts val="0"/>
+              </a:spcBef>
+              <a:buNone/>
+            </a:pPr>
+            <a:r>
+              <a:rPr lang="en-US" sz="1400" b="1" dirty="0">
+                <a:latin typeface="Consolas" panose="020B0609020204030204" pitchFamily="49" charset="0"/>
+              </a:rPr>
+              <a:t>private:</a:t>
+            </a:r>
+          </a:p>
+          <a:p>
+            <a:pPr marL="0" indent="0">
+              <a:spcBef>
+                <a:spcPts val="0"/>
+              </a:spcBef>
+              <a:buNone/>
+            </a:pPr>
+            <a:r>
+              <a:rPr lang="en-US" sz="1400" b="1" dirty="0">
+                <a:latin typeface="Consolas" panose="020B0609020204030204" pitchFamily="49" charset="0"/>
+              </a:rPr>
+              <a:t>  std::string name_ = "unspecified";</a:t>
+            </a:r>
+          </a:p>
+          <a:p>
+            <a:pPr marL="0" indent="0">
+              <a:spcBef>
+                <a:spcPts val="0"/>
+              </a:spcBef>
+              <a:buNone/>
+            </a:pPr>
+            <a:r>
+              <a:rPr lang="en-US" sz="1400" b="1" dirty="0">
+                <a:latin typeface="Consolas" panose="020B0609020204030204" pitchFamily="49" charset="0"/>
+              </a:rPr>
+              <a:t>  std::vector&lt;T&gt; coordinates_;</a:t>
+            </a:r>
+          </a:p>
+          <a:p>
+            <a:pPr marL="0" indent="0">
+              <a:spcBef>
+                <a:spcPts val="0"/>
+              </a:spcBef>
+              <a:buNone/>
+            </a:pPr>
+            <a:r>
+              <a:rPr lang="en-US" sz="1400" b="1" dirty="0">
+                <a:latin typeface="Consolas" panose="020B0609020204030204" pitchFamily="49" charset="0"/>
+              </a:rPr>
+              <a:t>};</a:t>
+            </a:r>
+          </a:p>
+          <a:p>
+            <a:pPr marL="0" indent="0">
+              <a:spcBef>
+                <a:spcPts val="0"/>
+              </a:spcBef>
+              <a:buNone/>
+            </a:pPr>
+            <a:endParaRPr lang="en-US" sz="1400" b="1" dirty="0">
+              <a:latin typeface="Consolas" panose="020B0609020204030204" pitchFamily="49" charset="0"/>
+            </a:endParaRPr>
+          </a:p>
+        </p:txBody>
+      </p:sp>
+      <p:sp>
+        <p:nvSpPr>
+          <p:cNvPr id="5" name="Slide Number Placeholder 4">
+            <a:extLst>
+              <a:ext uri="{FF2B5EF4-FFF2-40B4-BE49-F238E27FC236}">
+                <a16:creationId xmlns:a16="http://schemas.microsoft.com/office/drawing/2014/main" id="{AAB7321A-B4E2-478A-B0F4-6CB726BDB6A0}"/>
               </a:ext>
             </a:extLst>
           </p:cNvPr>
@@ -11540,10 +11908,416 @@
           </a:p>
         </p:txBody>
       </p:sp>
+      <p:sp>
+        <p:nvSpPr>
+          <p:cNvPr id="4" name="Content Placeholder 3">
+            <a:extLst>
+              <a:ext uri="{FF2B5EF4-FFF2-40B4-BE49-F238E27FC236}">
+                <a16:creationId xmlns:a16="http://schemas.microsoft.com/office/drawing/2014/main" id="{9F2315A2-C71D-420F-BDFC-EAF41176DF7F}"/>
+              </a:ext>
+            </a:extLst>
+          </p:cNvPr>
+          <p:cNvSpPr>
+            <a:spLocks noGrp="1"/>
+          </p:cNvSpPr>
+          <p:nvPr>
+            <p:ph sz="half" idx="2"/>
+          </p:nvPr>
+        </p:nvSpPr>
+        <p:spPr>
+          <a:xfrm>
+            <a:off x="6172200" y="882203"/>
+            <a:ext cx="5181600" cy="5294760"/>
+          </a:xfrm>
+        </p:spPr>
+        <p:txBody>
+          <a:bodyPr/>
+          <a:lstStyle/>
+          <a:p>
+            <a:pPr marL="0" indent="0">
+              <a:lnSpc>
+                <a:spcPct val="100000"/>
+              </a:lnSpc>
+              <a:spcBef>
+                <a:spcPts val="0"/>
+              </a:spcBef>
+              <a:buNone/>
+            </a:pPr>
+            <a:r>
+              <a:rPr lang="en-US" b="1" dirty="0">
+                <a:latin typeface="Consolas" panose="020B0609020204030204" pitchFamily="49" charset="0"/>
+              </a:rPr>
+              <a:t> </a:t>
+            </a:r>
+            <a:endParaRPr lang="en-US" sz="1050" b="1" dirty="0">
+              <a:latin typeface="Consolas" panose="020B0609020204030204" pitchFamily="49" charset="0"/>
+            </a:endParaRPr>
+          </a:p>
+        </p:txBody>
+      </p:sp>
+      <p:sp>
+        <p:nvSpPr>
+          <p:cNvPr id="6" name="TextBox 5">
+            <a:extLst>
+              <a:ext uri="{FF2B5EF4-FFF2-40B4-BE49-F238E27FC236}">
+                <a16:creationId xmlns:a16="http://schemas.microsoft.com/office/drawing/2014/main" id="{2EC6E6BC-9320-4E41-8A49-3021EAA276F3}"/>
+              </a:ext>
+            </a:extLst>
+          </p:cNvPr>
+          <p:cNvSpPr txBox="1"/>
+          <p:nvPr/>
+        </p:nvSpPr>
+        <p:spPr>
+          <a:xfrm>
+            <a:off x="6312795" y="1023870"/>
+            <a:ext cx="5471374" cy="5632311"/>
+          </a:xfrm>
+          <a:prstGeom prst="rect">
+            <a:avLst/>
+          </a:prstGeom>
+          <a:noFill/>
+        </p:spPr>
+        <p:txBody>
+          <a:bodyPr wrap="square" rtlCol="0">
+            <a:spAutoFit/>
+          </a:bodyPr>
+          <a:lstStyle/>
+          <a:p>
+            <a:r>
+              <a:rPr lang="en-US" sz="1200" b="1" dirty="0">
+                <a:latin typeface="Consolas" panose="020B0609020204030204" pitchFamily="49" charset="0"/>
+              </a:rPr>
+              <a:t>template&lt;</a:t>
+            </a:r>
+            <a:r>
+              <a:rPr lang="en-US" sz="1200" b="1" dirty="0" err="1">
+                <a:latin typeface="Consolas" panose="020B0609020204030204" pitchFamily="49" charset="0"/>
+              </a:rPr>
+              <a:t>typename</a:t>
+            </a:r>
+            <a:r>
+              <a:rPr lang="en-US" sz="1200" b="1" dirty="0">
+                <a:latin typeface="Consolas" panose="020B0609020204030204" pitchFamily="49" charset="0"/>
+              </a:rPr>
+              <a:t> T&gt;</a:t>
+            </a:r>
+          </a:p>
+          <a:p>
+            <a:r>
+              <a:rPr lang="en-US" sz="1200" b="1" dirty="0">
+                <a:latin typeface="Consolas" panose="020B0609020204030204" pitchFamily="49" charset="0"/>
+              </a:rPr>
+              <a:t>Point&lt;T&gt;::Point(</a:t>
+            </a:r>
+            <a:r>
+              <a:rPr lang="en-US" sz="1200" b="1" dirty="0" err="1">
+                <a:latin typeface="Consolas" panose="020B0609020204030204" pitchFamily="49" charset="0"/>
+              </a:rPr>
+              <a:t>size_t</a:t>
+            </a:r>
+            <a:r>
+              <a:rPr lang="en-US" sz="1200" b="1" dirty="0">
+                <a:latin typeface="Consolas" panose="020B0609020204030204" pitchFamily="49" charset="0"/>
+              </a:rPr>
+              <a:t> N, const std::string&amp; name) : name_(name)</a:t>
+            </a:r>
+          </a:p>
+          <a:p>
+            <a:r>
+              <a:rPr lang="en-US" sz="1200" b="1" dirty="0">
+                <a:latin typeface="Consolas" panose="020B0609020204030204" pitchFamily="49" charset="0"/>
+              </a:rPr>
+              <a:t>{</a:t>
+            </a:r>
+          </a:p>
+          <a:p>
+            <a:r>
+              <a:rPr lang="en-US" sz="1200" b="1" dirty="0">
+                <a:latin typeface="Consolas" panose="020B0609020204030204" pitchFamily="49" charset="0"/>
+              </a:rPr>
+              <a:t>  </a:t>
+            </a:r>
+            <a:r>
+              <a:rPr lang="en-US" sz="1200" b="1" dirty="0" err="1">
+                <a:latin typeface="Consolas" panose="020B0609020204030204" pitchFamily="49" charset="0"/>
+              </a:rPr>
+              <a:t>coordinates_.reserve</a:t>
+            </a:r>
+            <a:r>
+              <a:rPr lang="en-US" sz="1200" b="1" dirty="0">
+                <a:latin typeface="Consolas" panose="020B0609020204030204" pitchFamily="49" charset="0"/>
+              </a:rPr>
+              <a:t>(N);</a:t>
+            </a:r>
+          </a:p>
+          <a:p>
+            <a:r>
+              <a:rPr lang="en-US" sz="1200" b="1" dirty="0">
+                <a:latin typeface="Consolas" panose="020B0609020204030204" pitchFamily="49" charset="0"/>
+              </a:rPr>
+              <a:t>}</a:t>
+            </a:r>
+          </a:p>
+          <a:p>
+            <a:endParaRPr lang="en-US" sz="1200" b="1" dirty="0">
+              <a:latin typeface="Consolas" panose="020B0609020204030204" pitchFamily="49" charset="0"/>
+            </a:endParaRPr>
+          </a:p>
+          <a:p>
+            <a:r>
+              <a:rPr lang="en-US" sz="1200" b="1" dirty="0">
+                <a:latin typeface="Consolas" panose="020B0609020204030204" pitchFamily="49" charset="0"/>
+              </a:rPr>
+              <a:t>template&lt;</a:t>
+            </a:r>
+            <a:r>
+              <a:rPr lang="en-US" sz="1200" b="1" dirty="0" err="1">
+                <a:latin typeface="Consolas" panose="020B0609020204030204" pitchFamily="49" charset="0"/>
+              </a:rPr>
+              <a:t>typename</a:t>
+            </a:r>
+            <a:r>
+              <a:rPr lang="en-US" sz="1200" b="1" dirty="0">
+                <a:latin typeface="Consolas" panose="020B0609020204030204" pitchFamily="49" charset="0"/>
+              </a:rPr>
+              <a:t> T&gt;</a:t>
+            </a:r>
+          </a:p>
+          <a:p>
+            <a:r>
+              <a:rPr lang="en-US" sz="1200" b="1" dirty="0">
+                <a:latin typeface="Consolas" panose="020B0609020204030204" pitchFamily="49" charset="0"/>
+              </a:rPr>
+              <a:t>Point&lt;T&gt;::Point(std::</a:t>
+            </a:r>
+            <a:r>
+              <a:rPr lang="en-US" sz="1200" b="1" dirty="0" err="1">
+                <a:latin typeface="Consolas" panose="020B0609020204030204" pitchFamily="49" charset="0"/>
+              </a:rPr>
+              <a:t>initializer_list</a:t>
+            </a:r>
+            <a:r>
+              <a:rPr lang="en-US" sz="1200" b="1" dirty="0">
+                <a:latin typeface="Consolas" panose="020B0609020204030204" pitchFamily="49" charset="0"/>
+              </a:rPr>
+              <a:t>&lt;double&gt; li) : name_("none") {</a:t>
+            </a:r>
+          </a:p>
+          <a:p>
+            <a:r>
+              <a:rPr lang="en-US" sz="1200" b="1" dirty="0">
+                <a:latin typeface="Consolas" panose="020B0609020204030204" pitchFamily="49" charset="0"/>
+              </a:rPr>
+              <a:t>  for (auto item : li)</a:t>
+            </a:r>
+          </a:p>
+          <a:p>
+            <a:r>
+              <a:rPr lang="en-US" sz="1200" b="1" dirty="0">
+                <a:latin typeface="Consolas" panose="020B0609020204030204" pitchFamily="49" charset="0"/>
+              </a:rPr>
+              <a:t>    coordinates_.</a:t>
+            </a:r>
+            <a:r>
+              <a:rPr lang="en-US" sz="1200" b="1" dirty="0" err="1">
+                <a:latin typeface="Consolas" panose="020B0609020204030204" pitchFamily="49" charset="0"/>
+              </a:rPr>
+              <a:t>push_back</a:t>
+            </a:r>
+            <a:r>
+              <a:rPr lang="en-US" sz="1200" b="1" dirty="0">
+                <a:latin typeface="Consolas" panose="020B0609020204030204" pitchFamily="49" charset="0"/>
+              </a:rPr>
+              <a:t>(item);</a:t>
+            </a:r>
+          </a:p>
+          <a:p>
+            <a:r>
+              <a:rPr lang="en-US" sz="1200" b="1" dirty="0">
+                <a:latin typeface="Consolas" panose="020B0609020204030204" pitchFamily="49" charset="0"/>
+              </a:rPr>
+              <a:t>}</a:t>
+            </a:r>
+          </a:p>
+          <a:p>
+            <a:endParaRPr lang="en-US" sz="1200" b="1" dirty="0">
+              <a:latin typeface="Consolas" panose="020B0609020204030204" pitchFamily="49" charset="0"/>
+            </a:endParaRPr>
+          </a:p>
+          <a:p>
+            <a:r>
+              <a:rPr lang="en-US" sz="1200" b="1" dirty="0">
+                <a:latin typeface="Consolas" panose="020B0609020204030204" pitchFamily="49" charset="0"/>
+              </a:rPr>
+              <a:t>template&lt;</a:t>
+            </a:r>
+            <a:r>
+              <a:rPr lang="en-US" sz="1200" b="1" dirty="0" err="1">
+                <a:latin typeface="Consolas" panose="020B0609020204030204" pitchFamily="49" charset="0"/>
+              </a:rPr>
+              <a:t>typename</a:t>
+            </a:r>
+            <a:r>
+              <a:rPr lang="en-US" sz="1200" b="1" dirty="0">
+                <a:latin typeface="Consolas" panose="020B0609020204030204" pitchFamily="49" charset="0"/>
+              </a:rPr>
+              <a:t> T&gt;</a:t>
+            </a:r>
+          </a:p>
+          <a:p>
+            <a:r>
+              <a:rPr lang="en-US" sz="1200" b="1" dirty="0">
+                <a:latin typeface="Consolas" panose="020B0609020204030204" pitchFamily="49" charset="0"/>
+              </a:rPr>
+              <a:t>std::string Point&lt;T&gt;::name() const { return name_; }</a:t>
+            </a:r>
+          </a:p>
+          <a:p>
+            <a:endParaRPr lang="en-US" sz="1200" b="1" dirty="0">
+              <a:latin typeface="Consolas" panose="020B0609020204030204" pitchFamily="49" charset="0"/>
+            </a:endParaRPr>
+          </a:p>
+          <a:p>
+            <a:r>
+              <a:rPr lang="en-US" sz="1200" b="1" dirty="0">
+                <a:latin typeface="Consolas" panose="020B0609020204030204" pitchFamily="49" charset="0"/>
+              </a:rPr>
+              <a:t>template&lt;</a:t>
+            </a:r>
+            <a:r>
+              <a:rPr lang="en-US" sz="1200" b="1" dirty="0" err="1">
+                <a:latin typeface="Consolas" panose="020B0609020204030204" pitchFamily="49" charset="0"/>
+              </a:rPr>
+              <a:t>typename</a:t>
+            </a:r>
+            <a:r>
+              <a:rPr lang="en-US" sz="1200" b="1" dirty="0">
+                <a:latin typeface="Consolas" panose="020B0609020204030204" pitchFamily="49" charset="0"/>
+              </a:rPr>
+              <a:t> T&gt;</a:t>
+            </a:r>
+          </a:p>
+          <a:p>
+            <a:r>
+              <a:rPr lang="en-US" sz="1200" b="1" dirty="0">
+                <a:latin typeface="Consolas" panose="020B0609020204030204" pitchFamily="49" charset="0"/>
+              </a:rPr>
+              <a:t>void Point&lt;T&gt;::name(const std::string&amp; name) { name_ = name; }</a:t>
+            </a:r>
+          </a:p>
+          <a:p>
+            <a:endParaRPr lang="en-US" sz="1200" b="1" dirty="0">
+              <a:latin typeface="Consolas" panose="020B0609020204030204" pitchFamily="49" charset="0"/>
+            </a:endParaRPr>
+          </a:p>
+          <a:p>
+            <a:r>
+              <a:rPr lang="en-US" sz="1200" b="1" dirty="0">
+                <a:latin typeface="Consolas" panose="020B0609020204030204" pitchFamily="49" charset="0"/>
+              </a:rPr>
+              <a:t>template&lt;</a:t>
+            </a:r>
+            <a:r>
+              <a:rPr lang="en-US" sz="1200" b="1" dirty="0" err="1">
+                <a:latin typeface="Consolas" panose="020B0609020204030204" pitchFamily="49" charset="0"/>
+              </a:rPr>
+              <a:t>typename</a:t>
+            </a:r>
+            <a:r>
+              <a:rPr lang="en-US" sz="1200" b="1" dirty="0">
+                <a:latin typeface="Consolas" panose="020B0609020204030204" pitchFamily="49" charset="0"/>
+              </a:rPr>
+              <a:t> T&gt;</a:t>
+            </a:r>
+          </a:p>
+          <a:p>
+            <a:r>
+              <a:rPr lang="en-US" sz="1200" b="1" dirty="0">
+                <a:latin typeface="Consolas" panose="020B0609020204030204" pitchFamily="49" charset="0"/>
+              </a:rPr>
+              <a:t>T&amp; Point&lt;T&gt;::operator[](</a:t>
+            </a:r>
+            <a:r>
+              <a:rPr lang="en-US" sz="1200" b="1" dirty="0" err="1">
+                <a:latin typeface="Consolas" panose="020B0609020204030204" pitchFamily="49" charset="0"/>
+              </a:rPr>
+              <a:t>size_t</a:t>
+            </a:r>
+            <a:r>
+              <a:rPr lang="en-US" sz="1200" b="1" dirty="0">
+                <a:latin typeface="Consolas" panose="020B0609020204030204" pitchFamily="49" charset="0"/>
+              </a:rPr>
+              <a:t> i) {</a:t>
+            </a:r>
+          </a:p>
+          <a:p>
+            <a:r>
+              <a:rPr lang="en-US" sz="1200" b="1" dirty="0">
+                <a:latin typeface="Consolas" panose="020B0609020204030204" pitchFamily="49" charset="0"/>
+              </a:rPr>
+              <a:t>  if (i &lt; 0 &amp;&amp; </a:t>
+            </a:r>
+            <a:r>
+              <a:rPr lang="en-US" sz="1200" b="1" dirty="0" err="1">
+                <a:latin typeface="Consolas" panose="020B0609020204030204" pitchFamily="49" charset="0"/>
+              </a:rPr>
+              <a:t>coordinates_.size</a:t>
+            </a:r>
+            <a:r>
+              <a:rPr lang="en-US" sz="1200" b="1" dirty="0">
+                <a:latin typeface="Consolas" panose="020B0609020204030204" pitchFamily="49" charset="0"/>
+              </a:rPr>
+              <a:t>() &lt;= i)</a:t>
+            </a:r>
+          </a:p>
+          <a:p>
+            <a:r>
+              <a:rPr lang="en-US" sz="1200" b="1" dirty="0">
+                <a:latin typeface="Consolas" panose="020B0609020204030204" pitchFamily="49" charset="0"/>
+              </a:rPr>
+              <a:t>    throw(std::exception());</a:t>
+            </a:r>
+          </a:p>
+          <a:p>
+            <a:r>
+              <a:rPr lang="en-US" sz="1200" b="1" dirty="0">
+                <a:latin typeface="Consolas" panose="020B0609020204030204" pitchFamily="49" charset="0"/>
+              </a:rPr>
+              <a:t>  return coordinates_[i];</a:t>
+            </a:r>
+          </a:p>
+          <a:p>
+            <a:r>
+              <a:rPr lang="en-US" sz="1200" b="1" dirty="0">
+                <a:latin typeface="Consolas" panose="020B0609020204030204" pitchFamily="49" charset="0"/>
+              </a:rPr>
+              <a:t>}</a:t>
+            </a:r>
+          </a:p>
+          <a:p>
+            <a:endParaRPr lang="en-US" sz="1200" b="1" dirty="0">
+              <a:latin typeface="Consolas" panose="020B0609020204030204" pitchFamily="49" charset="0"/>
+            </a:endParaRPr>
+          </a:p>
+          <a:p>
+            <a:r>
+              <a:rPr lang="en-US" sz="1200" b="1" dirty="0">
+                <a:latin typeface="Consolas" panose="020B0609020204030204" pitchFamily="49" charset="0"/>
+              </a:rPr>
+              <a:t>// remaining method implementations elided</a:t>
+            </a:r>
+          </a:p>
+          <a:p>
+            <a:endParaRPr lang="en-US" sz="1200" b="1" dirty="0">
+              <a:latin typeface="Consolas" panose="020B0609020204030204" pitchFamily="49" charset="0"/>
+            </a:endParaRPr>
+          </a:p>
+        </p:txBody>
+      </p:sp>
     </p:spTree>
     <p:extLst>
       <p:ext uri="{BB962C8B-B14F-4D97-AF65-F5344CB8AC3E}">
-        <p14:creationId xmlns:p14="http://schemas.microsoft.com/office/powerpoint/2010/main" val="1539332393"/>
+        <p14:creationId xmlns:p14="http://schemas.microsoft.com/office/powerpoint/2010/main" val="3230969862"/>
       </p:ext>
     </p:extLst>
   </p:cSld>
@@ -11575,21 +12349,21 @@
           <p:cNvPr id="2" name="Title 1">
             <a:extLst>
               <a:ext uri="{FF2B5EF4-FFF2-40B4-BE49-F238E27FC236}">
-                <a16:creationId xmlns:a16="http://schemas.microsoft.com/office/drawing/2014/main" id="{7931F950-B483-4831-A37F-784D41C54C0E}"/>
-              </a:ext>
-            </a:extLst>
-          </p:cNvPr>
-          <p:cNvSpPr>
-            <a:spLocks noGrp="1"/>
-          </p:cNvSpPr>
-          <p:nvPr>
-            <p:ph type="ctrTitle"/>
+                <a16:creationId xmlns:a16="http://schemas.microsoft.com/office/drawing/2014/main" id="{30028667-E31F-4A7E-9286-305266991DEB}"/>
+              </a:ext>
+            </a:extLst>
+          </p:cNvPr>
+          <p:cNvSpPr>
+            <a:spLocks noGrp="1"/>
+          </p:cNvSpPr>
+          <p:nvPr>
+            <p:ph type="title"/>
           </p:nvPr>
         </p:nvSpPr>
         <p:spPr>
           <a:xfrm>
-            <a:off x="1524000" y="1122363"/>
-            <a:ext cx="9144000" cy="2155310"/>
+            <a:off x="838200" y="365126"/>
+            <a:ext cx="10515600" cy="716700"/>
           </a:xfrm>
         </p:spPr>
         <p:txBody>
@@ -11598,39 +12372,31 @@
           <a:p>
             <a:r>
               <a:rPr lang="en-US" dirty="0"/>
-              <a:t>C++ Models</a:t>
-            </a:r>
-            <a:br>
-              <a:rPr lang="en-US" dirty="0"/>
-            </a:br>
-            <a:r>
-              <a:rPr lang="en-US" sz="3600" dirty="0"/>
-              <a:t>Conclusions</a:t>
-            </a:r>
-            <a:endParaRPr lang="en-US" dirty="0"/>
-          </a:p>
-        </p:txBody>
-      </p:sp>
-      <p:sp>
-        <p:nvSpPr>
-          <p:cNvPr id="3" name="Subtitle 2">
-            <a:extLst>
-              <a:ext uri="{FF2B5EF4-FFF2-40B4-BE49-F238E27FC236}">
-                <a16:creationId xmlns:a16="http://schemas.microsoft.com/office/drawing/2014/main" id="{D9CD4FAC-1FAC-470C-A1D5-392002A7D018}"/>
-              </a:ext>
-            </a:extLst>
-          </p:cNvPr>
-          <p:cNvSpPr>
-            <a:spLocks noGrp="1"/>
-          </p:cNvSpPr>
-          <p:nvPr>
-            <p:ph type="subTitle" idx="1"/>
+              <a:t>Template overloads and Specialization</a:t>
+            </a:r>
+          </a:p>
+        </p:txBody>
+      </p:sp>
+      <p:sp>
+        <p:nvSpPr>
+          <p:cNvPr id="3" name="Content Placeholder 2">
+            <a:extLst>
+              <a:ext uri="{FF2B5EF4-FFF2-40B4-BE49-F238E27FC236}">
+                <a16:creationId xmlns:a16="http://schemas.microsoft.com/office/drawing/2014/main" id="{98868B1E-11F2-477A-86C6-87767FE8E13B}"/>
+              </a:ext>
+            </a:extLst>
+          </p:cNvPr>
+          <p:cNvSpPr>
+            <a:spLocks noGrp="1"/>
+          </p:cNvSpPr>
+          <p:nvPr>
+            <p:ph sz="half" idx="1"/>
           </p:nvPr>
         </p:nvSpPr>
         <p:spPr>
           <a:xfrm>
-            <a:off x="1524000" y="3981450"/>
-            <a:ext cx="9144000" cy="1276349"/>
+            <a:off x="838200" y="1210614"/>
+            <a:ext cx="7088746" cy="5282260"/>
           </a:xfrm>
         </p:spPr>
         <p:txBody>
@@ -11640,34 +12406,111 @@
           <a:lstStyle/>
           <a:p>
             <a:r>
-              <a:rPr lang="en-US" sz="2800" dirty="0"/>
-              <a:t>Jim Fawcett</a:t>
-            </a:r>
-          </a:p>
-          <a:p>
-            <a:r>
-              <a:rPr lang="en-US" sz="2800" dirty="0">
-                <a:hlinkClick r:id="rId2"/>
-              </a:rPr>
-              <a:t>https://JimFawcett.github.io</a:t>
-            </a:r>
-            <a:r>
-              <a:rPr lang="en-US" sz="2800" dirty="0"/>
-              <a:t> </a:t>
-            </a:r>
-          </a:p>
-          <a:p>
-            <a:endParaRPr lang="en-US" sz="2800" dirty="0"/>
-          </a:p>
-          <a:p>
-            <a:endParaRPr lang="en-US" sz="2800" dirty="0"/>
+              <a:rPr lang="en-US" sz="2000" dirty="0"/>
+              <a:t>Template specification provides a pattern for generating specific code for a function or class.</a:t>
+            </a:r>
+          </a:p>
+          <a:p>
+            <a:r>
+              <a:rPr lang="en-US" sz="2000" dirty="0"/>
+              <a:t>That gets instantiated by something close to substitution, subject to type deduction for classes or overload resolution for functions.</a:t>
+            </a:r>
+          </a:p>
+          <a:p>
+            <a:r>
+              <a:rPr lang="en-US" sz="2000" dirty="0"/>
+              <a:t>That may work well for most of the types an application uses but may fail for one or more specific types.</a:t>
+            </a:r>
+          </a:p>
+          <a:p>
+            <a:r>
+              <a:rPr lang="en-US" sz="2000" dirty="0"/>
+              <a:t>In that case, a function may be defined for specific type(s) that has modified code.  C++ guarantees that the overload will be chosen if the application supplied type matches the overload.</a:t>
+            </a:r>
+          </a:p>
+          <a:p>
+            <a:r>
+              <a:rPr lang="en-US" sz="2000" dirty="0"/>
+              <a:t>Similarly, a class may be defined for specific type(s) that has modified code.  The language guarantees that the specialization will be chosen, instead of the generic class, if the application type matches the specialization, using template type deduction.</a:t>
+            </a:r>
+          </a:p>
+          <a:p>
+            <a:r>
+              <a:rPr lang="en-US" sz="2000" dirty="0"/>
+              <a:t>A designer may provide any number of overloads and specializations as needed by the application.</a:t>
+            </a:r>
+          </a:p>
+        </p:txBody>
+      </p:sp>
+      <p:pic>
+        <p:nvPicPr>
+          <p:cNvPr id="5" name="Picture 4" descr="A close up of a logo&#10;&#10;Description automatically generated">
+            <a:extLst>
+              <a:ext uri="{FF2B5EF4-FFF2-40B4-BE49-F238E27FC236}">
+                <a16:creationId xmlns:a16="http://schemas.microsoft.com/office/drawing/2014/main" id="{40FA6717-FC5A-4DD6-AB58-50A2D1FB812A}"/>
+              </a:ext>
+            </a:extLst>
+          </p:cNvPr>
+          <p:cNvPicPr>
+            <a:picLocks noChangeAspect="1"/>
+          </p:cNvPicPr>
+          <p:nvPr/>
+        </p:nvPicPr>
+        <p:blipFill>
+          <a:blip r:embed="rId2">
+            <a:extLst>
+              <a:ext uri="{28A0092B-C50C-407E-A947-70E740481C1C}">
+                <a14:useLocalDpi xmlns:a14="http://schemas.microsoft.com/office/drawing/2010/main" val="0"/>
+              </a:ext>
+            </a:extLst>
+          </a:blip>
+          <a:stretch>
+            <a:fillRect/>
+          </a:stretch>
+        </p:blipFill>
+        <p:spPr>
+          <a:xfrm>
+            <a:off x="8004215" y="1435994"/>
+            <a:ext cx="3522105" cy="3103809"/>
+          </a:xfrm>
+          <a:prstGeom prst="rect">
+            <a:avLst/>
+          </a:prstGeom>
+        </p:spPr>
+      </p:pic>
+      <p:sp>
+        <p:nvSpPr>
+          <p:cNvPr id="4" name="Slide Number Placeholder 3">
+            <a:extLst>
+              <a:ext uri="{FF2B5EF4-FFF2-40B4-BE49-F238E27FC236}">
+                <a16:creationId xmlns:a16="http://schemas.microsoft.com/office/drawing/2014/main" id="{C1CAA9E7-9EB6-4398-9D47-854F0AA46E50}"/>
+              </a:ext>
+            </a:extLst>
+          </p:cNvPr>
+          <p:cNvSpPr>
+            <a:spLocks noGrp="1"/>
+          </p:cNvSpPr>
+          <p:nvPr>
+            <p:ph type="sldNum" sz="quarter" idx="12"/>
+          </p:nvPr>
+        </p:nvSpPr>
+        <p:spPr/>
+        <p:txBody>
+          <a:bodyPr/>
+          <a:lstStyle/>
+          <a:p>
+            <a:fld id="{519FA752-D1CF-498F-B0BD-05E47309CED3}" type="slidenum">
+              <a:rPr lang="en-US" smtClean="0"/>
+              <a:t>38</a:t>
+            </a:fld>
+            <a:endParaRPr lang="en-US"/>
           </a:p>
         </p:txBody>
       </p:sp>
     </p:spTree>
     <p:extLst>
       <p:ext uri="{BB962C8B-B14F-4D97-AF65-F5344CB8AC3E}">
-        <p14:creationId xmlns:p14="http://schemas.microsoft.com/office/powerpoint/2010/main" val="3363750475"/>
+        <p14:creationId xmlns:p14="http://schemas.microsoft.com/office/powerpoint/2010/main" val="1539332393"/>
       </p:ext>
     </p:extLst>
   </p:cSld>
@@ -11699,25 +12542,22 @@
           <p:cNvPr id="2" name="Title 1">
             <a:extLst>
               <a:ext uri="{FF2B5EF4-FFF2-40B4-BE49-F238E27FC236}">
-                <a16:creationId xmlns:a16="http://schemas.microsoft.com/office/drawing/2014/main" id="{6575B597-9CE0-4BDE-8DBF-14DEFB696DB3}"/>
-              </a:ext>
-            </a:extLst>
-          </p:cNvPr>
-          <p:cNvSpPr>
-            <a:spLocks noGrp="1"/>
-          </p:cNvSpPr>
-          <p:nvPr>
-            <p:ph type="title"/>
+                <a16:creationId xmlns:a16="http://schemas.microsoft.com/office/drawing/2014/main" id="{7931F950-B483-4831-A37F-784D41C54C0E}"/>
+              </a:ext>
+            </a:extLst>
+          </p:cNvPr>
+          <p:cNvSpPr>
+            <a:spLocks noGrp="1"/>
+          </p:cNvSpPr>
+          <p:nvPr>
+            <p:ph type="ctrTitle"/>
           </p:nvPr>
         </p:nvSpPr>
         <p:spPr>
           <a:xfrm>
-            <a:off x="838200" y="365125"/>
-            <a:ext cx="10515600" cy="961399"/>
+            <a:off x="1524000" y="1122363"/>
+            <a:ext cx="9144000" cy="2155310"/>
           </a:xfrm>
-          <a:solidFill>
-            <a:schemeClr val="bg2"/>
-          </a:solidFill>
         </p:spPr>
         <p:txBody>
           <a:bodyPr/>
@@ -11725,118 +12565,76 @@
           <a:p>
             <a:r>
               <a:rPr lang="en-US" dirty="0"/>
+              <a:t>C++ Models</a:t>
+            </a:r>
+            <a:br>
+              <a:rPr lang="en-US" dirty="0"/>
+            </a:br>
+            <a:r>
+              <a:rPr lang="en-US" sz="3600" dirty="0"/>
               <a:t>Conclusions</a:t>
             </a:r>
-          </a:p>
-        </p:txBody>
-      </p:sp>
-      <p:sp>
-        <p:nvSpPr>
-          <p:cNvPr id="3" name="Content Placeholder 2">
-            <a:extLst>
-              <a:ext uri="{FF2B5EF4-FFF2-40B4-BE49-F238E27FC236}">
-                <a16:creationId xmlns:a16="http://schemas.microsoft.com/office/drawing/2014/main" id="{510D5770-03A0-448C-A291-CB10F9B55D66}"/>
-              </a:ext>
-            </a:extLst>
-          </p:cNvPr>
-          <p:cNvSpPr>
-            <a:spLocks noGrp="1"/>
-          </p:cNvSpPr>
-          <p:nvPr>
-            <p:ph idx="1"/>
+            <a:endParaRPr lang="en-US" dirty="0"/>
+          </a:p>
+        </p:txBody>
+      </p:sp>
+      <p:sp>
+        <p:nvSpPr>
+          <p:cNvPr id="3" name="Subtitle 2">
+            <a:extLst>
+              <a:ext uri="{FF2B5EF4-FFF2-40B4-BE49-F238E27FC236}">
+                <a16:creationId xmlns:a16="http://schemas.microsoft.com/office/drawing/2014/main" id="{D9CD4FAC-1FAC-470C-A1D5-392002A7D018}"/>
+              </a:ext>
+            </a:extLst>
+          </p:cNvPr>
+          <p:cNvSpPr>
+            <a:spLocks noGrp="1"/>
+          </p:cNvSpPr>
+          <p:nvPr>
+            <p:ph type="subTitle" idx="1"/>
           </p:nvPr>
         </p:nvSpPr>
         <p:spPr>
           <a:xfrm>
-            <a:off x="838200" y="1687132"/>
-            <a:ext cx="10515600" cy="4489831"/>
+            <a:off x="1524000" y="3981450"/>
+            <a:ext cx="9144000" cy="1276349"/>
           </a:xfrm>
         </p:spPr>
         <p:txBody>
           <a:bodyPr>
-            <a:noAutofit/>
+            <a:normAutofit/>
           </a:bodyPr>
           <a:lstStyle/>
           <a:p>
             <a:r>
-              <a:rPr lang="en-US" sz="2400" dirty="0"/>
-              <a:t>If you understand the 8 models, we’ve covered, I think you will find C++ syntax and semantics to be consistent and sensible.</a:t>
-            </a:r>
-          </a:p>
-          <a:p>
-            <a:r>
-              <a:rPr lang="en-US" sz="2400" dirty="0"/>
-              <a:t>Some particular parts of the language discussed in the C++ Story but not here are intricate and require some study to master:</a:t>
-            </a:r>
-          </a:p>
-          <a:p>
-            <a:pPr lvl="1"/>
-            <a:r>
-              <a:rPr lang="en-US" sz="2000" dirty="0"/>
-              <a:t>Template type deduction</a:t>
-            </a:r>
-          </a:p>
-          <a:p>
-            <a:pPr lvl="1"/>
-            <a:r>
-              <a:rPr lang="en-US" sz="2000" dirty="0"/>
-              <a:t>Function overload resolution</a:t>
-            </a:r>
-          </a:p>
-          <a:p>
-            <a:pPr lvl="1"/>
-            <a:r>
-              <a:rPr lang="en-US" sz="2000" dirty="0"/>
-              <a:t>Template metaprogramming</a:t>
-            </a:r>
-          </a:p>
-          <a:p>
-            <a:r>
-              <a:rPr lang="en-US" sz="2400" dirty="0"/>
-              <a:t>But template type deduction and template function resolution just seem to work without deep analysis most of the time.</a:t>
-            </a:r>
-          </a:p>
-          <a:p>
-            <a:r>
-              <a:rPr lang="en-US" sz="2400" dirty="0"/>
-              <a:t>Template metaprogramming is used largely by library developers, but is getting easier to use with each new version of the C++ standard.</a:t>
-            </a:r>
-          </a:p>
-        </p:txBody>
-      </p:sp>
-      <p:sp>
-        <p:nvSpPr>
-          <p:cNvPr id="4" name="Slide Number Placeholder 3">
-            <a:extLst>
-              <a:ext uri="{FF2B5EF4-FFF2-40B4-BE49-F238E27FC236}">
-                <a16:creationId xmlns:a16="http://schemas.microsoft.com/office/drawing/2014/main" id="{5303FFBC-A3BA-4CD9-9623-2D9E837E32E7}"/>
-              </a:ext>
-            </a:extLst>
-          </p:cNvPr>
-          <p:cNvSpPr>
-            <a:spLocks noGrp="1"/>
-          </p:cNvSpPr>
-          <p:nvPr>
-            <p:ph type="sldNum" sz="quarter" idx="12"/>
-          </p:nvPr>
-        </p:nvSpPr>
-        <p:spPr/>
-        <p:txBody>
-          <a:bodyPr/>
-          <a:lstStyle/>
-          <a:p>
-            <a:fld id="{519FA752-D1CF-498F-B0BD-05E47309CED3}" type="slidenum">
-              <a:rPr lang="en-US" smtClean="0"/>
-              <a:t>39</a:t>
-            </a:fld>
-            <a:endParaRPr lang="en-US"/>
+              <a:rPr lang="en-US" sz="2800" dirty="0"/>
+              <a:t>Jim Fawcett</a:t>
+            </a:r>
+          </a:p>
+          <a:p>
+            <a:r>
+              <a:rPr lang="en-US" sz="2800" dirty="0">
+                <a:hlinkClick r:id="rId2"/>
+              </a:rPr>
+              <a:t>https://JimFawcett.github.io</a:t>
+            </a:r>
+            <a:r>
+              <a:rPr lang="en-US" sz="2800" dirty="0"/>
+              <a:t> </a:t>
+            </a:r>
+          </a:p>
+          <a:p>
+            <a:endParaRPr lang="en-US" sz="2800" dirty="0"/>
+          </a:p>
+          <a:p>
+            <a:endParaRPr lang="en-US" sz="2800" dirty="0"/>
           </a:p>
         </p:txBody>
       </p:sp>
     </p:spTree>
     <p:extLst>
       <p:ext uri="{BB962C8B-B14F-4D97-AF65-F5344CB8AC3E}">
-        <p14:creationId xmlns:p14="http://schemas.microsoft.com/office/powerpoint/2010/main" val="1695196908"/>
+        <p14:creationId xmlns:p14="http://schemas.microsoft.com/office/powerpoint/2010/main" val="3363750475"/>
       </p:ext>
     </p:extLst>
   </p:cSld>
@@ -11879,7 +12677,12 @@
             <p:ph type="title"/>
           </p:nvPr>
         </p:nvSpPr>
-        <p:spPr/>
+        <p:spPr>
+          <a:xfrm>
+            <a:off x="838200" y="365126"/>
+            <a:ext cx="10515600" cy="967838"/>
+          </a:xfrm>
+        </p:spPr>
         <p:txBody>
           <a:bodyPr/>
           <a:lstStyle/>
@@ -11907,7 +12710,12 @@
             <p:ph idx="1"/>
           </p:nvPr>
         </p:nvSpPr>
-        <p:spPr/>
+        <p:spPr>
+          <a:xfrm>
+            <a:off x="838200" y="1384479"/>
+            <a:ext cx="10515600" cy="4792484"/>
+          </a:xfrm>
+        </p:spPr>
         <p:txBody>
           <a:bodyPr>
             <a:normAutofit/>
@@ -11916,7 +12724,7 @@
           <a:p>
             <a:r>
               <a:rPr lang="en-US" dirty="0"/>
-              <a:t>The material for this presentation comes from my </a:t>
+              <a:t>The material for this presentation comes from the </a:t>
             </a:r>
             <a:r>
               <a:rPr lang="en-US" dirty="0" err="1"/>
@@ -11936,20 +12744,19 @@
               <a:t>https://JimFawcett.github.io</a:t>
             </a:r>
             <a:r>
-              <a:rPr lang="en-US"/>
+              <a:rPr lang="en-US" dirty="0"/>
               <a:t>, </a:t>
             </a:r>
             <a:r>
-              <a:rPr lang="en-US">
+              <a:rPr lang="en-US" dirty="0">
                 <a:hlinkClick r:id="rId3"/>
               </a:rPr>
               <a:t>https://JimFawcett.github.io/Resources/CppModel.pdf</a:t>
             </a:r>
             <a:r>
-              <a:rPr lang="en-US"/>
+              <a:rPr lang="en-US" dirty="0"/>
               <a:t> </a:t>
             </a:r>
-            <a:endParaRPr lang="en-US" dirty="0"/>
           </a:p>
           <a:p>
             <a:r>
@@ -12071,7 +12878,7 @@
           <p:cNvPr id="2" name="Title 1">
             <a:extLst>
               <a:ext uri="{FF2B5EF4-FFF2-40B4-BE49-F238E27FC236}">
-                <a16:creationId xmlns:a16="http://schemas.microsoft.com/office/drawing/2014/main" id="{6A4FED2B-2E20-48CE-A714-E1F9BFF337F5}"/>
+                <a16:creationId xmlns:a16="http://schemas.microsoft.com/office/drawing/2014/main" id="{6575B597-9CE0-4BDE-8DBF-14DEFB696DB3}"/>
               </a:ext>
             </a:extLst>
           </p:cNvPr>
@@ -12084,62 +12891,104 @@
         </p:nvSpPr>
         <p:spPr>
           <a:xfrm>
-            <a:off x="838200" y="365126"/>
-            <a:ext cx="10515600" cy="716700"/>
+            <a:off x="838200" y="365125"/>
+            <a:ext cx="10515600" cy="961399"/>
+          </a:xfrm>
+          <a:solidFill>
+            <a:schemeClr val="bg2"/>
+          </a:solidFill>
+        </p:spPr>
+        <p:txBody>
+          <a:bodyPr/>
+          <a:lstStyle/>
+          <a:p>
+            <a:r>
+              <a:rPr lang="en-US" dirty="0"/>
+              <a:t>Conclusions</a:t>
+            </a:r>
+          </a:p>
+        </p:txBody>
+      </p:sp>
+      <p:sp>
+        <p:nvSpPr>
+          <p:cNvPr id="3" name="Content Placeholder 2">
+            <a:extLst>
+              <a:ext uri="{FF2B5EF4-FFF2-40B4-BE49-F238E27FC236}">
+                <a16:creationId xmlns:a16="http://schemas.microsoft.com/office/drawing/2014/main" id="{510D5770-03A0-448C-A291-CB10F9B55D66}"/>
+              </a:ext>
+            </a:extLst>
+          </p:cNvPr>
+          <p:cNvSpPr>
+            <a:spLocks noGrp="1"/>
+          </p:cNvSpPr>
+          <p:nvPr>
+            <p:ph idx="1"/>
+          </p:nvPr>
+        </p:nvSpPr>
+        <p:spPr>
+          <a:xfrm>
+            <a:off x="838200" y="1687132"/>
+            <a:ext cx="10515600" cy="4489831"/>
           </a:xfrm>
         </p:spPr>
         <p:txBody>
-          <a:bodyPr/>
-          <a:lstStyle/>
-          <a:p>
-            <a:r>
-              <a:rPr lang="en-US" dirty="0"/>
-              <a:t>Location of Resources</a:t>
-            </a:r>
-          </a:p>
-        </p:txBody>
-      </p:sp>
-      <p:pic>
-        <p:nvPicPr>
-          <p:cNvPr id="6" name="Content Placeholder 5" descr="A screenshot of a cell phone&#10;&#10;Description automatically generated">
-            <a:extLst>
-              <a:ext uri="{FF2B5EF4-FFF2-40B4-BE49-F238E27FC236}">
-                <a16:creationId xmlns:a16="http://schemas.microsoft.com/office/drawing/2014/main" id="{04625158-4F1C-44A8-A032-B506F200C21D}"/>
-              </a:ext>
-            </a:extLst>
-          </p:cNvPr>
-          <p:cNvPicPr>
-            <a:picLocks noGrp="1" noChangeAspect="1"/>
-          </p:cNvPicPr>
-          <p:nvPr>
-            <p:ph idx="1"/>
-          </p:nvPr>
-        </p:nvPicPr>
-        <p:blipFill>
-          <a:blip r:embed="rId2">
-            <a:extLst>
-              <a:ext uri="{28A0092B-C50C-407E-A947-70E740481C1C}">
-                <a14:useLocalDpi xmlns:a14="http://schemas.microsoft.com/office/drawing/2010/main" val="0"/>
-              </a:ext>
-            </a:extLst>
-          </a:blip>
-          <a:stretch>
-            <a:fillRect/>
-          </a:stretch>
-        </p:blipFill>
-        <p:spPr>
-          <a:xfrm>
-            <a:off x="1700011" y="1154740"/>
-            <a:ext cx="7861504" cy="5128695"/>
-          </a:xfrm>
-        </p:spPr>
-      </p:pic>
+          <a:bodyPr>
+            <a:noAutofit/>
+          </a:bodyPr>
+          <a:lstStyle/>
+          <a:p>
+            <a:r>
+              <a:rPr lang="en-US" sz="2400" dirty="0"/>
+              <a:t>If you understand the 8 models, we’ve covered, I think you will find C++ syntax and semantics to be consistent and sensible.</a:t>
+            </a:r>
+          </a:p>
+          <a:p>
+            <a:r>
+              <a:rPr lang="en-US" sz="2400" dirty="0"/>
+              <a:t>Some particular parts of the language discussed in the C++ Story but not here are intricate and require some study to master:</a:t>
+            </a:r>
+          </a:p>
+          <a:p>
+            <a:pPr lvl="1"/>
+            <a:r>
+              <a:rPr lang="en-US" sz="2000" dirty="0"/>
+              <a:t>Template type deduction</a:t>
+            </a:r>
+          </a:p>
+          <a:p>
+            <a:pPr lvl="1"/>
+            <a:r>
+              <a:rPr lang="en-US" sz="2000" dirty="0"/>
+              <a:t>Function overload resolution</a:t>
+            </a:r>
+          </a:p>
+          <a:p>
+            <a:pPr lvl="1"/>
+            <a:r>
+              <a:rPr lang="en-US" sz="2000" dirty="0"/>
+              <a:t>Template metaprogramming</a:t>
+            </a:r>
+          </a:p>
+          <a:p>
+            <a:r>
+              <a:rPr lang="en-US" sz="2400" dirty="0"/>
+              <a:t>But template type deduction and template function resolution just seem to work without deep analysis most of the time.</a:t>
+            </a:r>
+          </a:p>
+          <a:p>
+            <a:r>
+              <a:rPr lang="en-US" sz="2400" dirty="0"/>
+              <a:t>Template metaprogramming is used largely by library developers, but is getting easier to use with each new version of the C++ standard.</a:t>
+            </a:r>
+          </a:p>
+        </p:txBody>
+      </p:sp>
       <p:sp>
         <p:nvSpPr>
           <p:cNvPr id="4" name="Slide Number Placeholder 3">
             <a:extLst>
               <a:ext uri="{FF2B5EF4-FFF2-40B4-BE49-F238E27FC236}">
-                <a16:creationId xmlns:a16="http://schemas.microsoft.com/office/drawing/2014/main" id="{870DFE9F-68FE-40ED-A8E3-FD2CA1D02F44}"/>
+                <a16:creationId xmlns:a16="http://schemas.microsoft.com/office/drawing/2014/main" id="{5303FFBC-A3BA-4CD9-9623-2D9E837E32E7}"/>
               </a:ext>
             </a:extLst>
           </p:cNvPr>
@@ -12166,7 +13015,7 @@
     </p:spTree>
     <p:extLst>
       <p:ext uri="{BB962C8B-B14F-4D97-AF65-F5344CB8AC3E}">
-        <p14:creationId xmlns:p14="http://schemas.microsoft.com/office/powerpoint/2010/main" val="491707384"/>
+        <p14:creationId xmlns:p14="http://schemas.microsoft.com/office/powerpoint/2010/main" val="1695196908"/>
       </p:ext>
     </p:extLst>
   </p:cSld>
@@ -12198,7 +13047,7 @@
           <p:cNvPr id="2" name="Title 1">
             <a:extLst>
               <a:ext uri="{FF2B5EF4-FFF2-40B4-BE49-F238E27FC236}">
-                <a16:creationId xmlns:a16="http://schemas.microsoft.com/office/drawing/2014/main" id="{AE2C4E24-F41A-43B6-8514-8753B0BF4B56}"/>
+                <a16:creationId xmlns:a16="http://schemas.microsoft.com/office/drawing/2014/main" id="{6A4FED2B-2E20-48CE-A714-E1F9BFF337F5}"/>
               </a:ext>
             </a:extLst>
           </p:cNvPr>
@@ -12212,7 +13061,7 @@
         <p:spPr>
           <a:xfrm>
             <a:off x="838200" y="365126"/>
-            <a:ext cx="10515600" cy="780922"/>
+            <a:ext cx="10515600" cy="716700"/>
           </a:xfrm>
         </p:spPr>
         <p:txBody>
@@ -12221,154 +13070,52 @@
           <a:p>
             <a:r>
               <a:rPr lang="en-US" dirty="0"/>
-              <a:t>Presentation Resources</a:t>
-            </a:r>
-          </a:p>
-        </p:txBody>
-      </p:sp>
-      <p:sp>
-        <p:nvSpPr>
-          <p:cNvPr id="3" name="Content Placeholder 2">
-            <a:extLst>
-              <a:ext uri="{FF2B5EF4-FFF2-40B4-BE49-F238E27FC236}">
-                <a16:creationId xmlns:a16="http://schemas.microsoft.com/office/drawing/2014/main" id="{63C3A9C2-6490-47D7-8E43-D14728254FDB}"/>
-              </a:ext>
-            </a:extLst>
-          </p:cNvPr>
-          <p:cNvSpPr>
-            <a:spLocks noGrp="1"/>
-          </p:cNvSpPr>
+              <a:t>Location of Resources</a:t>
+            </a:r>
+          </a:p>
+        </p:txBody>
+      </p:sp>
+      <p:pic>
+        <p:nvPicPr>
+          <p:cNvPr id="6" name="Content Placeholder 5" descr="A screenshot of a cell phone&#10;&#10;Description automatically generated">
+            <a:extLst>
+              <a:ext uri="{FF2B5EF4-FFF2-40B4-BE49-F238E27FC236}">
+                <a16:creationId xmlns:a16="http://schemas.microsoft.com/office/drawing/2014/main" id="{04625158-4F1C-44A8-A032-B506F200C21D}"/>
+              </a:ext>
+            </a:extLst>
+          </p:cNvPr>
+          <p:cNvPicPr>
+            <a:picLocks noGrp="1" noChangeAspect="1"/>
+          </p:cNvPicPr>
           <p:nvPr>
             <p:ph idx="1"/>
           </p:nvPr>
-        </p:nvSpPr>
+        </p:nvPicPr>
+        <p:blipFill>
+          <a:blip r:embed="rId2">
+            <a:extLst>
+              <a:ext uri="{28A0092B-C50C-407E-A947-70E740481C1C}">
+                <a14:useLocalDpi xmlns:a14="http://schemas.microsoft.com/office/drawing/2010/main" val="0"/>
+              </a:ext>
+            </a:extLst>
+          </a:blip>
+          <a:stretch>
+            <a:fillRect/>
+          </a:stretch>
+        </p:blipFill>
         <p:spPr>
           <a:xfrm>
-            <a:off x="838200" y="1304544"/>
-            <a:ext cx="10515600" cy="4872419"/>
+            <a:off x="1700011" y="1154740"/>
+            <a:ext cx="7861504" cy="5128695"/>
           </a:xfrm>
         </p:spPr>
-        <p:txBody>
-          <a:bodyPr/>
-          <a:lstStyle/>
-          <a:p>
-            <a:r>
-              <a:rPr lang="en-US" dirty="0"/>
-              <a:t>The ideas discussed in this presentation are drawn from a web page: </a:t>
-            </a:r>
-            <a:br>
-              <a:rPr lang="en-US" dirty="0"/>
-            </a:br>
-            <a:r>
-              <a:rPr lang="en-US" dirty="0"/>
-              <a:t>	</a:t>
-            </a:r>
-            <a:r>
-              <a:rPr lang="en-US" dirty="0">
-                <a:hlinkClick r:id="rId2"/>
-              </a:rPr>
-              <a:t>https://JimFawcett.github.io/CppStory_Models.html</a:t>
-            </a:r>
-            <a:br>
-              <a:rPr lang="en-US" dirty="0"/>
-            </a:br>
-            <a:br>
-              <a:rPr lang="en-US" dirty="0"/>
-            </a:br>
-            <a:r>
-              <a:rPr lang="en-US" dirty="0"/>
-              <a:t>which is part of the </a:t>
-            </a:r>
-            <a:r>
-              <a:rPr lang="en-US" dirty="0" err="1"/>
-              <a:t>CppStory</a:t>
-            </a:r>
-            <a:r>
-              <a:rPr lang="en-US" dirty="0"/>
-              <a:t>:</a:t>
-            </a:r>
-            <a:br>
-              <a:rPr lang="en-US" dirty="0"/>
-            </a:br>
-            <a:r>
-              <a:rPr lang="en-US" dirty="0"/>
-              <a:t>	</a:t>
-            </a:r>
-            <a:r>
-              <a:rPr lang="en-US" dirty="0">
-                <a:hlinkClick r:id="rId3"/>
-              </a:rPr>
-              <a:t>https://JimFawcett.github.io/CppStory_Prologue.html</a:t>
-            </a:r>
-            <a:r>
-              <a:rPr lang="en-US" dirty="0"/>
-              <a:t>   </a:t>
-            </a:r>
-            <a:br>
-              <a:rPr lang="en-US" dirty="0"/>
-            </a:br>
-            <a:endParaRPr lang="en-US" dirty="0"/>
-          </a:p>
-          <a:p>
-            <a:r>
-              <a:rPr lang="en-US" dirty="0"/>
-              <a:t>And code examples for the story are documented here:</a:t>
-            </a:r>
-            <a:br>
-              <a:rPr lang="en-US" dirty="0"/>
-            </a:br>
-            <a:r>
-              <a:rPr lang="en-US" dirty="0"/>
-              <a:t>	</a:t>
-            </a:r>
-            <a:r>
-              <a:rPr lang="en-US" dirty="0">
-                <a:hlinkClick r:id="rId4"/>
-              </a:rPr>
-              <a:t>https://JimFawcett.github.io/CppStoryRepo.html</a:t>
-            </a:r>
-            <a:br>
-              <a:rPr lang="en-US" dirty="0"/>
-            </a:br>
-            <a:endParaRPr lang="en-US" dirty="0"/>
-          </a:p>
-          <a:p>
-            <a:r>
-              <a:rPr lang="en-US" dirty="0"/>
-              <a:t>These slides are available here:</a:t>
-            </a:r>
-            <a:br>
-              <a:rPr lang="en-US" dirty="0"/>
-            </a:br>
-            <a:r>
-              <a:rPr lang="en-US" dirty="0"/>
-              <a:t>	</a:t>
-            </a:r>
-            <a:r>
-              <a:rPr lang="en-US" dirty="0">
-                <a:hlinkClick r:id="rId5"/>
-              </a:rPr>
-              <a:t>https://JimFawcett.github.io/Resources/CppModels.pdf</a:t>
-            </a:r>
-            <a:r>
-              <a:rPr lang="en-US" dirty="0"/>
-              <a:t> </a:t>
-            </a:r>
-          </a:p>
-          <a:p>
-            <a:pPr marL="0" indent="0">
-              <a:buNone/>
-            </a:pPr>
-            <a:endParaRPr lang="en-US" dirty="0"/>
-          </a:p>
-        </p:txBody>
-      </p:sp>
+      </p:pic>
       <p:sp>
         <p:nvSpPr>
           <p:cNvPr id="4" name="Slide Number Placeholder 3">
             <a:extLst>
               <a:ext uri="{FF2B5EF4-FFF2-40B4-BE49-F238E27FC236}">
-                <a16:creationId xmlns:a16="http://schemas.microsoft.com/office/drawing/2014/main" id="{65DE1FCB-5689-4E10-A416-328ED633A2EE}"/>
+                <a16:creationId xmlns:a16="http://schemas.microsoft.com/office/drawing/2014/main" id="{870DFE9F-68FE-40ED-A8E3-FD2CA1D02F44}"/>
               </a:ext>
             </a:extLst>
           </p:cNvPr>
@@ -12395,7 +13142,7 @@
     </p:spTree>
     <p:extLst>
       <p:ext uri="{BB962C8B-B14F-4D97-AF65-F5344CB8AC3E}">
-        <p14:creationId xmlns:p14="http://schemas.microsoft.com/office/powerpoint/2010/main" val="4015714117"/>
+        <p14:creationId xmlns:p14="http://schemas.microsoft.com/office/powerpoint/2010/main" val="491707384"/>
       </p:ext>
     </p:extLst>
   </p:cSld>
@@ -12427,6 +13174,235 @@
           <p:cNvPr id="2" name="Title 1">
             <a:extLst>
               <a:ext uri="{FF2B5EF4-FFF2-40B4-BE49-F238E27FC236}">
+                <a16:creationId xmlns:a16="http://schemas.microsoft.com/office/drawing/2014/main" id="{AE2C4E24-F41A-43B6-8514-8753B0BF4B56}"/>
+              </a:ext>
+            </a:extLst>
+          </p:cNvPr>
+          <p:cNvSpPr>
+            <a:spLocks noGrp="1"/>
+          </p:cNvSpPr>
+          <p:nvPr>
+            <p:ph type="title"/>
+          </p:nvPr>
+        </p:nvSpPr>
+        <p:spPr>
+          <a:xfrm>
+            <a:off x="838200" y="365126"/>
+            <a:ext cx="10515600" cy="780922"/>
+          </a:xfrm>
+        </p:spPr>
+        <p:txBody>
+          <a:bodyPr/>
+          <a:lstStyle/>
+          <a:p>
+            <a:r>
+              <a:rPr lang="en-US" dirty="0"/>
+              <a:t>Presentation Resources</a:t>
+            </a:r>
+          </a:p>
+        </p:txBody>
+      </p:sp>
+      <p:sp>
+        <p:nvSpPr>
+          <p:cNvPr id="3" name="Content Placeholder 2">
+            <a:extLst>
+              <a:ext uri="{FF2B5EF4-FFF2-40B4-BE49-F238E27FC236}">
+                <a16:creationId xmlns:a16="http://schemas.microsoft.com/office/drawing/2014/main" id="{63C3A9C2-6490-47D7-8E43-D14728254FDB}"/>
+              </a:ext>
+            </a:extLst>
+          </p:cNvPr>
+          <p:cNvSpPr>
+            <a:spLocks noGrp="1"/>
+          </p:cNvSpPr>
+          <p:nvPr>
+            <p:ph idx="1"/>
+          </p:nvPr>
+        </p:nvSpPr>
+        <p:spPr>
+          <a:xfrm>
+            <a:off x="838200" y="1304544"/>
+            <a:ext cx="10515600" cy="4872419"/>
+          </a:xfrm>
+        </p:spPr>
+        <p:txBody>
+          <a:bodyPr/>
+          <a:lstStyle/>
+          <a:p>
+            <a:r>
+              <a:rPr lang="en-US" dirty="0"/>
+              <a:t>The ideas discussed in this presentation are drawn from a web page: </a:t>
+            </a:r>
+            <a:br>
+              <a:rPr lang="en-US" dirty="0"/>
+            </a:br>
+            <a:r>
+              <a:rPr lang="en-US" dirty="0"/>
+              <a:t>	</a:t>
+            </a:r>
+            <a:r>
+              <a:rPr lang="en-US" dirty="0">
+                <a:hlinkClick r:id="rId2"/>
+              </a:rPr>
+              <a:t>https://JimFawcett.github.io/CppStory_Models.html</a:t>
+            </a:r>
+            <a:br>
+              <a:rPr lang="en-US" dirty="0"/>
+            </a:br>
+            <a:br>
+              <a:rPr lang="en-US" dirty="0"/>
+            </a:br>
+            <a:r>
+              <a:rPr lang="en-US" dirty="0"/>
+              <a:t>which is part of the </a:t>
+            </a:r>
+            <a:r>
+              <a:rPr lang="en-US" dirty="0" err="1"/>
+              <a:t>CppStory</a:t>
+            </a:r>
+            <a:r>
+              <a:rPr lang="en-US" dirty="0"/>
+              <a:t>:</a:t>
+            </a:r>
+            <a:br>
+              <a:rPr lang="en-US" dirty="0"/>
+            </a:br>
+            <a:r>
+              <a:rPr lang="en-US" dirty="0"/>
+              <a:t>	</a:t>
+            </a:r>
+            <a:r>
+              <a:rPr lang="en-US" dirty="0">
+                <a:hlinkClick r:id="rId3"/>
+              </a:rPr>
+              <a:t>https://JimFawcett.github.io/CppStory_Prologue.html</a:t>
+            </a:r>
+            <a:r>
+              <a:rPr lang="en-US" dirty="0"/>
+              <a:t>   </a:t>
+            </a:r>
+            <a:br>
+              <a:rPr lang="en-US" dirty="0"/>
+            </a:br>
+            <a:endParaRPr lang="en-US" dirty="0"/>
+          </a:p>
+          <a:p>
+            <a:r>
+              <a:rPr lang="en-US" dirty="0"/>
+              <a:t>And code examples for the story are documented here:</a:t>
+            </a:r>
+            <a:br>
+              <a:rPr lang="en-US" dirty="0"/>
+            </a:br>
+            <a:r>
+              <a:rPr lang="en-US" dirty="0"/>
+              <a:t>	</a:t>
+            </a:r>
+            <a:r>
+              <a:rPr lang="en-US" dirty="0">
+                <a:hlinkClick r:id="rId4"/>
+              </a:rPr>
+              <a:t>https://JimFawcett.github.io/CppStoryRepo.html</a:t>
+            </a:r>
+            <a:br>
+              <a:rPr lang="en-US" dirty="0"/>
+            </a:br>
+            <a:endParaRPr lang="en-US" dirty="0"/>
+          </a:p>
+          <a:p>
+            <a:r>
+              <a:rPr lang="en-US" dirty="0"/>
+              <a:t>These slides are available here:</a:t>
+            </a:r>
+            <a:br>
+              <a:rPr lang="en-US" dirty="0"/>
+            </a:br>
+            <a:r>
+              <a:rPr lang="en-US" dirty="0"/>
+              <a:t>	</a:t>
+            </a:r>
+            <a:r>
+              <a:rPr lang="en-US" dirty="0">
+                <a:hlinkClick r:id="rId5"/>
+              </a:rPr>
+              <a:t>https://JimFawcett.github.io/Resources/CppModels.pdf</a:t>
+            </a:r>
+            <a:r>
+              <a:rPr lang="en-US" dirty="0"/>
+              <a:t> </a:t>
+            </a:r>
+          </a:p>
+          <a:p>
+            <a:pPr marL="0" indent="0">
+              <a:buNone/>
+            </a:pPr>
+            <a:endParaRPr lang="en-US" dirty="0"/>
+          </a:p>
+        </p:txBody>
+      </p:sp>
+      <p:sp>
+        <p:nvSpPr>
+          <p:cNvPr id="4" name="Slide Number Placeholder 3">
+            <a:extLst>
+              <a:ext uri="{FF2B5EF4-FFF2-40B4-BE49-F238E27FC236}">
+                <a16:creationId xmlns:a16="http://schemas.microsoft.com/office/drawing/2014/main" id="{65DE1FCB-5689-4E10-A416-328ED633A2EE}"/>
+              </a:ext>
+            </a:extLst>
+          </p:cNvPr>
+          <p:cNvSpPr>
+            <a:spLocks noGrp="1"/>
+          </p:cNvSpPr>
+          <p:nvPr>
+            <p:ph type="sldNum" sz="quarter" idx="12"/>
+          </p:nvPr>
+        </p:nvSpPr>
+        <p:spPr/>
+        <p:txBody>
+          <a:bodyPr/>
+          <a:lstStyle/>
+          <a:p>
+            <a:fld id="{519FA752-D1CF-498F-B0BD-05E47309CED3}" type="slidenum">
+              <a:rPr lang="en-US" smtClean="0"/>
+              <a:t>42</a:t>
+            </a:fld>
+            <a:endParaRPr lang="en-US"/>
+          </a:p>
+        </p:txBody>
+      </p:sp>
+    </p:spTree>
+    <p:extLst>
+      <p:ext uri="{BB962C8B-B14F-4D97-AF65-F5344CB8AC3E}">
+        <p14:creationId xmlns:p14="http://schemas.microsoft.com/office/powerpoint/2010/main" val="4015714117"/>
+      </p:ext>
+    </p:extLst>
+  </p:cSld>
+  <p:clrMapOvr>
+    <a:masterClrMapping/>
+  </p:clrMapOvr>
+</p:sld>
+</file>
+
+<file path=ppt/slides/slide43.xml><?xml version="1.0" encoding="utf-8"?>
+<p:sld xmlns:a="http://schemas.openxmlformats.org/drawingml/2006/main" xmlns:r="http://schemas.openxmlformats.org/officeDocument/2006/relationships" xmlns:p="http://schemas.openxmlformats.org/presentationml/2006/main">
+  <p:cSld>
+    <p:spTree>
+      <p:nvGrpSpPr>
+        <p:cNvPr id="1" name=""/>
+        <p:cNvGrpSpPr/>
+        <p:nvPr/>
+      </p:nvGrpSpPr>
+      <p:grpSpPr>
+        <a:xfrm>
+          <a:off x="0" y="0"/>
+          <a:ext cx="0" cy="0"/>
+          <a:chOff x="0" y="0"/>
+          <a:chExt cx="0" cy="0"/>
+        </a:xfrm>
+      </p:grpSpPr>
+      <p:sp>
+        <p:nvSpPr>
+          <p:cNvPr id="2" name="Title 1">
+            <a:extLst>
+              <a:ext uri="{FF2B5EF4-FFF2-40B4-BE49-F238E27FC236}">
                 <a16:creationId xmlns:a16="http://schemas.microsoft.com/office/drawing/2014/main" id="{44DA707B-1252-4D6A-A691-C5FA8ECEA2F2}"/>
               </a:ext>
             </a:extLst>
@@ -12711,7 +13687,7 @@
           <a:p>
             <a:fld id="{519FA752-D1CF-498F-B0BD-05E47309CED3}" type="slidenum">
               <a:rPr lang="en-US" smtClean="0"/>
-              <a:t>42</a:t>
+              <a:t>43</a:t>
             </a:fld>
             <a:endParaRPr lang="en-US"/>
           </a:p>

</xml_diff>

<commit_message>
fixed error in Polymorphism diagram
</commit_message>
<xml_diff>
--- a/Resources/CppModels.pptx
+++ b/Resources/CppModels.pptx
@@ -10693,10 +10693,10 @@
       </p:sp>
       <p:pic>
         <p:nvPicPr>
-          <p:cNvPr id="9" name="Content Placeholder 8" descr="A screenshot of a cell phone&#10;&#10;Description automatically generated">
-            <a:extLst>
-              <a:ext uri="{FF2B5EF4-FFF2-40B4-BE49-F238E27FC236}">
-                <a16:creationId xmlns:a16="http://schemas.microsoft.com/office/drawing/2014/main" id="{05E40EBF-2882-4D3D-BD36-0510CC5D2F66}"/>
+          <p:cNvPr id="8" name="Content Placeholder 7" descr="A screenshot of a cell phone&#10;&#10;Description automatically generated">
+            <a:extLst>
+              <a:ext uri="{FF2B5EF4-FFF2-40B4-BE49-F238E27FC236}">
+                <a16:creationId xmlns:a16="http://schemas.microsoft.com/office/drawing/2014/main" id="{E093C2D1-6368-4E1C-BA1F-EB774D9E7544}"/>
               </a:ext>
             </a:extLst>
           </p:cNvPr>
@@ -10721,8 +10721,8 @@
         </p:blipFill>
         <p:spPr>
           <a:xfrm>
-            <a:off x="6306081" y="1371600"/>
-            <a:ext cx="5132779" cy="4351338"/>
+            <a:off x="6271618" y="1371600"/>
+            <a:ext cx="5082182" cy="4351338"/>
           </a:xfrm>
         </p:spPr>
       </p:pic>

</xml_diff>

<commit_message>
fixed typos in Template example
</commit_message>
<xml_diff>
--- a/Resources/CppModels.pptx
+++ b/Resources/CppModels.pptx
@@ -11633,7 +11633,7 @@
               <a:rPr lang="fr-FR" sz="1400" b="1" dirty="0">
                 <a:latin typeface="Consolas" panose="020B0609020204030204" pitchFamily="49" charset="0"/>
               </a:rPr>
-              <a:t>&lt;double&gt; il);</a:t>
+              <a:t>&lt;T&gt; il);</a:t>
             </a:r>
           </a:p>
           <a:p>
@@ -11970,7 +11970,7 @@
         <p:spPr>
           <a:xfrm>
             <a:off x="6312795" y="1023870"/>
-            <a:ext cx="5471374" cy="5632311"/>
+            <a:ext cx="5471374" cy="5262979"/>
           </a:xfrm>
           <a:prstGeom prst="rect">
             <a:avLst/>
@@ -12097,10 +12097,16 @@
               <a:t>initializer_list</a:t>
             </a:r>
             <a:r>
+              <a:rPr lang="en-US" sz="1200" b="1">
+                <a:latin typeface="Consolas" panose="020B0609020204030204" pitchFamily="49" charset="0"/>
+              </a:rPr>
+              <a:t>&lt;T&gt; </a:t>
+            </a:r>
+            <a:r>
               <a:rPr lang="en-US" sz="1200" b="1" dirty="0">
                 <a:latin typeface="Consolas" panose="020B0609020204030204" pitchFamily="49" charset="0"/>
               </a:rPr>
-              <a:t>&lt;double&gt; li) : name_("none") {</a:t>
+              <a:t>li) : name_("none") {</a:t>
             </a:r>
           </a:p>
           <a:p>

</xml_diff>